<commit_message>
About handling method of fatal error (java.lang.Error) added #2368
</commit_message>
<xml_diff>
--- a/source/ArchitectureInDetail/WebApplicationDetail/images_ExceptionHandling/materialExceptionHandling.pptx
+++ b/source/ArchitectureInDetail/WebApplicationDetail/images_ExceptionHandling/materialExceptionHandling.pptx
@@ -153,6 +153,20 @@
         </p14:section>
       </p14:sectionLst>
     </p:ext>
+    <p:ext uri="{EFAFB233-063F-42B5-8137-9DF3F51BA10A}">
+      <p15:sldGuideLst xmlns:p15="http://schemas.microsoft.com/office/powerpoint/2012/main">
+        <p15:guide id="1" orient="horz" pos="2160">
+          <p15:clr>
+            <a:srgbClr val="A4A3A4"/>
+          </p15:clr>
+        </p15:guide>
+        <p15:guide id="2" pos="2880">
+          <p15:clr>
+            <a:srgbClr val="A4A3A4"/>
+          </p15:clr>
+        </p15:guide>
+      </p15:sldGuideLst>
+    </p:ext>
   </p:extLst>
 </p:presentation>
 </file>
@@ -240,7 +254,7 @@
             <a:fld id="{3BB47352-BF5A-4CD2-B029-996118CD8E01}" type="datetimeFigureOut">
               <a:rPr kumimoji="1" lang="ja-JP" altLang="en-US" smtClean="0"/>
               <a:pPr/>
-              <a:t>2014/6/27</a:t>
+              <a:t>2017/1/16</a:t>
             </a:fld>
             <a:endParaRPr kumimoji="1" lang="ja-JP" altLang="en-US" dirty="0"/>
           </a:p>
@@ -1488,7 +1502,7 @@
             <a:fld id="{7B9B12EC-6AA0-374B-A2D3-850081A07A26}" type="datetimeFigureOut">
               <a:rPr kumimoji="1" lang="ja-JP" altLang="en-US" smtClean="0"/>
               <a:pPr/>
-              <a:t>2014/6/27</a:t>
+              <a:t>2017/1/16</a:t>
             </a:fld>
             <a:endParaRPr kumimoji="1" lang="ja-JP" altLang="en-US" dirty="0"/>
           </a:p>
@@ -1692,7 +1706,7 @@
             <a:fld id="{7B9B12EC-6AA0-374B-A2D3-850081A07A26}" type="datetimeFigureOut">
               <a:rPr kumimoji="1" lang="ja-JP" altLang="en-US" smtClean="0"/>
               <a:pPr/>
-              <a:t>2014/6/27</a:t>
+              <a:t>2017/1/16</a:t>
             </a:fld>
             <a:endParaRPr kumimoji="1" lang="ja-JP" altLang="en-US" dirty="0"/>
           </a:p>
@@ -1906,7 +1920,7 @@
             <a:fld id="{7B9B12EC-6AA0-374B-A2D3-850081A07A26}" type="datetimeFigureOut">
               <a:rPr kumimoji="1" lang="ja-JP" altLang="en-US" smtClean="0"/>
               <a:pPr/>
-              <a:t>2014/6/27</a:t>
+              <a:t>2017/1/16</a:t>
             </a:fld>
             <a:endParaRPr kumimoji="1" lang="ja-JP" altLang="en-US" dirty="0"/>
           </a:p>
@@ -2110,7 +2124,7 @@
             <a:fld id="{7B9B12EC-6AA0-374B-A2D3-850081A07A26}" type="datetimeFigureOut">
               <a:rPr kumimoji="1" lang="ja-JP" altLang="en-US" smtClean="0"/>
               <a:pPr/>
-              <a:t>2014/6/27</a:t>
+              <a:t>2017/1/16</a:t>
             </a:fld>
             <a:endParaRPr kumimoji="1" lang="ja-JP" altLang="en-US" dirty="0"/>
           </a:p>
@@ -2358,7 +2372,7 @@
             <a:fld id="{7B9B12EC-6AA0-374B-A2D3-850081A07A26}" type="datetimeFigureOut">
               <a:rPr kumimoji="1" lang="ja-JP" altLang="en-US" smtClean="0"/>
               <a:pPr/>
-              <a:t>2014/6/27</a:t>
+              <a:t>2017/1/16</a:t>
             </a:fld>
             <a:endParaRPr kumimoji="1" lang="ja-JP" altLang="en-US" dirty="0"/>
           </a:p>
@@ -2712,7 +2726,7 @@
             <a:fld id="{7B9B12EC-6AA0-374B-A2D3-850081A07A26}" type="datetimeFigureOut">
               <a:rPr kumimoji="1" lang="ja-JP" altLang="en-US" smtClean="0"/>
               <a:pPr/>
-              <a:t>2014/6/27</a:t>
+              <a:t>2017/1/16</a:t>
             </a:fld>
             <a:endParaRPr kumimoji="1" lang="ja-JP" altLang="en-US" dirty="0"/>
           </a:p>
@@ -3200,7 +3214,7 @@
             <a:fld id="{7B9B12EC-6AA0-374B-A2D3-850081A07A26}" type="datetimeFigureOut">
               <a:rPr kumimoji="1" lang="ja-JP" altLang="en-US" smtClean="0"/>
               <a:pPr/>
-              <a:t>2014/6/27</a:t>
+              <a:t>2017/1/16</a:t>
             </a:fld>
             <a:endParaRPr kumimoji="1" lang="ja-JP" altLang="en-US" dirty="0"/>
           </a:p>
@@ -3320,7 +3334,7 @@
             <a:fld id="{7B9B12EC-6AA0-374B-A2D3-850081A07A26}" type="datetimeFigureOut">
               <a:rPr kumimoji="1" lang="ja-JP" altLang="en-US" smtClean="0"/>
               <a:pPr/>
-              <a:t>2014/6/27</a:t>
+              <a:t>2017/1/16</a:t>
             </a:fld>
             <a:endParaRPr kumimoji="1" lang="ja-JP" altLang="en-US" dirty="0"/>
           </a:p>
@@ -3417,7 +3431,7 @@
             <a:fld id="{7B9B12EC-6AA0-374B-A2D3-850081A07A26}" type="datetimeFigureOut">
               <a:rPr kumimoji="1" lang="ja-JP" altLang="en-US" smtClean="0"/>
               <a:pPr/>
-              <a:t>2014/6/27</a:t>
+              <a:t>2017/1/16</a:t>
             </a:fld>
             <a:endParaRPr kumimoji="1" lang="ja-JP" altLang="en-US" dirty="0"/>
           </a:p>
@@ -3728,7 +3742,7 @@
             <a:fld id="{7B9B12EC-6AA0-374B-A2D3-850081A07A26}" type="datetimeFigureOut">
               <a:rPr kumimoji="1" lang="ja-JP" altLang="en-US" smtClean="0"/>
               <a:pPr/>
-              <a:t>2014/6/27</a:t>
+              <a:t>2017/1/16</a:t>
             </a:fld>
             <a:endParaRPr kumimoji="1" lang="ja-JP" altLang="en-US" dirty="0"/>
           </a:p>
@@ -3983,7 +3997,7 @@
             <a:fld id="{7B9B12EC-6AA0-374B-A2D3-850081A07A26}" type="datetimeFigureOut">
               <a:rPr kumimoji="1" lang="ja-JP" altLang="en-US" smtClean="0"/>
               <a:pPr/>
-              <a:t>2014/6/27</a:t>
+              <a:t>2017/1/16</a:t>
             </a:fld>
             <a:endParaRPr kumimoji="1" lang="ja-JP" altLang="en-US" dirty="0"/>
           </a:p>
@@ -4230,7 +4244,7 @@
             <a:fld id="{7B9B12EC-6AA0-374B-A2D3-850081A07A26}" type="datetimeFigureOut">
               <a:rPr kumimoji="1" lang="ja-JP" altLang="en-US" smtClean="0"/>
               <a:pPr/>
-              <a:t>2014/6/27</a:t>
+              <a:t>2017/1/16</a:t>
             </a:fld>
             <a:endParaRPr kumimoji="1" lang="ja-JP" altLang="en-US" dirty="0"/>
           </a:p>
@@ -12061,7 +12075,7 @@
         </p:blipFill>
         <p:spPr bwMode="auto">
           <a:xfrm>
-            <a:off x="134000" y="3541055"/>
+            <a:off x="134000" y="4141549"/>
             <a:ext cx="1429056" cy="1581567"/>
           </a:xfrm>
           <a:prstGeom prst="rect">
@@ -12078,7 +12092,7 @@
         </p:nvSpPr>
         <p:spPr>
           <a:xfrm>
-            <a:off x="241305" y="4270772"/>
+            <a:off x="241305" y="4871266"/>
             <a:ext cx="1214446" cy="500066"/>
           </a:xfrm>
           <a:prstGeom prst="rect">
@@ -12145,7 +12159,7 @@
         </p:nvSpPr>
         <p:spPr>
           <a:xfrm>
-            <a:off x="1269627" y="4270772"/>
+            <a:off x="1269627" y="4871266"/>
             <a:ext cx="988142" cy="681242"/>
           </a:xfrm>
           <a:prstGeom prst="flowChartDocument">
@@ -12498,7 +12512,7 @@
         </p:nvSpPr>
         <p:spPr>
           <a:xfrm>
-            <a:off x="1521869" y="3638255"/>
+            <a:off x="1521869" y="4238749"/>
             <a:ext cx="476250" cy="338554"/>
           </a:xfrm>
           <a:prstGeom prst="rect">
@@ -12611,7 +12625,7 @@
         </p:nvSpPr>
         <p:spPr>
           <a:xfrm>
-            <a:off x="249190" y="3951231"/>
+            <a:off x="249190" y="4551725"/>
             <a:ext cx="1214446" cy="500066"/>
           </a:xfrm>
           <a:prstGeom prst="rect">
@@ -12667,7 +12681,7 @@
         </p:nvSpPr>
         <p:spPr>
           <a:xfrm>
-            <a:off x="2179966" y="3353616"/>
+            <a:off x="2179966" y="3954110"/>
             <a:ext cx="1209874" cy="676927"/>
           </a:xfrm>
           <a:prstGeom prst="rect">
@@ -12727,7 +12741,7 @@
         <p:spPr>
           <a:xfrm flipH="1">
             <a:off x="2784902" y="2196524"/>
-            <a:ext cx="1" cy="1050136"/>
+            <a:ext cx="1" cy="1650630"/>
           </a:xfrm>
           <a:prstGeom prst="straightConnector1">
             <a:avLst/>
@@ -12760,8 +12774,8 @@
         </p:nvCxnSpPr>
         <p:spPr>
           <a:xfrm flipV="1">
-            <a:off x="910203" y="2098106"/>
-            <a:ext cx="0" cy="1762102"/>
+            <a:off x="910203" y="2098107"/>
+            <a:ext cx="0" cy="2371594"/>
           </a:xfrm>
           <a:prstGeom prst="line">
             <a:avLst/>
@@ -12797,7 +12811,7 @@
         </p:nvCxnSpPr>
         <p:spPr>
           <a:xfrm rot="10800000" flipV="1">
-            <a:off x="1763698" y="3692080"/>
+            <a:off x="1763698" y="4292574"/>
             <a:ext cx="416268" cy="578692"/>
           </a:xfrm>
           <a:prstGeom prst="curvedConnector2">
@@ -12830,7 +12844,7 @@
         </p:nvSpPr>
         <p:spPr>
           <a:xfrm>
-            <a:off x="3964168" y="4270772"/>
+            <a:off x="3964168" y="4871266"/>
             <a:ext cx="857934" cy="597318"/>
           </a:xfrm>
           <a:prstGeom prst="flowChartDocument">
@@ -12889,7 +12903,7 @@
         </p:nvCxnSpPr>
         <p:spPr>
           <a:xfrm>
-            <a:off x="3389840" y="3692080"/>
+            <a:off x="3389840" y="4292574"/>
             <a:ext cx="1003295" cy="578692"/>
           </a:xfrm>
           <a:prstGeom prst="curvedConnector2">
@@ -12922,7 +12936,7 @@
         </p:nvSpPr>
         <p:spPr>
           <a:xfrm>
-            <a:off x="3778990" y="3869207"/>
+            <a:off x="3778990" y="4469701"/>
             <a:ext cx="476250" cy="338554"/>
           </a:xfrm>
           <a:prstGeom prst="rect">
@@ -12951,111 +12965,18 @@
           </a:p>
         </p:txBody>
       </p:sp>
-      <p:sp>
-        <p:nvSpPr>
-          <p:cNvPr id="95" name="四角形吹き出し 94"/>
-          <p:cNvSpPr/>
-          <p:nvPr/>
-        </p:nvSpPr>
-        <p:spPr>
-          <a:xfrm>
-            <a:off x="4476410" y="3017674"/>
-            <a:ext cx="1289931" cy="611361"/>
-          </a:xfrm>
-          <a:prstGeom prst="wedgeRectCallout">
-            <a:avLst>
-              <a:gd name="adj1" fmla="val -73145"/>
-              <a:gd name="adj2" fmla="val -76016"/>
-            </a:avLst>
-          </a:prstGeom>
-          <a:ln w="19050"/>
-        </p:spPr>
-        <p:style>
-          <a:lnRef idx="2">
-            <a:schemeClr val="accent1"/>
-          </a:lnRef>
-          <a:fillRef idx="1">
-            <a:schemeClr val="lt1"/>
-          </a:fillRef>
-          <a:effectRef idx="0">
-            <a:schemeClr val="accent1"/>
-          </a:effectRef>
-          <a:fontRef idx="minor">
-            <a:schemeClr val="dk1"/>
-          </a:fontRef>
-        </p:style>
-        <p:txBody>
-          <a:bodyPr rtlCol="0" anchor="ctr"/>
-          <a:lstStyle/>
-          <a:p>
-            <a:r>
-              <a:rPr lang="en-US" altLang="ja-JP" sz="1200" dirty="0" smtClean="0">
-                <a:solidFill>
-                  <a:schemeClr val="tx1"/>
-                </a:solidFill>
-              </a:rPr>
-              <a:t>XxxError </a:t>
-            </a:r>
-            <a:r>
-              <a:rPr lang="en-US" altLang="ja-JP" sz="1200" dirty="0">
-                <a:solidFill>
-                  <a:schemeClr val="tx1"/>
-                </a:solidFill>
-              </a:rPr>
-              <a:t>is </a:t>
-            </a:r>
-            <a:r>
-              <a:rPr lang="en-US" altLang="ja-JP" sz="1200" dirty="0" smtClean="0">
-                <a:solidFill>
-                  <a:schemeClr val="tx1"/>
-                </a:solidFill>
-              </a:rPr>
-              <a:t>wrapped </a:t>
-            </a:r>
-            <a:r>
-              <a:rPr lang="en-US" altLang="ja-JP" sz="1200" dirty="0">
-                <a:solidFill>
-                  <a:schemeClr val="tx1"/>
-                </a:solidFill>
-              </a:rPr>
-              <a:t>in </a:t>
-            </a:r>
-            <a:r>
-              <a:rPr lang="en-US" altLang="ja-JP" sz="1200" dirty="0" smtClean="0">
-                <a:solidFill>
-                  <a:schemeClr val="tx1"/>
-                </a:solidFill>
-              </a:rPr>
-              <a:t>ServletException</a:t>
-            </a:r>
-            <a:r>
-              <a:rPr lang="en-US" altLang="ja-JP" sz="1200" dirty="0">
-                <a:solidFill>
-                  <a:schemeClr val="tx1"/>
-                </a:solidFill>
-              </a:rPr>
-              <a:t>.</a:t>
-            </a:r>
-            <a:endParaRPr kumimoji="1" lang="ja-JP" altLang="en-US" sz="1200" dirty="0">
-              <a:solidFill>
-                <a:schemeClr val="tx1"/>
-              </a:solidFill>
-            </a:endParaRPr>
-          </a:p>
-        </p:txBody>
-      </p:sp>
       <p:cxnSp>
         <p:nvCxnSpPr>
           <p:cNvPr id="99" name="直線矢印コネクタ 13"/>
           <p:cNvCxnSpPr>
-            <a:stCxn id="43" idx="2"/>
+            <a:endCxn id="71" idx="1"/>
           </p:cNvCxnSpPr>
           <p:nvPr/>
         </p:nvCxnSpPr>
         <p:spPr>
-          <a:xfrm rot="5400000">
-            <a:off x="4144249" y="2287044"/>
-            <a:ext cx="613016" cy="408320"/>
+          <a:xfrm rot="16200000" flipH="1">
+            <a:off x="4718157" y="2286135"/>
+            <a:ext cx="535693" cy="332809"/>
           </a:xfrm>
           <a:prstGeom prst="curvedConnector2">
             <a:avLst/>
@@ -13087,7 +13008,7 @@
         </p:nvSpPr>
         <p:spPr>
           <a:xfrm>
-            <a:off x="4629318" y="2436516"/>
+            <a:off x="4859261" y="2191942"/>
             <a:ext cx="476250" cy="338554"/>
           </a:xfrm>
           <a:prstGeom prst="rect">
@@ -13124,7 +13045,7 @@
         </p:nvSpPr>
         <p:spPr>
           <a:xfrm>
-            <a:off x="2481830" y="3951230"/>
+            <a:off x="2481830" y="4551724"/>
             <a:ext cx="850837" cy="819607"/>
           </a:xfrm>
           <a:prstGeom prst="flowChartDocument">
@@ -13449,7 +13370,7 @@
         </p:nvSpPr>
         <p:spPr>
           <a:xfrm>
-            <a:off x="2588420" y="4952014"/>
+            <a:off x="2588420" y="5552508"/>
             <a:ext cx="1493118" cy="507750"/>
           </a:xfrm>
           <a:prstGeom prst="wedgeRectCallout">
@@ -13911,7 +13832,7 @@
         </p:nvSpPr>
         <p:spPr>
           <a:xfrm>
-            <a:off x="546297" y="2760417"/>
+            <a:off x="546297" y="3009703"/>
             <a:ext cx="363906" cy="338554"/>
           </a:xfrm>
           <a:prstGeom prst="rect">
@@ -13957,7 +13878,7 @@
         </p:nvSpPr>
         <p:spPr>
           <a:xfrm rot="10800000">
-            <a:off x="2684496" y="3246660"/>
+            <a:off x="2684496" y="3847154"/>
             <a:ext cx="200813" cy="213911"/>
           </a:xfrm>
           <a:prstGeom prst="flowChartOffpageConnector">
@@ -14008,7 +13929,7 @@
         </p:nvSpPr>
         <p:spPr>
           <a:xfrm>
-            <a:off x="3109639" y="2436516"/>
+            <a:off x="5152408" y="2315315"/>
             <a:ext cx="1194016" cy="810144"/>
           </a:xfrm>
           <a:prstGeom prst="star24">
@@ -14046,7 +13967,7 @@
         </p:nvSpPr>
         <p:spPr>
           <a:xfrm>
-            <a:off x="3160438" y="2644436"/>
+            <a:off x="5237116" y="2506513"/>
             <a:ext cx="1084486" cy="407261"/>
           </a:xfrm>
           <a:prstGeom prst="rect">
@@ -14227,7 +14148,7 @@
         </p:nvGrpSpPr>
         <p:grpSpPr>
           <a:xfrm>
-            <a:off x="3393647" y="3017674"/>
+            <a:off x="5436416" y="2896473"/>
             <a:ext cx="1112438" cy="555462"/>
             <a:chOff x="5675261" y="3733751"/>
             <a:chExt cx="1112438" cy="555462"/>
@@ -14475,6 +14396,470 @@
               <a:t>Info</a:t>
             </a:r>
             <a:endParaRPr lang="en-US" altLang="ja-JP" sz="1000" dirty="0">
+              <a:solidFill>
+                <a:schemeClr val="tx1"/>
+              </a:solidFill>
+            </a:endParaRPr>
+          </a:p>
+        </p:txBody>
+      </p:sp>
+      <p:sp>
+        <p:nvSpPr>
+          <p:cNvPr id="64" name="正方形/長方形 63"/>
+          <p:cNvSpPr/>
+          <p:nvPr/>
+        </p:nvSpPr>
+        <p:spPr>
+          <a:xfrm>
+            <a:off x="3221275" y="2753787"/>
+            <a:ext cx="1493663" cy="754870"/>
+          </a:xfrm>
+          <a:prstGeom prst="rect">
+            <a:avLst/>
+          </a:prstGeom>
+        </p:spPr>
+        <p:style>
+          <a:lnRef idx="1">
+            <a:schemeClr val="accent1"/>
+          </a:lnRef>
+          <a:fillRef idx="3">
+            <a:schemeClr val="accent1"/>
+          </a:fillRef>
+          <a:effectRef idx="2">
+            <a:schemeClr val="accent1"/>
+          </a:effectRef>
+          <a:fontRef idx="minor">
+            <a:schemeClr val="lt1"/>
+          </a:fontRef>
+        </p:style>
+        <p:txBody>
+          <a:bodyPr rtlCol="0" anchor="ctr"/>
+          <a:lstStyle/>
+          <a:p>
+            <a:pPr algn="ctr"/>
+            <a:r>
+              <a:rPr lang="en-US" altLang="ja-JP" sz="1000" dirty="0"/>
+              <a:t>&lt;Spring MVC </a:t>
+            </a:r>
+            <a:r>
+              <a:rPr lang="en-US" altLang="ja-JP" sz="1000" dirty="0" smtClean="0"/>
+              <a:t>Extention&gt;</a:t>
+            </a:r>
+          </a:p>
+          <a:p>
+            <a:pPr algn="ctr"/>
+            <a:r>
+              <a:rPr lang="en-US" altLang="ja-JP" sz="1200" dirty="0" smtClean="0"/>
+              <a:t>SystemException</a:t>
+            </a:r>
+          </a:p>
+          <a:p>
+            <a:pPr algn="ctr"/>
+            <a:r>
+              <a:rPr lang="en-US" altLang="ja-JP" sz="1200" dirty="0" smtClean="0"/>
+              <a:t>Resolver</a:t>
+            </a:r>
+            <a:endParaRPr kumimoji="1" lang="ja-JP" altLang="en-US" sz="1200" dirty="0"/>
+          </a:p>
+        </p:txBody>
+      </p:sp>
+      <p:sp>
+        <p:nvSpPr>
+          <p:cNvPr id="82" name="フローチャート : 書類 60"/>
+          <p:cNvSpPr/>
+          <p:nvPr/>
+        </p:nvSpPr>
+        <p:spPr>
+          <a:xfrm>
+            <a:off x="4370794" y="3248962"/>
+            <a:ext cx="819975" cy="595190"/>
+          </a:xfrm>
+          <a:prstGeom prst="flowChartDocument">
+            <a:avLst/>
+          </a:prstGeom>
+        </p:spPr>
+        <p:style>
+          <a:lnRef idx="1">
+            <a:schemeClr val="accent3"/>
+          </a:lnRef>
+          <a:fillRef idx="2">
+            <a:schemeClr val="accent3"/>
+          </a:fillRef>
+          <a:effectRef idx="1">
+            <a:schemeClr val="accent3"/>
+          </a:effectRef>
+          <a:fontRef idx="minor">
+            <a:schemeClr val="dk1"/>
+          </a:fontRef>
+        </p:style>
+        <p:txBody>
+          <a:bodyPr rtlCol="0" anchor="t" anchorCtr="0"/>
+          <a:lstStyle/>
+          <a:p>
+            <a:pPr algn="ctr"/>
+            <a:r>
+              <a:rPr lang="en-US" altLang="ja-JP" sz="1400" dirty="0"/>
+              <a:t>spring-mvc.xml</a:t>
+            </a:r>
+            <a:endParaRPr kumimoji="1" lang="en-US" altLang="ja-JP" sz="1400" dirty="0" smtClean="0"/>
+          </a:p>
+        </p:txBody>
+      </p:sp>
+      <p:sp>
+        <p:nvSpPr>
+          <p:cNvPr id="88" name="四角形吹き出し 87"/>
+          <p:cNvSpPr/>
+          <p:nvPr/>
+        </p:nvSpPr>
+        <p:spPr>
+          <a:xfrm>
+            <a:off x="5146110" y="4028239"/>
+            <a:ext cx="2083665" cy="1033533"/>
+          </a:xfrm>
+          <a:prstGeom prst="wedgeRectCallout">
+            <a:avLst>
+              <a:gd name="adj1" fmla="val -53576"/>
+              <a:gd name="adj2" fmla="val -81875"/>
+            </a:avLst>
+          </a:prstGeom>
+          <a:ln w="19050"/>
+        </p:spPr>
+        <p:style>
+          <a:lnRef idx="2">
+            <a:schemeClr val="accent1"/>
+          </a:lnRef>
+          <a:fillRef idx="1">
+            <a:schemeClr val="lt1"/>
+          </a:fillRef>
+          <a:effectRef idx="0">
+            <a:schemeClr val="accent1"/>
+          </a:effectRef>
+          <a:fontRef idx="minor">
+            <a:schemeClr val="dk1"/>
+          </a:fontRef>
+        </p:style>
+        <p:txBody>
+          <a:bodyPr rtlCol="0" anchor="ctr"/>
+          <a:lstStyle/>
+          <a:p>
+            <a:r>
+              <a:rPr lang="en-US" altLang="ja-JP" sz="1200" dirty="0" smtClean="0">
+                <a:solidFill>
+                  <a:schemeClr val="tx1"/>
+                </a:solidFill>
+              </a:rPr>
+              <a:t>define bean &amp; exception handling rule.</a:t>
+            </a:r>
+          </a:p>
+          <a:p>
+            <a:r>
+              <a:rPr lang="en-US" altLang="ja-JP" sz="1200" dirty="0" smtClean="0">
+                <a:solidFill>
+                  <a:schemeClr val="tx1"/>
+                </a:solidFill>
+              </a:rPr>
+              <a:t>For </a:t>
+            </a:r>
+            <a:r>
+              <a:rPr lang="en-US" altLang="ja-JP" sz="1200" dirty="0" err="1" smtClean="0">
+                <a:solidFill>
+                  <a:schemeClr val="tx1"/>
+                </a:solidFill>
+              </a:rPr>
+              <a:t>java.lang.Error</a:t>
+            </a:r>
+            <a:r>
+              <a:rPr lang="en-US" altLang="ja-JP" sz="1200" dirty="0" smtClean="0">
+                <a:solidFill>
+                  <a:schemeClr val="tx1"/>
+                </a:solidFill>
+              </a:rPr>
+              <a:t>, exclude</a:t>
+            </a:r>
+            <a:r>
+              <a:rPr lang="ja-JP" altLang="en-US" sz="1200" dirty="0" smtClean="0">
+                <a:solidFill>
+                  <a:schemeClr val="tx1"/>
+                </a:solidFill>
+              </a:rPr>
+              <a:t> </a:t>
+            </a:r>
+            <a:r>
+              <a:rPr lang="en-US" altLang="ja-JP" sz="1200" dirty="0" err="1" smtClean="0">
+                <a:solidFill>
+                  <a:schemeClr val="tx1"/>
+                </a:solidFill>
+              </a:rPr>
+              <a:t>NestedServletException</a:t>
+            </a:r>
+            <a:r>
+              <a:rPr lang="en-US" altLang="ja-JP" sz="1200" dirty="0" smtClean="0">
+                <a:solidFill>
+                  <a:schemeClr val="tx1"/>
+                </a:solidFill>
+              </a:rPr>
+              <a:t>.</a:t>
+            </a:r>
+            <a:endParaRPr lang="en-US" altLang="ja-JP" sz="1200" dirty="0">
+              <a:solidFill>
+                <a:schemeClr val="tx1"/>
+              </a:solidFill>
+            </a:endParaRPr>
+          </a:p>
+        </p:txBody>
+      </p:sp>
+      <p:sp>
+        <p:nvSpPr>
+          <p:cNvPr id="89" name="フローチャート : 他ページ結合子 75"/>
+          <p:cNvSpPr/>
+          <p:nvPr/>
+        </p:nvSpPr>
+        <p:spPr>
+          <a:xfrm rot="10800000">
+            <a:off x="4285506" y="2635003"/>
+            <a:ext cx="450460" cy="213912"/>
+          </a:xfrm>
+          <a:prstGeom prst="flowChartOffpageConnector">
+            <a:avLst/>
+          </a:prstGeom>
+          <a:gradFill>
+            <a:gsLst>
+              <a:gs pos="54000">
+                <a:srgbClr val="FFC000"/>
+              </a:gs>
+              <a:gs pos="0">
+                <a:srgbClr val="FFFF00"/>
+              </a:gs>
+              <a:gs pos="100000">
+                <a:srgbClr val="FFC000"/>
+              </a:gs>
+            </a:gsLst>
+          </a:gradFill>
+        </p:spPr>
+        <p:style>
+          <a:lnRef idx="1">
+            <a:schemeClr val="accent1"/>
+          </a:lnRef>
+          <a:fillRef idx="3">
+            <a:schemeClr val="accent1"/>
+          </a:fillRef>
+          <a:effectRef idx="2">
+            <a:schemeClr val="accent1"/>
+          </a:effectRef>
+          <a:fontRef idx="minor">
+            <a:schemeClr val="lt1"/>
+          </a:fontRef>
+        </p:style>
+        <p:txBody>
+          <a:bodyPr rtlCol="0" anchor="ctr"/>
+          <a:lstStyle/>
+          <a:p>
+            <a:pPr algn="ctr"/>
+            <a:endParaRPr kumimoji="1" lang="ja-JP" altLang="en-US" dirty="0"/>
+          </a:p>
+        </p:txBody>
+      </p:sp>
+      <p:cxnSp>
+        <p:nvCxnSpPr>
+          <p:cNvPr id="91" name="直線矢印コネクタ 13"/>
+          <p:cNvCxnSpPr>
+            <a:endCxn id="89" idx="2"/>
+          </p:cNvCxnSpPr>
+          <p:nvPr/>
+        </p:nvCxnSpPr>
+        <p:spPr>
+          <a:xfrm>
+            <a:off x="4510736" y="2207804"/>
+            <a:ext cx="0" cy="427199"/>
+          </a:xfrm>
+          <a:prstGeom prst="straightConnector1">
+            <a:avLst/>
+          </a:prstGeom>
+          <a:ln>
+            <a:prstDash val="dash"/>
+            <a:tailEnd type="arrow"/>
+          </a:ln>
+        </p:spPr>
+        <p:style>
+          <a:lnRef idx="2">
+            <a:schemeClr val="accent1"/>
+          </a:lnRef>
+          <a:fillRef idx="0">
+            <a:schemeClr val="accent1"/>
+          </a:fillRef>
+          <a:effectRef idx="1">
+            <a:schemeClr val="accent1"/>
+          </a:effectRef>
+          <a:fontRef idx="minor">
+            <a:schemeClr val="tx1"/>
+          </a:fontRef>
+        </p:style>
+      </p:cxnSp>
+      <p:sp>
+        <p:nvSpPr>
+          <p:cNvPr id="92" name="テキスト ボックス 91"/>
+          <p:cNvSpPr txBox="1"/>
+          <p:nvPr/>
+        </p:nvSpPr>
+        <p:spPr>
+          <a:xfrm>
+            <a:off x="4202936" y="2230847"/>
+            <a:ext cx="476250" cy="338554"/>
+          </a:xfrm>
+          <a:prstGeom prst="rect">
+            <a:avLst/>
+          </a:prstGeom>
+          <a:noFill/>
+        </p:spPr>
+        <p:txBody>
+          <a:bodyPr wrap="square" rtlCol="0">
+            <a:spAutoFit/>
+          </a:bodyPr>
+          <a:lstStyle/>
+          <a:p>
+            <a:r>
+              <a:rPr kumimoji="1" lang="en-US" altLang="ja-JP" sz="1600" dirty="0" smtClean="0">
+                <a:effectLst>
+                  <a:outerShdw blurRad="38100" dist="38100" dir="2700000" algn="tl">
+                    <a:srgbClr val="000000">
+                      <a:alpha val="43137"/>
+                    </a:srgbClr>
+                  </a:outerShdw>
+                </a:effectLst>
+              </a:rPr>
+              <a:t>4’</a:t>
+            </a:r>
+          </a:p>
+        </p:txBody>
+      </p:sp>
+      <p:sp>
+        <p:nvSpPr>
+          <p:cNvPr id="95" name="四角形吹き出し 94"/>
+          <p:cNvSpPr/>
+          <p:nvPr/>
+        </p:nvSpPr>
+        <p:spPr>
+          <a:xfrm>
+            <a:off x="6716745" y="2785573"/>
+            <a:ext cx="2189042" cy="968435"/>
+          </a:xfrm>
+          <a:prstGeom prst="wedgeRectCallout">
+            <a:avLst>
+              <a:gd name="adj1" fmla="val -74184"/>
+              <a:gd name="adj2" fmla="val -53817"/>
+            </a:avLst>
+          </a:prstGeom>
+          <a:ln w="19050"/>
+        </p:spPr>
+        <p:style>
+          <a:lnRef idx="2">
+            <a:schemeClr val="accent1"/>
+          </a:lnRef>
+          <a:fillRef idx="1">
+            <a:schemeClr val="lt1"/>
+          </a:fillRef>
+          <a:effectRef idx="0">
+            <a:schemeClr val="accent1"/>
+          </a:effectRef>
+          <a:fontRef idx="minor">
+            <a:schemeClr val="dk1"/>
+          </a:fontRef>
+        </p:style>
+        <p:txBody>
+          <a:bodyPr rtlCol="0" anchor="ctr"/>
+          <a:lstStyle/>
+          <a:p>
+            <a:r>
+              <a:rPr lang="en-US" altLang="ja-JP" sz="1200" dirty="0" smtClean="0">
+                <a:solidFill>
+                  <a:schemeClr val="tx1"/>
+                </a:solidFill>
+              </a:rPr>
+              <a:t>XxxError </a:t>
+            </a:r>
+            <a:r>
+              <a:rPr lang="en-US" altLang="ja-JP" sz="1200" dirty="0">
+                <a:solidFill>
+                  <a:schemeClr val="tx1"/>
+                </a:solidFill>
+              </a:rPr>
+              <a:t>is </a:t>
+            </a:r>
+            <a:r>
+              <a:rPr lang="en-US" altLang="ja-JP" sz="1200" dirty="0" smtClean="0">
+                <a:solidFill>
+                  <a:schemeClr val="tx1"/>
+                </a:solidFill>
+              </a:rPr>
+              <a:t>wrapped </a:t>
+            </a:r>
+            <a:r>
+              <a:rPr lang="en-US" altLang="ja-JP" sz="1200" dirty="0">
+                <a:solidFill>
+                  <a:schemeClr val="tx1"/>
+                </a:solidFill>
+              </a:rPr>
+              <a:t>in </a:t>
+            </a:r>
+            <a:r>
+              <a:rPr lang="en-US" altLang="ja-JP" sz="1200" dirty="0" err="1" smtClean="0">
+                <a:solidFill>
+                  <a:schemeClr val="tx1"/>
+                </a:solidFill>
+              </a:rPr>
+              <a:t>ServletException</a:t>
+            </a:r>
+            <a:r>
+              <a:rPr lang="en-US" altLang="ja-JP" sz="1200" dirty="0" smtClean="0">
+                <a:solidFill>
+                  <a:schemeClr val="tx1"/>
+                </a:solidFill>
+              </a:rPr>
+              <a:t>.</a:t>
+            </a:r>
+          </a:p>
+          <a:p>
+            <a:r>
+              <a:rPr kumimoji="1" lang="en-US" altLang="ja-JP" sz="1200" dirty="0" smtClean="0">
+                <a:solidFill>
+                  <a:schemeClr val="tx1"/>
+                </a:solidFill>
+              </a:rPr>
+              <a:t>If </a:t>
+            </a:r>
+            <a:r>
+              <a:rPr kumimoji="1" lang="en-US" altLang="ja-JP" sz="1200" dirty="0" err="1" smtClean="0">
+                <a:solidFill>
+                  <a:schemeClr val="tx1"/>
+                </a:solidFill>
+              </a:rPr>
+              <a:t>java.lang.Error</a:t>
+            </a:r>
+            <a:r>
+              <a:rPr kumimoji="1" lang="en-US" altLang="ja-JP" sz="1200" dirty="0" smtClean="0">
+                <a:solidFill>
+                  <a:schemeClr val="tx1"/>
+                </a:solidFill>
+              </a:rPr>
+              <a:t>, it is wrapped in  </a:t>
+            </a:r>
+            <a:r>
+              <a:rPr kumimoji="1" lang="en-US" altLang="ja-JP" sz="1200" dirty="0" err="1" smtClean="0">
+                <a:solidFill>
+                  <a:schemeClr val="tx1"/>
+                </a:solidFill>
+              </a:rPr>
+              <a:t>NestedServletException</a:t>
+            </a:r>
+            <a:r>
+              <a:rPr kumimoji="1" lang="en-US" altLang="ja-JP" sz="1200" dirty="0" smtClean="0">
+                <a:solidFill>
+                  <a:schemeClr val="tx1"/>
+                </a:solidFill>
+              </a:rPr>
+              <a:t>.</a:t>
+            </a:r>
+            <a:endParaRPr kumimoji="1" lang="ja-JP" altLang="en-US" sz="1200" dirty="0">
               <a:solidFill>
                 <a:schemeClr val="tx1"/>
               </a:solidFill>
@@ -25438,7 +25823,7 @@
         <p:spPr>
           <a:xfrm>
             <a:off x="3285609" y="1330905"/>
-            <a:ext cx="5446051" cy="1923283"/>
+            <a:ext cx="5446051" cy="2885414"/>
           </a:xfrm>
           <a:prstGeom prst="rect">
             <a:avLst/>
@@ -25518,69 +25903,13 @@
       </p:sp>
       <p:sp>
         <p:nvSpPr>
-          <p:cNvPr id="3" name="角丸四角形 2"/>
-          <p:cNvSpPr/>
-          <p:nvPr/>
-        </p:nvSpPr>
-        <p:spPr>
-          <a:xfrm>
-            <a:off x="3709782" y="1990600"/>
-            <a:ext cx="1594426" cy="876673"/>
-          </a:xfrm>
-          <a:prstGeom prst="roundRect">
-            <a:avLst/>
-          </a:prstGeom>
-        </p:spPr>
-        <p:style>
-          <a:lnRef idx="1">
-            <a:schemeClr val="accent1"/>
-          </a:lnRef>
-          <a:fillRef idx="3">
-            <a:schemeClr val="accent1"/>
-          </a:fillRef>
-          <a:effectRef idx="2">
-            <a:schemeClr val="accent1"/>
-          </a:effectRef>
-          <a:fontRef idx="minor">
-            <a:schemeClr val="lt1"/>
-          </a:fontRef>
-        </p:style>
-        <p:txBody>
-          <a:bodyPr rtlCol="0" anchor="ctr"/>
-          <a:lstStyle/>
-          <a:p>
-            <a:pPr algn="ctr"/>
-            <a:r>
-              <a:rPr lang="en-US" altLang="ja-JP" dirty="0"/>
-              <a:t>&lt;framework&gt;</a:t>
-            </a:r>
-          </a:p>
-          <a:p>
-            <a:pPr algn="ctr"/>
-            <a:r>
-              <a:rPr lang="en-US" altLang="ja-JP" dirty="0" smtClean="0"/>
-              <a:t>Dispatcher</a:t>
-            </a:r>
-          </a:p>
-          <a:p>
-            <a:pPr algn="ctr"/>
-            <a:r>
-              <a:rPr lang="en-US" altLang="ja-JP" dirty="0" smtClean="0"/>
-              <a:t>Servlet</a:t>
-            </a:r>
-            <a:endParaRPr kumimoji="1" lang="ja-JP" altLang="en-US" dirty="0"/>
-          </a:p>
-        </p:txBody>
-      </p:sp>
-      <p:sp>
-        <p:nvSpPr>
           <p:cNvPr id="37" name="角丸四角形 36"/>
           <p:cNvSpPr/>
           <p:nvPr/>
         </p:nvSpPr>
         <p:spPr>
           <a:xfrm>
-            <a:off x="6212004" y="3622749"/>
+            <a:off x="6689676" y="4578092"/>
             <a:ext cx="1945975" cy="1666405"/>
           </a:xfrm>
           <a:prstGeom prst="roundRect">
@@ -25638,55 +25967,13 @@
       </p:sp>
       <p:sp>
         <p:nvSpPr>
-          <p:cNvPr id="39" name="角丸四角形 38"/>
-          <p:cNvSpPr/>
-          <p:nvPr/>
-        </p:nvSpPr>
-        <p:spPr>
-          <a:xfrm>
-            <a:off x="6461804" y="2095052"/>
-            <a:ext cx="1440000" cy="772284"/>
-          </a:xfrm>
-          <a:prstGeom prst="roundRect">
-            <a:avLst/>
-          </a:prstGeom>
-        </p:spPr>
-        <p:style>
-          <a:lnRef idx="1">
-            <a:schemeClr val="accent1"/>
-          </a:lnRef>
-          <a:fillRef idx="3">
-            <a:schemeClr val="accent1"/>
-          </a:fillRef>
-          <a:effectRef idx="2">
-            <a:schemeClr val="accent1"/>
-          </a:effectRef>
-          <a:fontRef idx="minor">
-            <a:schemeClr val="lt1"/>
-          </a:fontRef>
-        </p:style>
-        <p:txBody>
-          <a:bodyPr rtlCol="0" anchor="ctr"/>
-          <a:lstStyle/>
-          <a:p>
-            <a:pPr algn="ctr"/>
-            <a:r>
-              <a:rPr kumimoji="1" lang="en-US" altLang="ja-JP" sz="1600" dirty="0" smtClean="0"/>
-              <a:t>Controller</a:t>
-            </a:r>
-            <a:endParaRPr kumimoji="1" lang="ja-JP" altLang="en-US" sz="1600" dirty="0"/>
-          </a:p>
-        </p:txBody>
-      </p:sp>
-      <p:sp>
-        <p:nvSpPr>
           <p:cNvPr id="45" name="角丸四角形 44"/>
           <p:cNvSpPr/>
           <p:nvPr/>
         </p:nvSpPr>
         <p:spPr>
           <a:xfrm>
-            <a:off x="6464991" y="3825226"/>
+            <a:off x="6942663" y="4780569"/>
             <a:ext cx="1440000" cy="360000"/>
           </a:xfrm>
           <a:prstGeom prst="roundRect">
@@ -25736,7 +26023,7 @@
         </p:nvSpPr>
         <p:spPr>
           <a:xfrm>
-            <a:off x="6464991" y="4486715"/>
+            <a:off x="6942663" y="5442058"/>
             <a:ext cx="1440000" cy="360000"/>
           </a:xfrm>
           <a:prstGeom prst="roundRect">
@@ -25818,16 +26105,75 @@
           </a:fontRef>
         </p:style>
       </p:cxnSp>
+      <p:sp>
+        <p:nvSpPr>
+          <p:cNvPr id="67" name="テキスト ボックス 66"/>
+          <p:cNvSpPr txBox="1"/>
+          <p:nvPr/>
+        </p:nvSpPr>
+        <p:spPr>
+          <a:xfrm>
+            <a:off x="2647661" y="167277"/>
+            <a:ext cx="476250" cy="307777"/>
+          </a:xfrm>
+          <a:prstGeom prst="rect">
+            <a:avLst/>
+          </a:prstGeom>
+          <a:noFill/>
+        </p:spPr>
+        <p:txBody>
+          <a:bodyPr wrap="square" rtlCol="0">
+            <a:spAutoFit/>
+          </a:bodyPr>
+          <a:lstStyle/>
+          <a:p>
+            <a:r>
+              <a:rPr lang="en-US" altLang="ja-JP" sz="1400" dirty="0"/>
+              <a:t>1</a:t>
+            </a:r>
+            <a:endParaRPr kumimoji="1" lang="en-US" altLang="ja-JP" sz="1400" dirty="0" smtClean="0"/>
+          </a:p>
+        </p:txBody>
+      </p:sp>
+      <p:sp>
+        <p:nvSpPr>
+          <p:cNvPr id="69" name="テキスト ボックス 68"/>
+          <p:cNvSpPr txBox="1"/>
+          <p:nvPr/>
+        </p:nvSpPr>
+        <p:spPr>
+          <a:xfrm>
+            <a:off x="4785215" y="1504576"/>
+            <a:ext cx="476250" cy="307777"/>
+          </a:xfrm>
+          <a:prstGeom prst="rect">
+            <a:avLst/>
+          </a:prstGeom>
+          <a:noFill/>
+        </p:spPr>
+        <p:txBody>
+          <a:bodyPr wrap="square" rtlCol="0">
+            <a:spAutoFit/>
+          </a:bodyPr>
+          <a:lstStyle/>
+          <a:p>
+            <a:r>
+              <a:rPr kumimoji="1" lang="en-US" altLang="ja-JP" sz="1400" dirty="0" smtClean="0"/>
+              <a:t>2</a:t>
+            </a:r>
+          </a:p>
+        </p:txBody>
+      </p:sp>
       <p:cxnSp>
         <p:nvCxnSpPr>
-          <p:cNvPr id="58" name="直線矢印コネクタ 13"/>
+          <p:cNvPr id="88" name="直線矢印コネクタ 13"/>
           <p:cNvCxnSpPr/>
           <p:nvPr/>
         </p:nvCxnSpPr>
         <p:spPr>
-          <a:xfrm flipV="1">
-            <a:off x="5313173" y="2283290"/>
-            <a:ext cx="1157596" cy="1"/>
+          <a:xfrm flipH="1">
+            <a:off x="2469161" y="816822"/>
+            <a:ext cx="546259" cy="1"/>
           </a:xfrm>
           <a:prstGeom prst="straightConnector1">
             <a:avLst/>
@@ -25860,13 +26206,13 @@
       </p:cxnSp>
       <p:sp>
         <p:nvSpPr>
-          <p:cNvPr id="67" name="テキスト ボックス 66"/>
+          <p:cNvPr id="95" name="テキスト ボックス 94"/>
           <p:cNvSpPr txBox="1"/>
           <p:nvPr/>
         </p:nvSpPr>
         <p:spPr>
           <a:xfrm>
-            <a:off x="2647661" y="167277"/>
+            <a:off x="2633177" y="827382"/>
             <a:ext cx="476250" cy="307777"/>
           </a:xfrm>
           <a:prstGeom prst="rect">
@@ -25882,164 +26228,7 @@
           <a:p>
             <a:r>
               <a:rPr lang="en-US" altLang="ja-JP" sz="1400" dirty="0"/>
-              <a:t>1</a:t>
-            </a:r>
-            <a:endParaRPr kumimoji="1" lang="en-US" altLang="ja-JP" sz="1400" dirty="0" smtClean="0"/>
-          </a:p>
-        </p:txBody>
-      </p:sp>
-      <p:sp>
-        <p:nvSpPr>
-          <p:cNvPr id="69" name="テキスト ボックス 68"/>
-          <p:cNvSpPr txBox="1"/>
-          <p:nvPr/>
-        </p:nvSpPr>
-        <p:spPr>
-          <a:xfrm>
-            <a:off x="4797915" y="1491876"/>
-            <a:ext cx="476250" cy="307777"/>
-          </a:xfrm>
-          <a:prstGeom prst="rect">
-            <a:avLst/>
-          </a:prstGeom>
-          <a:noFill/>
-        </p:spPr>
-        <p:txBody>
-          <a:bodyPr wrap="square" rtlCol="0">
-            <a:spAutoFit/>
-          </a:bodyPr>
-          <a:lstStyle/>
-          <a:p>
-            <a:r>
-              <a:rPr kumimoji="1" lang="en-US" altLang="ja-JP" sz="1400" dirty="0" smtClean="0"/>
-              <a:t>2</a:t>
-            </a:r>
-          </a:p>
-        </p:txBody>
-      </p:sp>
-      <p:sp>
-        <p:nvSpPr>
-          <p:cNvPr id="70" name="テキスト ボックス 69"/>
-          <p:cNvSpPr txBox="1"/>
-          <p:nvPr/>
-        </p:nvSpPr>
-        <p:spPr>
-          <a:xfrm>
-            <a:off x="5650305" y="1941995"/>
-            <a:ext cx="476250" cy="307777"/>
-          </a:xfrm>
-          <a:prstGeom prst="rect">
-            <a:avLst/>
-          </a:prstGeom>
-          <a:noFill/>
-        </p:spPr>
-        <p:txBody>
-          <a:bodyPr wrap="square" rtlCol="0">
-            <a:spAutoFit/>
-          </a:bodyPr>
-          <a:lstStyle/>
-          <a:p>
-            <a:r>
-              <a:rPr kumimoji="1" lang="en-US" altLang="ja-JP" sz="1400" dirty="0" smtClean="0"/>
-              <a:t>3</a:t>
-            </a:r>
-          </a:p>
-        </p:txBody>
-      </p:sp>
-      <p:sp>
-        <p:nvSpPr>
-          <p:cNvPr id="71" name="テキスト ボックス 70"/>
-          <p:cNvSpPr txBox="1"/>
-          <p:nvPr/>
-        </p:nvSpPr>
-        <p:spPr>
-          <a:xfrm>
-            <a:off x="7509486" y="2867336"/>
-            <a:ext cx="562542" cy="307777"/>
-          </a:xfrm>
-          <a:prstGeom prst="rect">
-            <a:avLst/>
-          </a:prstGeom>
-          <a:noFill/>
-        </p:spPr>
-        <p:txBody>
-          <a:bodyPr wrap="square" rtlCol="0">
-            <a:spAutoFit/>
-          </a:bodyPr>
-          <a:lstStyle/>
-          <a:p>
-            <a:r>
-              <a:rPr kumimoji="1" lang="en-US" altLang="ja-JP" sz="1400" dirty="0" smtClean="0"/>
-              <a:t>4</a:t>
-            </a:r>
-          </a:p>
-        </p:txBody>
-      </p:sp>
-      <p:cxnSp>
-        <p:nvCxnSpPr>
-          <p:cNvPr id="88" name="直線矢印コネクタ 13"/>
-          <p:cNvCxnSpPr/>
-          <p:nvPr/>
-        </p:nvCxnSpPr>
-        <p:spPr>
-          <a:xfrm flipH="1">
-            <a:off x="2469161" y="816822"/>
-            <a:ext cx="546259" cy="1"/>
-          </a:xfrm>
-          <a:prstGeom prst="straightConnector1">
-            <a:avLst/>
-          </a:prstGeom>
-          <a:ln>
-            <a:solidFill>
-              <a:schemeClr val="tx1">
-                <a:lumMod val="50000"/>
-                <a:lumOff val="50000"/>
-              </a:schemeClr>
-            </a:solidFill>
-            <a:headEnd type="none"/>
-            <a:tailEnd type="arrow"/>
-          </a:ln>
-        </p:spPr>
-        <p:style>
-          <a:lnRef idx="2">
-            <a:schemeClr val="accent1"/>
-          </a:lnRef>
-          <a:fillRef idx="0">
-            <a:schemeClr val="accent1"/>
-          </a:fillRef>
-          <a:effectRef idx="1">
-            <a:schemeClr val="accent1"/>
-          </a:effectRef>
-          <a:fontRef idx="minor">
-            <a:schemeClr val="tx1"/>
-          </a:fontRef>
-        </p:style>
-      </p:cxnSp>
-      <p:sp>
-        <p:nvSpPr>
-          <p:cNvPr id="95" name="テキスト ボックス 94"/>
-          <p:cNvSpPr txBox="1"/>
-          <p:nvPr/>
-        </p:nvSpPr>
-        <p:spPr>
-          <a:xfrm>
-            <a:off x="2633177" y="827382"/>
-            <a:ext cx="476250" cy="307777"/>
-          </a:xfrm>
-          <a:prstGeom prst="rect">
-            <a:avLst/>
-          </a:prstGeom>
-          <a:noFill/>
-        </p:spPr>
-        <p:txBody>
-          <a:bodyPr wrap="square" rtlCol="0">
-            <a:spAutoFit/>
-          </a:bodyPr>
-          <a:lstStyle/>
-          <a:p>
-            <a:r>
-              <a:rPr lang="en-US" altLang="ja-JP" sz="1400" dirty="0" smtClean="0"/>
-              <a:t>8</a:t>
+              <a:t>9</a:t>
             </a:r>
             <a:endParaRPr kumimoji="1" lang="en-US" altLang="ja-JP" sz="1400" dirty="0" smtClean="0"/>
           </a:p>
@@ -26053,8 +26242,8 @@
         </p:nvCxnSpPr>
         <p:spPr>
           <a:xfrm flipV="1">
-            <a:off x="6868763" y="2867336"/>
-            <a:ext cx="0" cy="957891"/>
+            <a:off x="7397235" y="2677588"/>
+            <a:ext cx="0" cy="2102981"/>
           </a:xfrm>
           <a:prstGeom prst="straightConnector1">
             <a:avLst/>
@@ -26093,7 +26282,7 @@
         </p:nvSpPr>
         <p:spPr>
           <a:xfrm>
-            <a:off x="3301251" y="3442545"/>
+            <a:off x="3301251" y="4397888"/>
             <a:ext cx="5430410" cy="2178303"/>
           </a:xfrm>
           <a:prstGeom prst="rect">
@@ -26169,8 +26358,8 @@
         </p:nvCxnSpPr>
         <p:spPr>
           <a:xfrm>
-            <a:off x="7470631" y="2867336"/>
-            <a:ext cx="0" cy="957890"/>
+            <a:off x="7948303" y="2677588"/>
+            <a:ext cx="0" cy="2102981"/>
           </a:xfrm>
           <a:prstGeom prst="straightConnector1">
             <a:avLst/>
@@ -26183,88 +26372,6 @@
               </a:schemeClr>
             </a:solidFill>
             <a:headEnd type="none"/>
-            <a:tailEnd type="arrow"/>
-          </a:ln>
-        </p:spPr>
-        <p:style>
-          <a:lnRef idx="2">
-            <a:schemeClr val="accent1"/>
-          </a:lnRef>
-          <a:fillRef idx="0">
-            <a:schemeClr val="accent1"/>
-          </a:fillRef>
-          <a:effectRef idx="1">
-            <a:schemeClr val="accent1"/>
-          </a:effectRef>
-          <a:fontRef idx="minor">
-            <a:schemeClr val="tx1"/>
-          </a:fontRef>
-        </p:style>
-      </p:cxnSp>
-      <p:cxnSp>
-        <p:nvCxnSpPr>
-          <p:cNvPr id="64" name="直線矢印コネクタ 13"/>
-          <p:cNvCxnSpPr/>
-          <p:nvPr/>
-        </p:nvCxnSpPr>
-        <p:spPr>
-          <a:xfrm flipH="1">
-            <a:off x="5288560" y="2652835"/>
-            <a:ext cx="1152071" cy="0"/>
-          </a:xfrm>
-          <a:prstGeom prst="straightConnector1">
-            <a:avLst/>
-          </a:prstGeom>
-          <a:ln>
-            <a:solidFill>
-              <a:schemeClr val="tx2">
-                <a:lumMod val="60000"/>
-                <a:lumOff val="40000"/>
-              </a:schemeClr>
-            </a:solidFill>
-            <a:prstDash val="dash"/>
-            <a:tailEnd type="arrow"/>
-          </a:ln>
-        </p:spPr>
-        <p:style>
-          <a:lnRef idx="2">
-            <a:schemeClr val="accent1"/>
-          </a:lnRef>
-          <a:fillRef idx="0">
-            <a:schemeClr val="accent1"/>
-          </a:fillRef>
-          <a:effectRef idx="1">
-            <a:schemeClr val="accent1"/>
-          </a:effectRef>
-          <a:fontRef idx="minor">
-            <a:schemeClr val="tx1"/>
-          </a:fontRef>
-        </p:style>
-      </p:cxnSp>
-      <p:cxnSp>
-        <p:nvCxnSpPr>
-          <p:cNvPr id="49" name="直線矢印コネクタ 13"/>
-          <p:cNvCxnSpPr>
-            <a:endCxn id="55" idx="2"/>
-          </p:cNvCxnSpPr>
-          <p:nvPr/>
-        </p:nvCxnSpPr>
-        <p:spPr>
-          <a:xfrm flipV="1">
-            <a:off x="4268999" y="1126660"/>
-            <a:ext cx="0" cy="837326"/>
-          </a:xfrm>
-          <a:prstGeom prst="straightConnector1">
-            <a:avLst/>
-          </a:prstGeom>
-          <a:ln>
-            <a:solidFill>
-              <a:schemeClr val="tx2">
-                <a:lumMod val="60000"/>
-                <a:lumOff val="40000"/>
-              </a:schemeClr>
-            </a:solidFill>
-            <a:prstDash val="dash"/>
             <a:tailEnd type="arrow"/>
           </a:ln>
         </p:spPr>
@@ -26342,12 +26449,12 @@
         </p:nvSpPr>
         <p:spPr>
           <a:xfrm>
-            <a:off x="618960" y="1434201"/>
+            <a:off x="578016" y="1461497"/>
             <a:ext cx="2922494" cy="2299550"/>
           </a:xfrm>
           <a:prstGeom prst="borderCallout2">
             <a:avLst>
-              <a:gd name="adj1" fmla="val -4966"/>
+              <a:gd name="adj1" fmla="val -1405"/>
               <a:gd name="adj2" fmla="val 88546"/>
               <a:gd name="adj3" fmla="val -22734"/>
               <a:gd name="adj4" fmla="val 107718"/>
@@ -26386,7 +26493,7 @@
           <a:lstStyle/>
           <a:p>
             <a:r>
-              <a:rPr lang="en-US" altLang="ja-JP" sz="1400" b="1" dirty="0" smtClean="0">
+              <a:rPr lang="en-US" altLang="ja-JP" sz="1400" b="1" dirty="0">
                 <a:solidFill>
                   <a:schemeClr val="tx1">
                     <a:lumMod val="65000"/>
@@ -26394,8 +26501,16 @@
                   </a:schemeClr>
                 </a:solidFill>
               </a:rPr>
-              <a:t>7</a:t>
-            </a:r>
+              <a:t>8</a:t>
+            </a:r>
+            <a:endParaRPr lang="en-US" altLang="ja-JP" sz="1400" b="1" dirty="0" smtClean="0">
+              <a:solidFill>
+                <a:schemeClr val="tx1">
+                  <a:lumMod val="65000"/>
+                  <a:lumOff val="35000"/>
+                </a:schemeClr>
+              </a:solidFill>
+            </a:endParaRPr>
           </a:p>
           <a:p>
             <a:r>
@@ -26574,213 +26689,6 @@
           </a:p>
         </p:txBody>
       </p:sp>
-      <p:sp>
-        <p:nvSpPr>
-          <p:cNvPr id="41" name="フローチャート : 他ページ結合子 40"/>
-          <p:cNvSpPr/>
-          <p:nvPr/>
-        </p:nvSpPr>
-        <p:spPr>
-          <a:xfrm>
-            <a:off x="4899459" y="2542446"/>
-            <a:ext cx="374706" cy="270285"/>
-          </a:xfrm>
-          <a:prstGeom prst="flowChartOffpageConnector">
-            <a:avLst/>
-          </a:prstGeom>
-          <a:gradFill>
-            <a:gsLst>
-              <a:gs pos="54000">
-                <a:srgbClr val="FFC000"/>
-              </a:gs>
-              <a:gs pos="0">
-                <a:srgbClr val="FFFF00"/>
-              </a:gs>
-              <a:gs pos="100000">
-                <a:srgbClr val="FFC000"/>
-              </a:gs>
-            </a:gsLst>
-          </a:gradFill>
-        </p:spPr>
-        <p:style>
-          <a:lnRef idx="1">
-            <a:schemeClr val="accent1"/>
-          </a:lnRef>
-          <a:fillRef idx="3">
-            <a:schemeClr val="accent1"/>
-          </a:fillRef>
-          <a:effectRef idx="2">
-            <a:schemeClr val="accent1"/>
-          </a:effectRef>
-          <a:fontRef idx="minor">
-            <a:schemeClr val="lt1"/>
-          </a:fontRef>
-        </p:style>
-        <p:txBody>
-          <a:bodyPr rtlCol="0" anchor="ctr"/>
-          <a:lstStyle/>
-          <a:p>
-            <a:pPr algn="ctr"/>
-            <a:endParaRPr kumimoji="1" lang="ja-JP" altLang="en-US" dirty="0"/>
-          </a:p>
-        </p:txBody>
-      </p:sp>
-      <p:sp>
-        <p:nvSpPr>
-          <p:cNvPr id="50" name="四角形吹き出し 49"/>
-          <p:cNvSpPr/>
-          <p:nvPr/>
-        </p:nvSpPr>
-        <p:spPr>
-          <a:xfrm>
-            <a:off x="4320663" y="2939277"/>
-            <a:ext cx="2065971" cy="683472"/>
-          </a:xfrm>
-          <a:prstGeom prst="wedgeRectCallout">
-            <a:avLst>
-              <a:gd name="adj1" fmla="val -11969"/>
-              <a:gd name="adj2" fmla="val -75230"/>
-            </a:avLst>
-          </a:prstGeom>
-          <a:ln w="19050">
-            <a:solidFill>
-              <a:schemeClr val="tx1">
-                <a:lumMod val="50000"/>
-                <a:lumOff val="50000"/>
-              </a:schemeClr>
-            </a:solidFill>
-          </a:ln>
-        </p:spPr>
-        <p:style>
-          <a:lnRef idx="2">
-            <a:schemeClr val="accent1"/>
-          </a:lnRef>
-          <a:fillRef idx="1">
-            <a:schemeClr val="lt1"/>
-          </a:fillRef>
-          <a:effectRef idx="0">
-            <a:schemeClr val="accent1"/>
-          </a:effectRef>
-          <a:fontRef idx="minor">
-            <a:schemeClr val="dk1"/>
-          </a:fontRef>
-        </p:style>
-        <p:txBody>
-          <a:bodyPr rtlCol="0" anchor="t"/>
-          <a:lstStyle/>
-          <a:p>
-            <a:r>
-              <a:rPr lang="en-US" altLang="ja-JP" sz="1400" dirty="0" smtClean="0"/>
-              <a:t>6</a:t>
-            </a:r>
-          </a:p>
-          <a:p>
-            <a:r>
-              <a:rPr lang="en-US" altLang="ja-JP" sz="1400" dirty="0" smtClean="0"/>
-              <a:t>Wrap </a:t>
-            </a:r>
-            <a:r>
-              <a:rPr lang="en-US" altLang="ja-JP" sz="1400" dirty="0"/>
-              <a:t>to </a:t>
-            </a:r>
-            <a:r>
-              <a:rPr lang="en-US" altLang="ja-JP" sz="1400" dirty="0" err="1" smtClean="0"/>
-              <a:t>NestedServletException</a:t>
-            </a:r>
-            <a:endParaRPr lang="en-US" altLang="ja-JP" sz="1400" dirty="0"/>
-          </a:p>
-        </p:txBody>
-      </p:sp>
-      <p:sp>
-        <p:nvSpPr>
-          <p:cNvPr id="57" name="テキスト ボックス 56"/>
-          <p:cNvSpPr txBox="1"/>
-          <p:nvPr/>
-        </p:nvSpPr>
-        <p:spPr>
-          <a:xfrm>
-            <a:off x="6522446" y="2961495"/>
-            <a:ext cx="476250" cy="307777"/>
-          </a:xfrm>
-          <a:prstGeom prst="rect">
-            <a:avLst/>
-          </a:prstGeom>
-          <a:noFill/>
-        </p:spPr>
-        <p:txBody>
-          <a:bodyPr wrap="square" rtlCol="0">
-            <a:spAutoFit/>
-          </a:bodyPr>
-          <a:lstStyle/>
-          <a:p>
-            <a:r>
-              <a:rPr lang="en-US" altLang="ja-JP" sz="1400" dirty="0" smtClean="0"/>
-              <a:t>5’</a:t>
-            </a:r>
-            <a:endParaRPr kumimoji="1" lang="en-US" altLang="ja-JP" sz="1400" dirty="0" smtClean="0"/>
-          </a:p>
-        </p:txBody>
-      </p:sp>
-      <p:sp>
-        <p:nvSpPr>
-          <p:cNvPr id="59" name="テキスト ボックス 58"/>
-          <p:cNvSpPr txBox="1"/>
-          <p:nvPr/>
-        </p:nvSpPr>
-        <p:spPr>
-          <a:xfrm>
-            <a:off x="5643657" y="2352697"/>
-            <a:ext cx="476250" cy="307777"/>
-          </a:xfrm>
-          <a:prstGeom prst="rect">
-            <a:avLst/>
-          </a:prstGeom>
-          <a:noFill/>
-        </p:spPr>
-        <p:txBody>
-          <a:bodyPr wrap="square" rtlCol="0">
-            <a:spAutoFit/>
-          </a:bodyPr>
-          <a:lstStyle/>
-          <a:p>
-            <a:r>
-              <a:rPr lang="en-US" altLang="ja-JP" sz="1400" dirty="0" smtClean="0"/>
-              <a:t>5’</a:t>
-            </a:r>
-            <a:endParaRPr kumimoji="1" lang="en-US" altLang="ja-JP" sz="1400" dirty="0" smtClean="0"/>
-          </a:p>
-        </p:txBody>
-      </p:sp>
-      <p:sp>
-        <p:nvSpPr>
-          <p:cNvPr id="60" name="テキスト ボックス 59"/>
-          <p:cNvSpPr txBox="1"/>
-          <p:nvPr/>
-        </p:nvSpPr>
-        <p:spPr>
-          <a:xfrm>
-            <a:off x="3930463" y="1434201"/>
-            <a:ext cx="476250" cy="307777"/>
-          </a:xfrm>
-          <a:prstGeom prst="rect">
-            <a:avLst/>
-          </a:prstGeom>
-          <a:noFill/>
-        </p:spPr>
-        <p:txBody>
-          <a:bodyPr wrap="square" rtlCol="0">
-            <a:spAutoFit/>
-          </a:bodyPr>
-          <a:lstStyle/>
-          <a:p>
-            <a:r>
-              <a:rPr lang="en-US" altLang="ja-JP" sz="1400" dirty="0" smtClean="0"/>
-              <a:t>6’</a:t>
-            </a:r>
-            <a:endParaRPr kumimoji="1" lang="en-US" altLang="ja-JP" sz="1400" dirty="0" smtClean="0"/>
-          </a:p>
-        </p:txBody>
-      </p:sp>
       <p:grpSp>
         <p:nvGrpSpPr>
           <p:cNvPr id="54" name="グループ化 53"/>
@@ -26789,7 +26697,7 @@
         </p:nvGrpSpPr>
         <p:grpSpPr>
           <a:xfrm>
-            <a:off x="5675261" y="3733751"/>
+            <a:off x="6002809" y="4689094"/>
             <a:ext cx="1112438" cy="555462"/>
             <a:chOff x="5675261" y="3733751"/>
             <a:chExt cx="1112438" cy="555462"/>
@@ -26898,7 +26806,7 @@
         </p:nvSpPr>
         <p:spPr>
           <a:xfrm>
-            <a:off x="4105088" y="3948407"/>
+            <a:off x="4407236" y="4903750"/>
             <a:ext cx="1475069" cy="589108"/>
           </a:xfrm>
           <a:prstGeom prst="wedgeRectCallout">
@@ -26953,6 +26861,846 @@
           </a:p>
         </p:txBody>
       </p:sp>
+      <p:sp>
+        <p:nvSpPr>
+          <p:cNvPr id="94" name="角丸四角形 93"/>
+          <p:cNvSpPr/>
+          <p:nvPr/>
+        </p:nvSpPr>
+        <p:spPr>
+          <a:xfrm>
+            <a:off x="3582781" y="1990601"/>
+            <a:ext cx="1955003" cy="774556"/>
+          </a:xfrm>
+          <a:prstGeom prst="roundRect">
+            <a:avLst/>
+          </a:prstGeom>
+        </p:spPr>
+        <p:style>
+          <a:lnRef idx="1">
+            <a:schemeClr val="accent1"/>
+          </a:lnRef>
+          <a:fillRef idx="3">
+            <a:schemeClr val="accent1"/>
+          </a:fillRef>
+          <a:effectRef idx="2">
+            <a:schemeClr val="accent1"/>
+          </a:effectRef>
+          <a:fontRef idx="minor">
+            <a:schemeClr val="lt1"/>
+          </a:fontRef>
+        </p:style>
+        <p:txBody>
+          <a:bodyPr rtlCol="0" anchor="ctr"/>
+          <a:lstStyle/>
+          <a:p>
+            <a:pPr algn="ctr"/>
+            <a:r>
+              <a:rPr lang="en-US" altLang="ja-JP" dirty="0" smtClean="0"/>
+              <a:t>&lt;framework&gt;</a:t>
+            </a:r>
+          </a:p>
+          <a:p>
+            <a:pPr algn="ctr"/>
+            <a:r>
+              <a:rPr lang="en-US" altLang="ja-JP" dirty="0" smtClean="0"/>
+              <a:t>Dispatcher</a:t>
+            </a:r>
+          </a:p>
+          <a:p>
+            <a:pPr algn="ctr"/>
+            <a:r>
+              <a:rPr lang="en-US" altLang="ja-JP" dirty="0" smtClean="0"/>
+              <a:t>Servlet</a:t>
+            </a:r>
+            <a:endParaRPr kumimoji="1" lang="ja-JP" altLang="en-US" dirty="0"/>
+          </a:p>
+        </p:txBody>
+      </p:sp>
+      <p:sp>
+        <p:nvSpPr>
+          <p:cNvPr id="96" name="角丸四角形 95"/>
+          <p:cNvSpPr/>
+          <p:nvPr/>
+        </p:nvSpPr>
+        <p:spPr>
+          <a:xfrm>
+            <a:off x="6939476" y="2115665"/>
+            <a:ext cx="1440000" cy="561923"/>
+          </a:xfrm>
+          <a:prstGeom prst="roundRect">
+            <a:avLst/>
+          </a:prstGeom>
+        </p:spPr>
+        <p:style>
+          <a:lnRef idx="1">
+            <a:schemeClr val="accent1"/>
+          </a:lnRef>
+          <a:fillRef idx="3">
+            <a:schemeClr val="accent1"/>
+          </a:fillRef>
+          <a:effectRef idx="2">
+            <a:schemeClr val="accent1"/>
+          </a:effectRef>
+          <a:fontRef idx="minor">
+            <a:schemeClr val="lt1"/>
+          </a:fontRef>
+        </p:style>
+        <p:txBody>
+          <a:bodyPr rtlCol="0" anchor="ctr"/>
+          <a:lstStyle/>
+          <a:p>
+            <a:pPr algn="ctr"/>
+            <a:r>
+              <a:rPr kumimoji="1" lang="en-US" altLang="ja-JP" sz="1600" dirty="0" smtClean="0"/>
+              <a:t>Controller</a:t>
+            </a:r>
+            <a:endParaRPr kumimoji="1" lang="ja-JP" altLang="en-US" sz="1600" dirty="0"/>
+          </a:p>
+        </p:txBody>
+      </p:sp>
+      <p:cxnSp>
+        <p:nvCxnSpPr>
+          <p:cNvPr id="98" name="直線矢印コネクタ 13"/>
+          <p:cNvCxnSpPr/>
+          <p:nvPr/>
+        </p:nvCxnSpPr>
+        <p:spPr>
+          <a:xfrm>
+            <a:off x="5555714" y="2249376"/>
+            <a:ext cx="1383762" cy="0"/>
+          </a:xfrm>
+          <a:prstGeom prst="straightConnector1">
+            <a:avLst/>
+          </a:prstGeom>
+          <a:ln>
+            <a:solidFill>
+              <a:schemeClr val="tx1">
+                <a:lumMod val="50000"/>
+                <a:lumOff val="50000"/>
+              </a:schemeClr>
+            </a:solidFill>
+            <a:headEnd type="none"/>
+            <a:tailEnd type="arrow"/>
+          </a:ln>
+        </p:spPr>
+        <p:style>
+          <a:lnRef idx="2">
+            <a:schemeClr val="accent1"/>
+          </a:lnRef>
+          <a:fillRef idx="0">
+            <a:schemeClr val="accent1"/>
+          </a:fillRef>
+          <a:effectRef idx="1">
+            <a:schemeClr val="accent1"/>
+          </a:effectRef>
+          <a:fontRef idx="minor">
+            <a:schemeClr val="tx1"/>
+          </a:fontRef>
+        </p:style>
+      </p:cxnSp>
+      <p:sp>
+        <p:nvSpPr>
+          <p:cNvPr id="99" name="テキスト ボックス 98"/>
+          <p:cNvSpPr txBox="1"/>
+          <p:nvPr/>
+        </p:nvSpPr>
+        <p:spPr>
+          <a:xfrm>
+            <a:off x="6048609" y="1980095"/>
+            <a:ext cx="476250" cy="307777"/>
+          </a:xfrm>
+          <a:prstGeom prst="rect">
+            <a:avLst/>
+          </a:prstGeom>
+          <a:noFill/>
+        </p:spPr>
+        <p:txBody>
+          <a:bodyPr wrap="square" rtlCol="0">
+            <a:spAutoFit/>
+          </a:bodyPr>
+          <a:lstStyle/>
+          <a:p>
+            <a:r>
+              <a:rPr kumimoji="1" lang="en-US" altLang="ja-JP" sz="1400" dirty="0" smtClean="0"/>
+              <a:t>3</a:t>
+            </a:r>
+          </a:p>
+        </p:txBody>
+      </p:sp>
+      <p:sp>
+        <p:nvSpPr>
+          <p:cNvPr id="100" name="テキスト ボックス 99"/>
+          <p:cNvSpPr txBox="1"/>
+          <p:nvPr/>
+        </p:nvSpPr>
+        <p:spPr>
+          <a:xfrm>
+            <a:off x="4604971" y="2776127"/>
+            <a:ext cx="476250" cy="307777"/>
+          </a:xfrm>
+          <a:prstGeom prst="rect">
+            <a:avLst/>
+          </a:prstGeom>
+          <a:noFill/>
+        </p:spPr>
+        <p:txBody>
+          <a:bodyPr wrap="square" rtlCol="0">
+            <a:spAutoFit/>
+          </a:bodyPr>
+          <a:lstStyle/>
+          <a:p>
+            <a:r>
+              <a:rPr kumimoji="1" lang="en-US" altLang="ja-JP" sz="1400" dirty="0" smtClean="0"/>
+              <a:t>6’</a:t>
+            </a:r>
+          </a:p>
+        </p:txBody>
+      </p:sp>
+      <p:sp>
+        <p:nvSpPr>
+          <p:cNvPr id="102" name="テキスト ボックス 101"/>
+          <p:cNvSpPr txBox="1"/>
+          <p:nvPr/>
+        </p:nvSpPr>
+        <p:spPr>
+          <a:xfrm>
+            <a:off x="7935603" y="3821318"/>
+            <a:ext cx="476250" cy="307777"/>
+          </a:xfrm>
+          <a:prstGeom prst="rect">
+            <a:avLst/>
+          </a:prstGeom>
+          <a:noFill/>
+        </p:spPr>
+        <p:txBody>
+          <a:bodyPr wrap="square" rtlCol="0">
+            <a:spAutoFit/>
+          </a:bodyPr>
+          <a:lstStyle/>
+          <a:p>
+            <a:r>
+              <a:rPr kumimoji="1" lang="en-US" altLang="ja-JP" sz="1400" dirty="0" smtClean="0"/>
+              <a:t>4</a:t>
+            </a:r>
+          </a:p>
+        </p:txBody>
+      </p:sp>
+      <p:sp>
+        <p:nvSpPr>
+          <p:cNvPr id="103" name="角丸四角形 102"/>
+          <p:cNvSpPr/>
+          <p:nvPr/>
+        </p:nvSpPr>
+        <p:spPr>
+          <a:xfrm>
+            <a:off x="3618641" y="3230175"/>
+            <a:ext cx="1955003" cy="803578"/>
+          </a:xfrm>
+          <a:prstGeom prst="roundRect">
+            <a:avLst/>
+          </a:prstGeom>
+        </p:spPr>
+        <p:style>
+          <a:lnRef idx="1">
+            <a:schemeClr val="accent1"/>
+          </a:lnRef>
+          <a:fillRef idx="3">
+            <a:schemeClr val="accent1"/>
+          </a:fillRef>
+          <a:effectRef idx="2">
+            <a:schemeClr val="accent1"/>
+          </a:effectRef>
+          <a:fontRef idx="minor">
+            <a:schemeClr val="lt1"/>
+          </a:fontRef>
+        </p:style>
+        <p:txBody>
+          <a:bodyPr rtlCol="0" anchor="ctr"/>
+          <a:lstStyle/>
+          <a:p>
+            <a:pPr algn="ctr"/>
+            <a:r>
+              <a:rPr lang="en-US" altLang="ja-JP" sz="1400" b="1" dirty="0" smtClean="0"/>
+              <a:t>&lt;framework&gt;</a:t>
+            </a:r>
+          </a:p>
+          <a:p>
+            <a:pPr algn="ctr"/>
+            <a:r>
+              <a:rPr lang="en-US" altLang="ja-JP" sz="1400" b="1" dirty="0" smtClean="0"/>
+              <a:t>SystemException</a:t>
+            </a:r>
+          </a:p>
+          <a:p>
+            <a:pPr algn="ctr"/>
+            <a:r>
+              <a:rPr lang="en-US" altLang="ja-JP" sz="1400" b="1" dirty="0" smtClean="0"/>
+              <a:t>Resolver</a:t>
+            </a:r>
+            <a:endParaRPr kumimoji="1" lang="ja-JP" altLang="en-US" sz="1400" b="1" dirty="0"/>
+          </a:p>
+        </p:txBody>
+      </p:sp>
+      <p:sp>
+        <p:nvSpPr>
+          <p:cNvPr id="104" name="フローチャート : 他ページ結合子 58"/>
+          <p:cNvSpPr/>
+          <p:nvPr/>
+        </p:nvSpPr>
+        <p:spPr>
+          <a:xfrm rot="10800000">
+            <a:off x="4745542" y="3025712"/>
+            <a:ext cx="384398" cy="307655"/>
+          </a:xfrm>
+          <a:prstGeom prst="flowChartOffpageConnector">
+            <a:avLst/>
+          </a:prstGeom>
+          <a:gradFill>
+            <a:gsLst>
+              <a:gs pos="54000">
+                <a:srgbClr val="FFC000"/>
+              </a:gs>
+              <a:gs pos="0">
+                <a:srgbClr val="FFFF00"/>
+              </a:gs>
+              <a:gs pos="100000">
+                <a:srgbClr val="FFC000"/>
+              </a:gs>
+            </a:gsLst>
+          </a:gradFill>
+        </p:spPr>
+        <p:style>
+          <a:lnRef idx="1">
+            <a:schemeClr val="accent1"/>
+          </a:lnRef>
+          <a:fillRef idx="3">
+            <a:schemeClr val="accent1"/>
+          </a:fillRef>
+          <a:effectRef idx="2">
+            <a:schemeClr val="accent1"/>
+          </a:effectRef>
+          <a:fontRef idx="minor">
+            <a:schemeClr val="lt1"/>
+          </a:fontRef>
+        </p:style>
+        <p:txBody>
+          <a:bodyPr rtlCol="0" anchor="ctr"/>
+          <a:lstStyle/>
+          <a:p>
+            <a:pPr algn="ctr"/>
+            <a:endParaRPr kumimoji="1" lang="ja-JP" altLang="en-US" dirty="0"/>
+          </a:p>
+        </p:txBody>
+      </p:sp>
+      <p:cxnSp>
+        <p:nvCxnSpPr>
+          <p:cNvPr id="105" name="直線矢印コネクタ 13"/>
+          <p:cNvCxnSpPr>
+            <a:endCxn id="63" idx="3"/>
+          </p:cNvCxnSpPr>
+          <p:nvPr/>
+        </p:nvCxnSpPr>
+        <p:spPr>
+          <a:xfrm flipH="1">
+            <a:off x="5509480" y="2530676"/>
+            <a:ext cx="1433184" cy="15094"/>
+          </a:xfrm>
+          <a:prstGeom prst="straightConnector1">
+            <a:avLst/>
+          </a:prstGeom>
+          <a:ln>
+            <a:solidFill>
+              <a:schemeClr val="tx2">
+                <a:lumMod val="60000"/>
+                <a:lumOff val="40000"/>
+              </a:schemeClr>
+            </a:solidFill>
+            <a:prstDash val="dash"/>
+            <a:tailEnd type="arrow"/>
+          </a:ln>
+        </p:spPr>
+        <p:style>
+          <a:lnRef idx="2">
+            <a:schemeClr val="accent1"/>
+          </a:lnRef>
+          <a:fillRef idx="0">
+            <a:schemeClr val="accent1"/>
+          </a:fillRef>
+          <a:effectRef idx="1">
+            <a:schemeClr val="accent1"/>
+          </a:effectRef>
+          <a:fontRef idx="minor">
+            <a:schemeClr val="tx1"/>
+          </a:fontRef>
+        </p:style>
+      </p:cxnSp>
+      <p:sp>
+        <p:nvSpPr>
+          <p:cNvPr id="108" name="テキスト ボックス 107"/>
+          <p:cNvSpPr txBox="1"/>
+          <p:nvPr/>
+        </p:nvSpPr>
+        <p:spPr>
+          <a:xfrm>
+            <a:off x="7103831" y="3821317"/>
+            <a:ext cx="476250" cy="307777"/>
+          </a:xfrm>
+          <a:prstGeom prst="rect">
+            <a:avLst/>
+          </a:prstGeom>
+          <a:noFill/>
+        </p:spPr>
+        <p:txBody>
+          <a:bodyPr wrap="square" rtlCol="0">
+            <a:spAutoFit/>
+          </a:bodyPr>
+          <a:lstStyle/>
+          <a:p>
+            <a:r>
+              <a:rPr lang="en-US" altLang="ja-JP" sz="1400" dirty="0" smtClean="0"/>
+              <a:t>5’</a:t>
+            </a:r>
+            <a:endParaRPr kumimoji="1" lang="en-US" altLang="ja-JP" sz="1400" dirty="0" smtClean="0"/>
+          </a:p>
+        </p:txBody>
+      </p:sp>
+      <p:sp>
+        <p:nvSpPr>
+          <p:cNvPr id="109" name="テキスト ボックス 108"/>
+          <p:cNvSpPr txBox="1"/>
+          <p:nvPr/>
+        </p:nvSpPr>
+        <p:spPr>
+          <a:xfrm>
+            <a:off x="6048609" y="2523700"/>
+            <a:ext cx="476250" cy="307777"/>
+          </a:xfrm>
+          <a:prstGeom prst="rect">
+            <a:avLst/>
+          </a:prstGeom>
+          <a:noFill/>
+        </p:spPr>
+        <p:txBody>
+          <a:bodyPr wrap="square" rtlCol="0">
+            <a:spAutoFit/>
+          </a:bodyPr>
+          <a:lstStyle/>
+          <a:p>
+            <a:r>
+              <a:rPr lang="en-US" altLang="ja-JP" sz="1400" dirty="0" smtClean="0"/>
+              <a:t>5’</a:t>
+            </a:r>
+            <a:endParaRPr kumimoji="1" lang="en-US" altLang="ja-JP" sz="1400" dirty="0" smtClean="0"/>
+          </a:p>
+        </p:txBody>
+      </p:sp>
+      <p:sp>
+        <p:nvSpPr>
+          <p:cNvPr id="73" name="線吹き出し 2 (枠付き) 72"/>
+          <p:cNvSpPr/>
+          <p:nvPr/>
+        </p:nvSpPr>
+        <p:spPr>
+          <a:xfrm>
+            <a:off x="569214" y="4024688"/>
+            <a:ext cx="2922494" cy="1639760"/>
+          </a:xfrm>
+          <a:prstGeom prst="borderCallout2">
+            <a:avLst>
+              <a:gd name="adj1" fmla="val -4669"/>
+              <a:gd name="adj2" fmla="val 102349"/>
+              <a:gd name="adj3" fmla="val -51877"/>
+              <a:gd name="adj4" fmla="val 107251"/>
+              <a:gd name="adj5" fmla="val -53554"/>
+              <a:gd name="adj6" fmla="val 143255"/>
+            </a:avLst>
+          </a:prstGeom>
+          <a:solidFill>
+            <a:schemeClr val="bg1"/>
+          </a:solidFill>
+          <a:ln w="25400">
+            <a:solidFill>
+              <a:schemeClr val="tx1">
+                <a:lumMod val="75000"/>
+                <a:lumOff val="25000"/>
+              </a:schemeClr>
+            </a:solidFill>
+          </a:ln>
+        </p:spPr>
+        <p:style>
+          <a:lnRef idx="1">
+            <a:schemeClr val="accent1"/>
+          </a:lnRef>
+          <a:fillRef idx="3">
+            <a:schemeClr val="accent1"/>
+          </a:fillRef>
+          <a:effectRef idx="2">
+            <a:schemeClr val="accent1"/>
+          </a:effectRef>
+          <a:fontRef idx="minor">
+            <a:schemeClr val="lt1"/>
+          </a:fontRef>
+        </p:style>
+        <p:txBody>
+          <a:bodyPr rtlCol="0" anchor="ctr"/>
+          <a:lstStyle/>
+          <a:p>
+            <a:r>
+              <a:rPr lang="en-US" altLang="ja-JP" sz="1400" b="1" dirty="0" smtClean="0">
+                <a:solidFill>
+                  <a:schemeClr val="tx1">
+                    <a:lumMod val="65000"/>
+                    <a:lumOff val="35000"/>
+                  </a:schemeClr>
+                </a:solidFill>
+              </a:rPr>
+              <a:t>7</a:t>
+            </a:r>
+          </a:p>
+          <a:p>
+            <a:r>
+              <a:rPr lang="en-US" altLang="ja-JP" sz="1400" b="1" dirty="0" smtClean="0">
+                <a:solidFill>
+                  <a:schemeClr val="tx1"/>
+                </a:solidFill>
+              </a:rPr>
+              <a:t>Define </a:t>
+            </a:r>
+            <a:r>
+              <a:rPr lang="en-US" altLang="ja-JP" sz="1400" b="1" dirty="0">
+                <a:solidFill>
+                  <a:schemeClr val="tx1"/>
+                </a:solidFill>
+              </a:rPr>
+              <a:t>handling rule.</a:t>
+            </a:r>
+          </a:p>
+          <a:p>
+            <a:endParaRPr lang="en-US" altLang="ja-JP" sz="1000" b="1" dirty="0">
+              <a:solidFill>
+                <a:schemeClr val="tx1"/>
+              </a:solidFill>
+            </a:endParaRPr>
+          </a:p>
+          <a:p>
+            <a:r>
+              <a:rPr lang="en-US" altLang="ja-JP" sz="1200" dirty="0">
+                <a:solidFill>
+                  <a:schemeClr val="tx1"/>
+                </a:solidFill>
+              </a:rPr>
+              <a:t>&lt;property name="</a:t>
+            </a:r>
+            <a:r>
+              <a:rPr lang="en-US" altLang="ja-JP" sz="1200" b="1" dirty="0" err="1">
+                <a:solidFill>
+                  <a:schemeClr val="tx1"/>
+                </a:solidFill>
+              </a:rPr>
+              <a:t>excludedExceptions</a:t>
+            </a:r>
+            <a:r>
+              <a:rPr lang="en-US" altLang="ja-JP" sz="1200" dirty="0">
+                <a:solidFill>
+                  <a:schemeClr val="tx1"/>
+                </a:solidFill>
+              </a:rPr>
+              <a:t>" value="</a:t>
+            </a:r>
+            <a:r>
+              <a:rPr lang="en-US" altLang="ja-JP" sz="1200" b="1" dirty="0" err="1">
+                <a:solidFill>
+                  <a:schemeClr val="tx1"/>
+                </a:solidFill>
+              </a:rPr>
+              <a:t>org.springframework.web.util.NestedServletException</a:t>
+            </a:r>
+            <a:r>
+              <a:rPr lang="en-US" altLang="ja-JP" sz="1200" dirty="0">
+                <a:solidFill>
+                  <a:schemeClr val="tx1"/>
+                </a:solidFill>
+              </a:rPr>
+              <a:t>" /&gt;</a:t>
+            </a:r>
+          </a:p>
+        </p:txBody>
+      </p:sp>
+      <p:sp>
+        <p:nvSpPr>
+          <p:cNvPr id="74" name="フローチャート : 書類 74"/>
+          <p:cNvSpPr/>
+          <p:nvPr/>
+        </p:nvSpPr>
+        <p:spPr>
+          <a:xfrm>
+            <a:off x="2740383" y="3899838"/>
+            <a:ext cx="819975" cy="665248"/>
+          </a:xfrm>
+          <a:prstGeom prst="flowChartDocument">
+            <a:avLst/>
+          </a:prstGeom>
+        </p:spPr>
+        <p:style>
+          <a:lnRef idx="1">
+            <a:schemeClr val="accent3"/>
+          </a:lnRef>
+          <a:fillRef idx="2">
+            <a:schemeClr val="accent3"/>
+          </a:fillRef>
+          <a:effectRef idx="1">
+            <a:schemeClr val="accent3"/>
+          </a:effectRef>
+          <a:fontRef idx="minor">
+            <a:schemeClr val="dk1"/>
+          </a:fontRef>
+        </p:style>
+        <p:txBody>
+          <a:bodyPr rtlCol="0" anchor="t" anchorCtr="0"/>
+          <a:lstStyle/>
+          <a:p>
+            <a:pPr algn="ctr"/>
+            <a:r>
+              <a:rPr lang="en-US" altLang="ja-JP" sz="1200" dirty="0"/>
+              <a:t>spring-mvc.xml</a:t>
+            </a:r>
+          </a:p>
+        </p:txBody>
+      </p:sp>
+      <p:sp>
+        <p:nvSpPr>
+          <p:cNvPr id="118" name="テキスト ボックス 117"/>
+          <p:cNvSpPr txBox="1"/>
+          <p:nvPr/>
+        </p:nvSpPr>
+        <p:spPr>
+          <a:xfrm>
+            <a:off x="3931072" y="1501077"/>
+            <a:ext cx="476250" cy="307777"/>
+          </a:xfrm>
+          <a:prstGeom prst="rect">
+            <a:avLst/>
+          </a:prstGeom>
+          <a:noFill/>
+        </p:spPr>
+        <p:txBody>
+          <a:bodyPr wrap="square" rtlCol="0">
+            <a:spAutoFit/>
+          </a:bodyPr>
+          <a:lstStyle/>
+          <a:p>
+            <a:r>
+              <a:rPr kumimoji="1" lang="en-US" altLang="ja-JP" sz="1400" dirty="0" smtClean="0"/>
+              <a:t>6’</a:t>
+            </a:r>
+          </a:p>
+        </p:txBody>
+      </p:sp>
+      <p:cxnSp>
+        <p:nvCxnSpPr>
+          <p:cNvPr id="60" name="直線矢印コネクタ 13"/>
+          <p:cNvCxnSpPr>
+            <a:endCxn id="55" idx="2"/>
+          </p:cNvCxnSpPr>
+          <p:nvPr/>
+        </p:nvCxnSpPr>
+        <p:spPr>
+          <a:xfrm flipV="1">
+            <a:off x="4268999" y="1126660"/>
+            <a:ext cx="0" cy="869777"/>
+          </a:xfrm>
+          <a:prstGeom prst="straightConnector1">
+            <a:avLst/>
+          </a:prstGeom>
+          <a:ln>
+            <a:solidFill>
+              <a:schemeClr val="tx2">
+                <a:lumMod val="60000"/>
+                <a:lumOff val="40000"/>
+              </a:schemeClr>
+            </a:solidFill>
+            <a:prstDash val="dash"/>
+            <a:tailEnd type="arrow"/>
+          </a:ln>
+        </p:spPr>
+        <p:style>
+          <a:lnRef idx="2">
+            <a:schemeClr val="accent1"/>
+          </a:lnRef>
+          <a:fillRef idx="0">
+            <a:schemeClr val="accent1"/>
+          </a:fillRef>
+          <a:effectRef idx="1">
+            <a:schemeClr val="accent1"/>
+          </a:effectRef>
+          <a:fontRef idx="minor">
+            <a:schemeClr val="tx1"/>
+          </a:fontRef>
+        </p:style>
+      </p:cxnSp>
+      <p:sp>
+        <p:nvSpPr>
+          <p:cNvPr id="63" name="フローチャート : 他ページ結合子 54"/>
+          <p:cNvSpPr/>
+          <p:nvPr/>
+        </p:nvSpPr>
+        <p:spPr>
+          <a:xfrm>
+            <a:off x="5119190" y="2378297"/>
+            <a:ext cx="390290" cy="334946"/>
+          </a:xfrm>
+          <a:prstGeom prst="flowChartOffpageConnector">
+            <a:avLst/>
+          </a:prstGeom>
+          <a:gradFill>
+            <a:gsLst>
+              <a:gs pos="54000">
+                <a:srgbClr val="FFC000"/>
+              </a:gs>
+              <a:gs pos="0">
+                <a:srgbClr val="FFFF00"/>
+              </a:gs>
+              <a:gs pos="100000">
+                <a:srgbClr val="FFC000"/>
+              </a:gs>
+            </a:gsLst>
+          </a:gradFill>
+        </p:spPr>
+        <p:style>
+          <a:lnRef idx="1">
+            <a:schemeClr val="accent1"/>
+          </a:lnRef>
+          <a:fillRef idx="3">
+            <a:schemeClr val="accent1"/>
+          </a:fillRef>
+          <a:effectRef idx="2">
+            <a:schemeClr val="accent1"/>
+          </a:effectRef>
+          <a:fontRef idx="minor">
+            <a:schemeClr val="lt1"/>
+          </a:fontRef>
+        </p:style>
+        <p:txBody>
+          <a:bodyPr rtlCol="0" anchor="ctr"/>
+          <a:lstStyle/>
+          <a:p>
+            <a:pPr algn="ctr"/>
+            <a:endParaRPr kumimoji="1" lang="ja-JP" altLang="en-US" dirty="0"/>
+          </a:p>
+        </p:txBody>
+      </p:sp>
+      <p:sp>
+        <p:nvSpPr>
+          <p:cNvPr id="50" name="四角形吹き出し 49"/>
+          <p:cNvSpPr/>
+          <p:nvPr/>
+        </p:nvSpPr>
+        <p:spPr>
+          <a:xfrm>
+            <a:off x="5327000" y="2968342"/>
+            <a:ext cx="1936998" cy="787088"/>
+          </a:xfrm>
+          <a:prstGeom prst="wedgeRectCallout">
+            <a:avLst>
+              <a:gd name="adj1" fmla="val -43310"/>
+              <a:gd name="adj2" fmla="val -96338"/>
+            </a:avLst>
+          </a:prstGeom>
+          <a:ln w="19050">
+            <a:solidFill>
+              <a:schemeClr val="tx1">
+                <a:lumMod val="50000"/>
+                <a:lumOff val="50000"/>
+              </a:schemeClr>
+            </a:solidFill>
+          </a:ln>
+        </p:spPr>
+        <p:style>
+          <a:lnRef idx="2">
+            <a:schemeClr val="accent1"/>
+          </a:lnRef>
+          <a:fillRef idx="1">
+            <a:schemeClr val="lt1"/>
+          </a:fillRef>
+          <a:effectRef idx="0">
+            <a:schemeClr val="accent1"/>
+          </a:effectRef>
+          <a:fontRef idx="minor">
+            <a:schemeClr val="dk1"/>
+          </a:fontRef>
+        </p:style>
+        <p:txBody>
+          <a:bodyPr rtlCol="0" anchor="t"/>
+          <a:lstStyle/>
+          <a:p>
+            <a:r>
+              <a:rPr lang="en-US" altLang="ja-JP" sz="1400" dirty="0" smtClean="0"/>
+              <a:t>6</a:t>
+            </a:r>
+          </a:p>
+          <a:p>
+            <a:r>
+              <a:rPr lang="en-US" altLang="ja-JP" sz="1400" dirty="0" smtClean="0"/>
+              <a:t>Wrap </a:t>
+            </a:r>
+            <a:r>
+              <a:rPr lang="en-US" altLang="ja-JP" sz="1400" dirty="0"/>
+              <a:t>to </a:t>
+            </a:r>
+            <a:r>
+              <a:rPr lang="en-US" altLang="ja-JP" sz="1400" dirty="0" err="1" smtClean="0"/>
+              <a:t>NestedServletException</a:t>
+            </a:r>
+            <a:endParaRPr lang="en-US" altLang="ja-JP" sz="1400" dirty="0"/>
+          </a:p>
+        </p:txBody>
+      </p:sp>
+      <p:cxnSp>
+        <p:nvCxnSpPr>
+          <p:cNvPr id="83" name="直線矢印コネクタ 13"/>
+          <p:cNvCxnSpPr>
+            <a:stCxn id="63" idx="2"/>
+            <a:endCxn id="104" idx="2"/>
+          </p:cNvCxnSpPr>
+          <p:nvPr/>
+        </p:nvCxnSpPr>
+        <p:spPr>
+          <a:xfrm rot="5400000">
+            <a:off x="4969804" y="2681180"/>
+            <a:ext cx="312469" cy="376594"/>
+          </a:xfrm>
+          <a:prstGeom prst="bentConnector3">
+            <a:avLst>
+              <a:gd name="adj1" fmla="val 40855"/>
+            </a:avLst>
+          </a:prstGeom>
+          <a:ln>
+            <a:solidFill>
+              <a:schemeClr val="tx2">
+                <a:lumMod val="60000"/>
+                <a:lumOff val="40000"/>
+              </a:schemeClr>
+            </a:solidFill>
+            <a:prstDash val="dash"/>
+            <a:tailEnd type="arrow"/>
+          </a:ln>
+        </p:spPr>
+        <p:style>
+          <a:lnRef idx="2">
+            <a:schemeClr val="accent1"/>
+          </a:lnRef>
+          <a:fillRef idx="0">
+            <a:schemeClr val="accent1"/>
+          </a:fillRef>
+          <a:effectRef idx="1">
+            <a:schemeClr val="accent1"/>
+          </a:effectRef>
+          <a:fontRef idx="minor">
+            <a:schemeClr val="tx1"/>
+          </a:fontRef>
+        </p:style>
+      </p:cxnSp>
     </p:spTree>
     <p:extLst>
       <p:ext uri="{BB962C8B-B14F-4D97-AF65-F5344CB8AC3E}">

</xml_diff>

<commit_message>
Flow diagram returned #2368 #2409
</commit_message>
<xml_diff>
--- a/source/ArchitectureInDetail/WebApplicationDetail/images_ExceptionHandling/materialExceptionHandling.pptx
+++ b/source/ArchitectureInDetail/WebApplicationDetail/images_ExceptionHandling/materialExceptionHandling.pptx
@@ -153,20 +153,6 @@
         </p14:section>
       </p14:sectionLst>
     </p:ext>
-    <p:ext uri="{EFAFB233-063F-42B5-8137-9DF3F51BA10A}">
-      <p15:sldGuideLst xmlns:p15="http://schemas.microsoft.com/office/powerpoint/2012/main">
-        <p15:guide id="1" orient="horz" pos="2160">
-          <p15:clr>
-            <a:srgbClr val="A4A3A4"/>
-          </p15:clr>
-        </p15:guide>
-        <p15:guide id="2" pos="2880">
-          <p15:clr>
-            <a:srgbClr val="A4A3A4"/>
-          </p15:clr>
-        </p15:guide>
-      </p15:sldGuideLst>
-    </p:ext>
   </p:extLst>
 </p:presentation>
 </file>
@@ -254,7 +240,7 @@
             <a:fld id="{3BB47352-BF5A-4CD2-B029-996118CD8E01}" type="datetimeFigureOut">
               <a:rPr kumimoji="1" lang="ja-JP" altLang="en-US" smtClean="0"/>
               <a:pPr/>
-              <a:t>2017/1/16</a:t>
+              <a:t>2014/6/27</a:t>
             </a:fld>
             <a:endParaRPr kumimoji="1" lang="ja-JP" altLang="en-US" dirty="0"/>
           </a:p>
@@ -1502,7 +1488,7 @@
             <a:fld id="{7B9B12EC-6AA0-374B-A2D3-850081A07A26}" type="datetimeFigureOut">
               <a:rPr kumimoji="1" lang="ja-JP" altLang="en-US" smtClean="0"/>
               <a:pPr/>
-              <a:t>2017/1/16</a:t>
+              <a:t>2014/6/27</a:t>
             </a:fld>
             <a:endParaRPr kumimoji="1" lang="ja-JP" altLang="en-US" dirty="0"/>
           </a:p>
@@ -1706,7 +1692,7 @@
             <a:fld id="{7B9B12EC-6AA0-374B-A2D3-850081A07A26}" type="datetimeFigureOut">
               <a:rPr kumimoji="1" lang="ja-JP" altLang="en-US" smtClean="0"/>
               <a:pPr/>
-              <a:t>2017/1/16</a:t>
+              <a:t>2014/6/27</a:t>
             </a:fld>
             <a:endParaRPr kumimoji="1" lang="ja-JP" altLang="en-US" dirty="0"/>
           </a:p>
@@ -1920,7 +1906,7 @@
             <a:fld id="{7B9B12EC-6AA0-374B-A2D3-850081A07A26}" type="datetimeFigureOut">
               <a:rPr kumimoji="1" lang="ja-JP" altLang="en-US" smtClean="0"/>
               <a:pPr/>
-              <a:t>2017/1/16</a:t>
+              <a:t>2014/6/27</a:t>
             </a:fld>
             <a:endParaRPr kumimoji="1" lang="ja-JP" altLang="en-US" dirty="0"/>
           </a:p>
@@ -2124,7 +2110,7 @@
             <a:fld id="{7B9B12EC-6AA0-374B-A2D3-850081A07A26}" type="datetimeFigureOut">
               <a:rPr kumimoji="1" lang="ja-JP" altLang="en-US" smtClean="0"/>
               <a:pPr/>
-              <a:t>2017/1/16</a:t>
+              <a:t>2014/6/27</a:t>
             </a:fld>
             <a:endParaRPr kumimoji="1" lang="ja-JP" altLang="en-US" dirty="0"/>
           </a:p>
@@ -2372,7 +2358,7 @@
             <a:fld id="{7B9B12EC-6AA0-374B-A2D3-850081A07A26}" type="datetimeFigureOut">
               <a:rPr kumimoji="1" lang="ja-JP" altLang="en-US" smtClean="0"/>
               <a:pPr/>
-              <a:t>2017/1/16</a:t>
+              <a:t>2014/6/27</a:t>
             </a:fld>
             <a:endParaRPr kumimoji="1" lang="ja-JP" altLang="en-US" dirty="0"/>
           </a:p>
@@ -2726,7 +2712,7 @@
             <a:fld id="{7B9B12EC-6AA0-374B-A2D3-850081A07A26}" type="datetimeFigureOut">
               <a:rPr kumimoji="1" lang="ja-JP" altLang="en-US" smtClean="0"/>
               <a:pPr/>
-              <a:t>2017/1/16</a:t>
+              <a:t>2014/6/27</a:t>
             </a:fld>
             <a:endParaRPr kumimoji="1" lang="ja-JP" altLang="en-US" dirty="0"/>
           </a:p>
@@ -3214,7 +3200,7 @@
             <a:fld id="{7B9B12EC-6AA0-374B-A2D3-850081A07A26}" type="datetimeFigureOut">
               <a:rPr kumimoji="1" lang="ja-JP" altLang="en-US" smtClean="0"/>
               <a:pPr/>
-              <a:t>2017/1/16</a:t>
+              <a:t>2014/6/27</a:t>
             </a:fld>
             <a:endParaRPr kumimoji="1" lang="ja-JP" altLang="en-US" dirty="0"/>
           </a:p>
@@ -3334,7 +3320,7 @@
             <a:fld id="{7B9B12EC-6AA0-374B-A2D3-850081A07A26}" type="datetimeFigureOut">
               <a:rPr kumimoji="1" lang="ja-JP" altLang="en-US" smtClean="0"/>
               <a:pPr/>
-              <a:t>2017/1/16</a:t>
+              <a:t>2014/6/27</a:t>
             </a:fld>
             <a:endParaRPr kumimoji="1" lang="ja-JP" altLang="en-US" dirty="0"/>
           </a:p>
@@ -3431,7 +3417,7 @@
             <a:fld id="{7B9B12EC-6AA0-374B-A2D3-850081A07A26}" type="datetimeFigureOut">
               <a:rPr kumimoji="1" lang="ja-JP" altLang="en-US" smtClean="0"/>
               <a:pPr/>
-              <a:t>2017/1/16</a:t>
+              <a:t>2014/6/27</a:t>
             </a:fld>
             <a:endParaRPr kumimoji="1" lang="ja-JP" altLang="en-US" dirty="0"/>
           </a:p>
@@ -3742,7 +3728,7 @@
             <a:fld id="{7B9B12EC-6AA0-374B-A2D3-850081A07A26}" type="datetimeFigureOut">
               <a:rPr kumimoji="1" lang="ja-JP" altLang="en-US" smtClean="0"/>
               <a:pPr/>
-              <a:t>2017/1/16</a:t>
+              <a:t>2014/6/27</a:t>
             </a:fld>
             <a:endParaRPr kumimoji="1" lang="ja-JP" altLang="en-US" dirty="0"/>
           </a:p>
@@ -3997,7 +3983,7 @@
             <a:fld id="{7B9B12EC-6AA0-374B-A2D3-850081A07A26}" type="datetimeFigureOut">
               <a:rPr kumimoji="1" lang="ja-JP" altLang="en-US" smtClean="0"/>
               <a:pPr/>
-              <a:t>2017/1/16</a:t>
+              <a:t>2014/6/27</a:t>
             </a:fld>
             <a:endParaRPr kumimoji="1" lang="ja-JP" altLang="en-US" dirty="0"/>
           </a:p>
@@ -4244,7 +4230,7 @@
             <a:fld id="{7B9B12EC-6AA0-374B-A2D3-850081A07A26}" type="datetimeFigureOut">
               <a:rPr kumimoji="1" lang="ja-JP" altLang="en-US" smtClean="0"/>
               <a:pPr/>
-              <a:t>2017/1/16</a:t>
+              <a:t>2014/6/27</a:t>
             </a:fld>
             <a:endParaRPr kumimoji="1" lang="ja-JP" altLang="en-US" dirty="0"/>
           </a:p>
@@ -12075,7 +12061,7 @@
         </p:blipFill>
         <p:spPr bwMode="auto">
           <a:xfrm>
-            <a:off x="134000" y="4141549"/>
+            <a:off x="134000" y="3541055"/>
             <a:ext cx="1429056" cy="1581567"/>
           </a:xfrm>
           <a:prstGeom prst="rect">
@@ -12092,7 +12078,7 @@
         </p:nvSpPr>
         <p:spPr>
           <a:xfrm>
-            <a:off x="241305" y="4871266"/>
+            <a:off x="241305" y="4270772"/>
             <a:ext cx="1214446" cy="500066"/>
           </a:xfrm>
           <a:prstGeom prst="rect">
@@ -12159,7 +12145,7 @@
         </p:nvSpPr>
         <p:spPr>
           <a:xfrm>
-            <a:off x="1269627" y="4871266"/>
+            <a:off x="1269627" y="4270772"/>
             <a:ext cx="988142" cy="681242"/>
           </a:xfrm>
           <a:prstGeom prst="flowChartDocument">
@@ -12512,7 +12498,7 @@
         </p:nvSpPr>
         <p:spPr>
           <a:xfrm>
-            <a:off x="1521869" y="4238749"/>
+            <a:off x="1521869" y="3638255"/>
             <a:ext cx="476250" cy="338554"/>
           </a:xfrm>
           <a:prstGeom prst="rect">
@@ -12625,7 +12611,7 @@
         </p:nvSpPr>
         <p:spPr>
           <a:xfrm>
-            <a:off x="249190" y="4551725"/>
+            <a:off x="249190" y="3951231"/>
             <a:ext cx="1214446" cy="500066"/>
           </a:xfrm>
           <a:prstGeom prst="rect">
@@ -12681,7 +12667,7 @@
         </p:nvSpPr>
         <p:spPr>
           <a:xfrm>
-            <a:off x="2179966" y="3954110"/>
+            <a:off x="2179966" y="3353616"/>
             <a:ext cx="1209874" cy="676927"/>
           </a:xfrm>
           <a:prstGeom prst="rect">
@@ -12741,7 +12727,7 @@
         <p:spPr>
           <a:xfrm flipH="1">
             <a:off x="2784902" y="2196524"/>
-            <a:ext cx="1" cy="1650630"/>
+            <a:ext cx="1" cy="1050136"/>
           </a:xfrm>
           <a:prstGeom prst="straightConnector1">
             <a:avLst/>
@@ -12774,8 +12760,8 @@
         </p:nvCxnSpPr>
         <p:spPr>
           <a:xfrm flipV="1">
-            <a:off x="910203" y="2098107"/>
-            <a:ext cx="0" cy="2371594"/>
+            <a:off x="910203" y="2098106"/>
+            <a:ext cx="0" cy="1762102"/>
           </a:xfrm>
           <a:prstGeom prst="line">
             <a:avLst/>
@@ -12811,7 +12797,7 @@
         </p:nvCxnSpPr>
         <p:spPr>
           <a:xfrm rot="10800000" flipV="1">
-            <a:off x="1763698" y="4292574"/>
+            <a:off x="1763698" y="3692080"/>
             <a:ext cx="416268" cy="578692"/>
           </a:xfrm>
           <a:prstGeom prst="curvedConnector2">
@@ -12844,7 +12830,7 @@
         </p:nvSpPr>
         <p:spPr>
           <a:xfrm>
-            <a:off x="3964168" y="4871266"/>
+            <a:off x="3964168" y="4270772"/>
             <a:ext cx="857934" cy="597318"/>
           </a:xfrm>
           <a:prstGeom prst="flowChartDocument">
@@ -12903,7 +12889,7 @@
         </p:nvCxnSpPr>
         <p:spPr>
           <a:xfrm>
-            <a:off x="3389840" y="4292574"/>
+            <a:off x="3389840" y="3692080"/>
             <a:ext cx="1003295" cy="578692"/>
           </a:xfrm>
           <a:prstGeom prst="curvedConnector2">
@@ -12936,7 +12922,7 @@
         </p:nvSpPr>
         <p:spPr>
           <a:xfrm>
-            <a:off x="3778990" y="4469701"/>
+            <a:off x="3778990" y="3869207"/>
             <a:ext cx="476250" cy="338554"/>
           </a:xfrm>
           <a:prstGeom prst="rect">
@@ -12965,18 +12951,111 @@
           </a:p>
         </p:txBody>
       </p:sp>
+      <p:sp>
+        <p:nvSpPr>
+          <p:cNvPr id="95" name="四角形吹き出し 94"/>
+          <p:cNvSpPr/>
+          <p:nvPr/>
+        </p:nvSpPr>
+        <p:spPr>
+          <a:xfrm>
+            <a:off x="4476410" y="3017674"/>
+            <a:ext cx="1289931" cy="611361"/>
+          </a:xfrm>
+          <a:prstGeom prst="wedgeRectCallout">
+            <a:avLst>
+              <a:gd name="adj1" fmla="val -73145"/>
+              <a:gd name="adj2" fmla="val -76016"/>
+            </a:avLst>
+          </a:prstGeom>
+          <a:ln w="19050"/>
+        </p:spPr>
+        <p:style>
+          <a:lnRef idx="2">
+            <a:schemeClr val="accent1"/>
+          </a:lnRef>
+          <a:fillRef idx="1">
+            <a:schemeClr val="lt1"/>
+          </a:fillRef>
+          <a:effectRef idx="0">
+            <a:schemeClr val="accent1"/>
+          </a:effectRef>
+          <a:fontRef idx="minor">
+            <a:schemeClr val="dk1"/>
+          </a:fontRef>
+        </p:style>
+        <p:txBody>
+          <a:bodyPr rtlCol="0" anchor="ctr"/>
+          <a:lstStyle/>
+          <a:p>
+            <a:r>
+              <a:rPr lang="en-US" altLang="ja-JP" sz="1200" dirty="0" smtClean="0">
+                <a:solidFill>
+                  <a:schemeClr val="tx1"/>
+                </a:solidFill>
+              </a:rPr>
+              <a:t>XxxError </a:t>
+            </a:r>
+            <a:r>
+              <a:rPr lang="en-US" altLang="ja-JP" sz="1200" dirty="0">
+                <a:solidFill>
+                  <a:schemeClr val="tx1"/>
+                </a:solidFill>
+              </a:rPr>
+              <a:t>is </a:t>
+            </a:r>
+            <a:r>
+              <a:rPr lang="en-US" altLang="ja-JP" sz="1200" dirty="0" smtClean="0">
+                <a:solidFill>
+                  <a:schemeClr val="tx1"/>
+                </a:solidFill>
+              </a:rPr>
+              <a:t>wrapped </a:t>
+            </a:r>
+            <a:r>
+              <a:rPr lang="en-US" altLang="ja-JP" sz="1200" dirty="0">
+                <a:solidFill>
+                  <a:schemeClr val="tx1"/>
+                </a:solidFill>
+              </a:rPr>
+              <a:t>in </a:t>
+            </a:r>
+            <a:r>
+              <a:rPr lang="en-US" altLang="ja-JP" sz="1200" dirty="0" smtClean="0">
+                <a:solidFill>
+                  <a:schemeClr val="tx1"/>
+                </a:solidFill>
+              </a:rPr>
+              <a:t>ServletException</a:t>
+            </a:r>
+            <a:r>
+              <a:rPr lang="en-US" altLang="ja-JP" sz="1200" dirty="0">
+                <a:solidFill>
+                  <a:schemeClr val="tx1"/>
+                </a:solidFill>
+              </a:rPr>
+              <a:t>.</a:t>
+            </a:r>
+            <a:endParaRPr kumimoji="1" lang="ja-JP" altLang="en-US" sz="1200" dirty="0">
+              <a:solidFill>
+                <a:schemeClr val="tx1"/>
+              </a:solidFill>
+            </a:endParaRPr>
+          </a:p>
+        </p:txBody>
+      </p:sp>
       <p:cxnSp>
         <p:nvCxnSpPr>
           <p:cNvPr id="99" name="直線矢印コネクタ 13"/>
           <p:cNvCxnSpPr>
-            <a:endCxn id="71" idx="1"/>
+            <a:stCxn id="43" idx="2"/>
           </p:cNvCxnSpPr>
           <p:nvPr/>
         </p:nvCxnSpPr>
         <p:spPr>
-          <a:xfrm rot="16200000" flipH="1">
-            <a:off x="4718157" y="2286135"/>
-            <a:ext cx="535693" cy="332809"/>
+          <a:xfrm rot="5400000">
+            <a:off x="4144249" y="2287044"/>
+            <a:ext cx="613016" cy="408320"/>
           </a:xfrm>
           <a:prstGeom prst="curvedConnector2">
             <a:avLst/>
@@ -13008,7 +13087,7 @@
         </p:nvSpPr>
         <p:spPr>
           <a:xfrm>
-            <a:off x="4859261" y="2191942"/>
+            <a:off x="4629318" y="2436516"/>
             <a:ext cx="476250" cy="338554"/>
           </a:xfrm>
           <a:prstGeom prst="rect">
@@ -13045,7 +13124,7 @@
         </p:nvSpPr>
         <p:spPr>
           <a:xfrm>
-            <a:off x="2481830" y="4551724"/>
+            <a:off x="2481830" y="3951230"/>
             <a:ext cx="850837" cy="819607"/>
           </a:xfrm>
           <a:prstGeom prst="flowChartDocument">
@@ -13370,7 +13449,7 @@
         </p:nvSpPr>
         <p:spPr>
           <a:xfrm>
-            <a:off x="2588420" y="5552508"/>
+            <a:off x="2588420" y="4952014"/>
             <a:ext cx="1493118" cy="507750"/>
           </a:xfrm>
           <a:prstGeom prst="wedgeRectCallout">
@@ -13832,7 +13911,7 @@
         </p:nvSpPr>
         <p:spPr>
           <a:xfrm>
-            <a:off x="546297" y="3009703"/>
+            <a:off x="546297" y="2760417"/>
             <a:ext cx="363906" cy="338554"/>
           </a:xfrm>
           <a:prstGeom prst="rect">
@@ -13878,7 +13957,7 @@
         </p:nvSpPr>
         <p:spPr>
           <a:xfrm rot="10800000">
-            <a:off x="2684496" y="3847154"/>
+            <a:off x="2684496" y="3246660"/>
             <a:ext cx="200813" cy="213911"/>
           </a:xfrm>
           <a:prstGeom prst="flowChartOffpageConnector">
@@ -13929,7 +14008,7 @@
         </p:nvSpPr>
         <p:spPr>
           <a:xfrm>
-            <a:off x="5152408" y="2315315"/>
+            <a:off x="3109639" y="2436516"/>
             <a:ext cx="1194016" cy="810144"/>
           </a:xfrm>
           <a:prstGeom prst="star24">
@@ -13967,7 +14046,7 @@
         </p:nvSpPr>
         <p:spPr>
           <a:xfrm>
-            <a:off x="5237116" y="2506513"/>
+            <a:off x="3160438" y="2644436"/>
             <a:ext cx="1084486" cy="407261"/>
           </a:xfrm>
           <a:prstGeom prst="rect">
@@ -14148,7 +14227,7 @@
         </p:nvGrpSpPr>
         <p:grpSpPr>
           <a:xfrm>
-            <a:off x="5436416" y="2896473"/>
+            <a:off x="3393647" y="3017674"/>
             <a:ext cx="1112438" cy="555462"/>
             <a:chOff x="5675261" y="3733751"/>
             <a:chExt cx="1112438" cy="555462"/>
@@ -14396,470 +14475,6 @@
               <a:t>Info</a:t>
             </a:r>
             <a:endParaRPr lang="en-US" altLang="ja-JP" sz="1000" dirty="0">
-              <a:solidFill>
-                <a:schemeClr val="tx1"/>
-              </a:solidFill>
-            </a:endParaRPr>
-          </a:p>
-        </p:txBody>
-      </p:sp>
-      <p:sp>
-        <p:nvSpPr>
-          <p:cNvPr id="64" name="正方形/長方形 63"/>
-          <p:cNvSpPr/>
-          <p:nvPr/>
-        </p:nvSpPr>
-        <p:spPr>
-          <a:xfrm>
-            <a:off x="3221275" y="2753787"/>
-            <a:ext cx="1493663" cy="754870"/>
-          </a:xfrm>
-          <a:prstGeom prst="rect">
-            <a:avLst/>
-          </a:prstGeom>
-        </p:spPr>
-        <p:style>
-          <a:lnRef idx="1">
-            <a:schemeClr val="accent1"/>
-          </a:lnRef>
-          <a:fillRef idx="3">
-            <a:schemeClr val="accent1"/>
-          </a:fillRef>
-          <a:effectRef idx="2">
-            <a:schemeClr val="accent1"/>
-          </a:effectRef>
-          <a:fontRef idx="minor">
-            <a:schemeClr val="lt1"/>
-          </a:fontRef>
-        </p:style>
-        <p:txBody>
-          <a:bodyPr rtlCol="0" anchor="ctr"/>
-          <a:lstStyle/>
-          <a:p>
-            <a:pPr algn="ctr"/>
-            <a:r>
-              <a:rPr lang="en-US" altLang="ja-JP" sz="1000" dirty="0"/>
-              <a:t>&lt;Spring MVC </a:t>
-            </a:r>
-            <a:r>
-              <a:rPr lang="en-US" altLang="ja-JP" sz="1000" dirty="0" smtClean="0"/>
-              <a:t>Extention&gt;</a:t>
-            </a:r>
-          </a:p>
-          <a:p>
-            <a:pPr algn="ctr"/>
-            <a:r>
-              <a:rPr lang="en-US" altLang="ja-JP" sz="1200" dirty="0" smtClean="0"/>
-              <a:t>SystemException</a:t>
-            </a:r>
-          </a:p>
-          <a:p>
-            <a:pPr algn="ctr"/>
-            <a:r>
-              <a:rPr lang="en-US" altLang="ja-JP" sz="1200" dirty="0" smtClean="0"/>
-              <a:t>Resolver</a:t>
-            </a:r>
-            <a:endParaRPr kumimoji="1" lang="ja-JP" altLang="en-US" sz="1200" dirty="0"/>
-          </a:p>
-        </p:txBody>
-      </p:sp>
-      <p:sp>
-        <p:nvSpPr>
-          <p:cNvPr id="82" name="フローチャート : 書類 60"/>
-          <p:cNvSpPr/>
-          <p:nvPr/>
-        </p:nvSpPr>
-        <p:spPr>
-          <a:xfrm>
-            <a:off x="4370794" y="3248962"/>
-            <a:ext cx="819975" cy="595190"/>
-          </a:xfrm>
-          <a:prstGeom prst="flowChartDocument">
-            <a:avLst/>
-          </a:prstGeom>
-        </p:spPr>
-        <p:style>
-          <a:lnRef idx="1">
-            <a:schemeClr val="accent3"/>
-          </a:lnRef>
-          <a:fillRef idx="2">
-            <a:schemeClr val="accent3"/>
-          </a:fillRef>
-          <a:effectRef idx="1">
-            <a:schemeClr val="accent3"/>
-          </a:effectRef>
-          <a:fontRef idx="minor">
-            <a:schemeClr val="dk1"/>
-          </a:fontRef>
-        </p:style>
-        <p:txBody>
-          <a:bodyPr rtlCol="0" anchor="t" anchorCtr="0"/>
-          <a:lstStyle/>
-          <a:p>
-            <a:pPr algn="ctr"/>
-            <a:r>
-              <a:rPr lang="en-US" altLang="ja-JP" sz="1400" dirty="0"/>
-              <a:t>spring-mvc.xml</a:t>
-            </a:r>
-            <a:endParaRPr kumimoji="1" lang="en-US" altLang="ja-JP" sz="1400" dirty="0" smtClean="0"/>
-          </a:p>
-        </p:txBody>
-      </p:sp>
-      <p:sp>
-        <p:nvSpPr>
-          <p:cNvPr id="88" name="四角形吹き出し 87"/>
-          <p:cNvSpPr/>
-          <p:nvPr/>
-        </p:nvSpPr>
-        <p:spPr>
-          <a:xfrm>
-            <a:off x="5146110" y="4028239"/>
-            <a:ext cx="2083665" cy="1033533"/>
-          </a:xfrm>
-          <a:prstGeom prst="wedgeRectCallout">
-            <a:avLst>
-              <a:gd name="adj1" fmla="val -53576"/>
-              <a:gd name="adj2" fmla="val -81875"/>
-            </a:avLst>
-          </a:prstGeom>
-          <a:ln w="19050"/>
-        </p:spPr>
-        <p:style>
-          <a:lnRef idx="2">
-            <a:schemeClr val="accent1"/>
-          </a:lnRef>
-          <a:fillRef idx="1">
-            <a:schemeClr val="lt1"/>
-          </a:fillRef>
-          <a:effectRef idx="0">
-            <a:schemeClr val="accent1"/>
-          </a:effectRef>
-          <a:fontRef idx="minor">
-            <a:schemeClr val="dk1"/>
-          </a:fontRef>
-        </p:style>
-        <p:txBody>
-          <a:bodyPr rtlCol="0" anchor="ctr"/>
-          <a:lstStyle/>
-          <a:p>
-            <a:r>
-              <a:rPr lang="en-US" altLang="ja-JP" sz="1200" dirty="0" smtClean="0">
-                <a:solidFill>
-                  <a:schemeClr val="tx1"/>
-                </a:solidFill>
-              </a:rPr>
-              <a:t>define bean &amp; exception handling rule.</a:t>
-            </a:r>
-          </a:p>
-          <a:p>
-            <a:r>
-              <a:rPr lang="en-US" altLang="ja-JP" sz="1200" dirty="0" smtClean="0">
-                <a:solidFill>
-                  <a:schemeClr val="tx1"/>
-                </a:solidFill>
-              </a:rPr>
-              <a:t>For </a:t>
-            </a:r>
-            <a:r>
-              <a:rPr lang="en-US" altLang="ja-JP" sz="1200" dirty="0" err="1" smtClean="0">
-                <a:solidFill>
-                  <a:schemeClr val="tx1"/>
-                </a:solidFill>
-              </a:rPr>
-              <a:t>java.lang.Error</a:t>
-            </a:r>
-            <a:r>
-              <a:rPr lang="en-US" altLang="ja-JP" sz="1200" dirty="0" smtClean="0">
-                <a:solidFill>
-                  <a:schemeClr val="tx1"/>
-                </a:solidFill>
-              </a:rPr>
-              <a:t>, exclude</a:t>
-            </a:r>
-            <a:r>
-              <a:rPr lang="ja-JP" altLang="en-US" sz="1200" dirty="0" smtClean="0">
-                <a:solidFill>
-                  <a:schemeClr val="tx1"/>
-                </a:solidFill>
-              </a:rPr>
-              <a:t> </a:t>
-            </a:r>
-            <a:r>
-              <a:rPr lang="en-US" altLang="ja-JP" sz="1200" dirty="0" err="1" smtClean="0">
-                <a:solidFill>
-                  <a:schemeClr val="tx1"/>
-                </a:solidFill>
-              </a:rPr>
-              <a:t>NestedServletException</a:t>
-            </a:r>
-            <a:r>
-              <a:rPr lang="en-US" altLang="ja-JP" sz="1200" dirty="0" smtClean="0">
-                <a:solidFill>
-                  <a:schemeClr val="tx1"/>
-                </a:solidFill>
-              </a:rPr>
-              <a:t>.</a:t>
-            </a:r>
-            <a:endParaRPr lang="en-US" altLang="ja-JP" sz="1200" dirty="0">
-              <a:solidFill>
-                <a:schemeClr val="tx1"/>
-              </a:solidFill>
-            </a:endParaRPr>
-          </a:p>
-        </p:txBody>
-      </p:sp>
-      <p:sp>
-        <p:nvSpPr>
-          <p:cNvPr id="89" name="フローチャート : 他ページ結合子 75"/>
-          <p:cNvSpPr/>
-          <p:nvPr/>
-        </p:nvSpPr>
-        <p:spPr>
-          <a:xfrm rot="10800000">
-            <a:off x="4285506" y="2635003"/>
-            <a:ext cx="450460" cy="213912"/>
-          </a:xfrm>
-          <a:prstGeom prst="flowChartOffpageConnector">
-            <a:avLst/>
-          </a:prstGeom>
-          <a:gradFill>
-            <a:gsLst>
-              <a:gs pos="54000">
-                <a:srgbClr val="FFC000"/>
-              </a:gs>
-              <a:gs pos="0">
-                <a:srgbClr val="FFFF00"/>
-              </a:gs>
-              <a:gs pos="100000">
-                <a:srgbClr val="FFC000"/>
-              </a:gs>
-            </a:gsLst>
-          </a:gradFill>
-        </p:spPr>
-        <p:style>
-          <a:lnRef idx="1">
-            <a:schemeClr val="accent1"/>
-          </a:lnRef>
-          <a:fillRef idx="3">
-            <a:schemeClr val="accent1"/>
-          </a:fillRef>
-          <a:effectRef idx="2">
-            <a:schemeClr val="accent1"/>
-          </a:effectRef>
-          <a:fontRef idx="minor">
-            <a:schemeClr val="lt1"/>
-          </a:fontRef>
-        </p:style>
-        <p:txBody>
-          <a:bodyPr rtlCol="0" anchor="ctr"/>
-          <a:lstStyle/>
-          <a:p>
-            <a:pPr algn="ctr"/>
-            <a:endParaRPr kumimoji="1" lang="ja-JP" altLang="en-US" dirty="0"/>
-          </a:p>
-        </p:txBody>
-      </p:sp>
-      <p:cxnSp>
-        <p:nvCxnSpPr>
-          <p:cNvPr id="91" name="直線矢印コネクタ 13"/>
-          <p:cNvCxnSpPr>
-            <a:endCxn id="89" idx="2"/>
-          </p:cNvCxnSpPr>
-          <p:nvPr/>
-        </p:nvCxnSpPr>
-        <p:spPr>
-          <a:xfrm>
-            <a:off x="4510736" y="2207804"/>
-            <a:ext cx="0" cy="427199"/>
-          </a:xfrm>
-          <a:prstGeom prst="straightConnector1">
-            <a:avLst/>
-          </a:prstGeom>
-          <a:ln>
-            <a:prstDash val="dash"/>
-            <a:tailEnd type="arrow"/>
-          </a:ln>
-        </p:spPr>
-        <p:style>
-          <a:lnRef idx="2">
-            <a:schemeClr val="accent1"/>
-          </a:lnRef>
-          <a:fillRef idx="0">
-            <a:schemeClr val="accent1"/>
-          </a:fillRef>
-          <a:effectRef idx="1">
-            <a:schemeClr val="accent1"/>
-          </a:effectRef>
-          <a:fontRef idx="minor">
-            <a:schemeClr val="tx1"/>
-          </a:fontRef>
-        </p:style>
-      </p:cxnSp>
-      <p:sp>
-        <p:nvSpPr>
-          <p:cNvPr id="92" name="テキスト ボックス 91"/>
-          <p:cNvSpPr txBox="1"/>
-          <p:nvPr/>
-        </p:nvSpPr>
-        <p:spPr>
-          <a:xfrm>
-            <a:off x="4202936" y="2230847"/>
-            <a:ext cx="476250" cy="338554"/>
-          </a:xfrm>
-          <a:prstGeom prst="rect">
-            <a:avLst/>
-          </a:prstGeom>
-          <a:noFill/>
-        </p:spPr>
-        <p:txBody>
-          <a:bodyPr wrap="square" rtlCol="0">
-            <a:spAutoFit/>
-          </a:bodyPr>
-          <a:lstStyle/>
-          <a:p>
-            <a:r>
-              <a:rPr kumimoji="1" lang="en-US" altLang="ja-JP" sz="1600" dirty="0" smtClean="0">
-                <a:effectLst>
-                  <a:outerShdw blurRad="38100" dist="38100" dir="2700000" algn="tl">
-                    <a:srgbClr val="000000">
-                      <a:alpha val="43137"/>
-                    </a:srgbClr>
-                  </a:outerShdw>
-                </a:effectLst>
-              </a:rPr>
-              <a:t>4’</a:t>
-            </a:r>
-          </a:p>
-        </p:txBody>
-      </p:sp>
-      <p:sp>
-        <p:nvSpPr>
-          <p:cNvPr id="95" name="四角形吹き出し 94"/>
-          <p:cNvSpPr/>
-          <p:nvPr/>
-        </p:nvSpPr>
-        <p:spPr>
-          <a:xfrm>
-            <a:off x="6716745" y="2785573"/>
-            <a:ext cx="2189042" cy="968435"/>
-          </a:xfrm>
-          <a:prstGeom prst="wedgeRectCallout">
-            <a:avLst>
-              <a:gd name="adj1" fmla="val -74184"/>
-              <a:gd name="adj2" fmla="val -53817"/>
-            </a:avLst>
-          </a:prstGeom>
-          <a:ln w="19050"/>
-        </p:spPr>
-        <p:style>
-          <a:lnRef idx="2">
-            <a:schemeClr val="accent1"/>
-          </a:lnRef>
-          <a:fillRef idx="1">
-            <a:schemeClr val="lt1"/>
-          </a:fillRef>
-          <a:effectRef idx="0">
-            <a:schemeClr val="accent1"/>
-          </a:effectRef>
-          <a:fontRef idx="minor">
-            <a:schemeClr val="dk1"/>
-          </a:fontRef>
-        </p:style>
-        <p:txBody>
-          <a:bodyPr rtlCol="0" anchor="ctr"/>
-          <a:lstStyle/>
-          <a:p>
-            <a:r>
-              <a:rPr lang="en-US" altLang="ja-JP" sz="1200" dirty="0" smtClean="0">
-                <a:solidFill>
-                  <a:schemeClr val="tx1"/>
-                </a:solidFill>
-              </a:rPr>
-              <a:t>XxxError </a:t>
-            </a:r>
-            <a:r>
-              <a:rPr lang="en-US" altLang="ja-JP" sz="1200" dirty="0">
-                <a:solidFill>
-                  <a:schemeClr val="tx1"/>
-                </a:solidFill>
-              </a:rPr>
-              <a:t>is </a:t>
-            </a:r>
-            <a:r>
-              <a:rPr lang="en-US" altLang="ja-JP" sz="1200" dirty="0" smtClean="0">
-                <a:solidFill>
-                  <a:schemeClr val="tx1"/>
-                </a:solidFill>
-              </a:rPr>
-              <a:t>wrapped </a:t>
-            </a:r>
-            <a:r>
-              <a:rPr lang="en-US" altLang="ja-JP" sz="1200" dirty="0">
-                <a:solidFill>
-                  <a:schemeClr val="tx1"/>
-                </a:solidFill>
-              </a:rPr>
-              <a:t>in </a:t>
-            </a:r>
-            <a:r>
-              <a:rPr lang="en-US" altLang="ja-JP" sz="1200" dirty="0" err="1" smtClean="0">
-                <a:solidFill>
-                  <a:schemeClr val="tx1"/>
-                </a:solidFill>
-              </a:rPr>
-              <a:t>ServletException</a:t>
-            </a:r>
-            <a:r>
-              <a:rPr lang="en-US" altLang="ja-JP" sz="1200" dirty="0" smtClean="0">
-                <a:solidFill>
-                  <a:schemeClr val="tx1"/>
-                </a:solidFill>
-              </a:rPr>
-              <a:t>.</a:t>
-            </a:r>
-          </a:p>
-          <a:p>
-            <a:r>
-              <a:rPr kumimoji="1" lang="en-US" altLang="ja-JP" sz="1200" dirty="0" smtClean="0">
-                <a:solidFill>
-                  <a:schemeClr val="tx1"/>
-                </a:solidFill>
-              </a:rPr>
-              <a:t>If </a:t>
-            </a:r>
-            <a:r>
-              <a:rPr kumimoji="1" lang="en-US" altLang="ja-JP" sz="1200" dirty="0" err="1" smtClean="0">
-                <a:solidFill>
-                  <a:schemeClr val="tx1"/>
-                </a:solidFill>
-              </a:rPr>
-              <a:t>java.lang.Error</a:t>
-            </a:r>
-            <a:r>
-              <a:rPr kumimoji="1" lang="en-US" altLang="ja-JP" sz="1200" dirty="0" smtClean="0">
-                <a:solidFill>
-                  <a:schemeClr val="tx1"/>
-                </a:solidFill>
-              </a:rPr>
-              <a:t>, it is wrapped in  </a:t>
-            </a:r>
-            <a:r>
-              <a:rPr kumimoji="1" lang="en-US" altLang="ja-JP" sz="1200" dirty="0" err="1" smtClean="0">
-                <a:solidFill>
-                  <a:schemeClr val="tx1"/>
-                </a:solidFill>
-              </a:rPr>
-              <a:t>NestedServletException</a:t>
-            </a:r>
-            <a:r>
-              <a:rPr kumimoji="1" lang="en-US" altLang="ja-JP" sz="1200" dirty="0" smtClean="0">
-                <a:solidFill>
-                  <a:schemeClr val="tx1"/>
-                </a:solidFill>
-              </a:rPr>
-              <a:t>.</a:t>
-            </a:r>
-            <a:endParaRPr kumimoji="1" lang="ja-JP" altLang="en-US" sz="1200" dirty="0">
               <a:solidFill>
                 <a:schemeClr val="tx1"/>
               </a:solidFill>
@@ -25823,7 +25438,7 @@
         <p:spPr>
           <a:xfrm>
             <a:off x="3285609" y="1330905"/>
-            <a:ext cx="5446051" cy="2885414"/>
+            <a:ext cx="5446051" cy="1923283"/>
           </a:xfrm>
           <a:prstGeom prst="rect">
             <a:avLst/>
@@ -25903,13 +25518,69 @@
       </p:sp>
       <p:sp>
         <p:nvSpPr>
+          <p:cNvPr id="3" name="角丸四角形 2"/>
+          <p:cNvSpPr/>
+          <p:nvPr/>
+        </p:nvSpPr>
+        <p:spPr>
+          <a:xfrm>
+            <a:off x="3709782" y="1990600"/>
+            <a:ext cx="1594426" cy="876673"/>
+          </a:xfrm>
+          <a:prstGeom prst="roundRect">
+            <a:avLst/>
+          </a:prstGeom>
+        </p:spPr>
+        <p:style>
+          <a:lnRef idx="1">
+            <a:schemeClr val="accent1"/>
+          </a:lnRef>
+          <a:fillRef idx="3">
+            <a:schemeClr val="accent1"/>
+          </a:fillRef>
+          <a:effectRef idx="2">
+            <a:schemeClr val="accent1"/>
+          </a:effectRef>
+          <a:fontRef idx="minor">
+            <a:schemeClr val="lt1"/>
+          </a:fontRef>
+        </p:style>
+        <p:txBody>
+          <a:bodyPr rtlCol="0" anchor="ctr"/>
+          <a:lstStyle/>
+          <a:p>
+            <a:pPr algn="ctr"/>
+            <a:r>
+              <a:rPr lang="en-US" altLang="ja-JP" dirty="0"/>
+              <a:t>&lt;framework&gt;</a:t>
+            </a:r>
+          </a:p>
+          <a:p>
+            <a:pPr algn="ctr"/>
+            <a:r>
+              <a:rPr lang="en-US" altLang="ja-JP" dirty="0" smtClean="0"/>
+              <a:t>Dispatcher</a:t>
+            </a:r>
+          </a:p>
+          <a:p>
+            <a:pPr algn="ctr"/>
+            <a:r>
+              <a:rPr lang="en-US" altLang="ja-JP" dirty="0" smtClean="0"/>
+              <a:t>Servlet</a:t>
+            </a:r>
+            <a:endParaRPr kumimoji="1" lang="ja-JP" altLang="en-US" dirty="0"/>
+          </a:p>
+        </p:txBody>
+      </p:sp>
+      <p:sp>
+        <p:nvSpPr>
           <p:cNvPr id="37" name="角丸四角形 36"/>
           <p:cNvSpPr/>
           <p:nvPr/>
         </p:nvSpPr>
         <p:spPr>
           <a:xfrm>
-            <a:off x="6689676" y="4578092"/>
+            <a:off x="6212004" y="3622749"/>
             <a:ext cx="1945975" cy="1666405"/>
           </a:xfrm>
           <a:prstGeom prst="roundRect">
@@ -25967,13 +25638,55 @@
       </p:sp>
       <p:sp>
         <p:nvSpPr>
+          <p:cNvPr id="39" name="角丸四角形 38"/>
+          <p:cNvSpPr/>
+          <p:nvPr/>
+        </p:nvSpPr>
+        <p:spPr>
+          <a:xfrm>
+            <a:off x="6461804" y="2095052"/>
+            <a:ext cx="1440000" cy="772284"/>
+          </a:xfrm>
+          <a:prstGeom prst="roundRect">
+            <a:avLst/>
+          </a:prstGeom>
+        </p:spPr>
+        <p:style>
+          <a:lnRef idx="1">
+            <a:schemeClr val="accent1"/>
+          </a:lnRef>
+          <a:fillRef idx="3">
+            <a:schemeClr val="accent1"/>
+          </a:fillRef>
+          <a:effectRef idx="2">
+            <a:schemeClr val="accent1"/>
+          </a:effectRef>
+          <a:fontRef idx="minor">
+            <a:schemeClr val="lt1"/>
+          </a:fontRef>
+        </p:style>
+        <p:txBody>
+          <a:bodyPr rtlCol="0" anchor="ctr"/>
+          <a:lstStyle/>
+          <a:p>
+            <a:pPr algn="ctr"/>
+            <a:r>
+              <a:rPr kumimoji="1" lang="en-US" altLang="ja-JP" sz="1600" dirty="0" smtClean="0"/>
+              <a:t>Controller</a:t>
+            </a:r>
+            <a:endParaRPr kumimoji="1" lang="ja-JP" altLang="en-US" sz="1600" dirty="0"/>
+          </a:p>
+        </p:txBody>
+      </p:sp>
+      <p:sp>
+        <p:nvSpPr>
           <p:cNvPr id="45" name="角丸四角形 44"/>
           <p:cNvSpPr/>
           <p:nvPr/>
         </p:nvSpPr>
         <p:spPr>
           <a:xfrm>
-            <a:off x="6942663" y="4780569"/>
+            <a:off x="6464991" y="3825226"/>
             <a:ext cx="1440000" cy="360000"/>
           </a:xfrm>
           <a:prstGeom prst="roundRect">
@@ -26023,7 +25736,7 @@
         </p:nvSpPr>
         <p:spPr>
           <a:xfrm>
-            <a:off x="6942663" y="5442058"/>
+            <a:off x="6464991" y="4486715"/>
             <a:ext cx="1440000" cy="360000"/>
           </a:xfrm>
           <a:prstGeom prst="roundRect">
@@ -26105,75 +25818,16 @@
           </a:fontRef>
         </p:style>
       </p:cxnSp>
-      <p:sp>
-        <p:nvSpPr>
-          <p:cNvPr id="67" name="テキスト ボックス 66"/>
-          <p:cNvSpPr txBox="1"/>
-          <p:nvPr/>
-        </p:nvSpPr>
-        <p:spPr>
-          <a:xfrm>
-            <a:off x="2647661" y="167277"/>
-            <a:ext cx="476250" cy="307777"/>
-          </a:xfrm>
-          <a:prstGeom prst="rect">
-            <a:avLst/>
-          </a:prstGeom>
-          <a:noFill/>
-        </p:spPr>
-        <p:txBody>
-          <a:bodyPr wrap="square" rtlCol="0">
-            <a:spAutoFit/>
-          </a:bodyPr>
-          <a:lstStyle/>
-          <a:p>
-            <a:r>
-              <a:rPr lang="en-US" altLang="ja-JP" sz="1400" dirty="0"/>
-              <a:t>1</a:t>
-            </a:r>
-            <a:endParaRPr kumimoji="1" lang="en-US" altLang="ja-JP" sz="1400" dirty="0" smtClean="0"/>
-          </a:p>
-        </p:txBody>
-      </p:sp>
-      <p:sp>
-        <p:nvSpPr>
-          <p:cNvPr id="69" name="テキスト ボックス 68"/>
-          <p:cNvSpPr txBox="1"/>
-          <p:nvPr/>
-        </p:nvSpPr>
-        <p:spPr>
-          <a:xfrm>
-            <a:off x="4785215" y="1504576"/>
-            <a:ext cx="476250" cy="307777"/>
-          </a:xfrm>
-          <a:prstGeom prst="rect">
-            <a:avLst/>
-          </a:prstGeom>
-          <a:noFill/>
-        </p:spPr>
-        <p:txBody>
-          <a:bodyPr wrap="square" rtlCol="0">
-            <a:spAutoFit/>
-          </a:bodyPr>
-          <a:lstStyle/>
-          <a:p>
-            <a:r>
-              <a:rPr kumimoji="1" lang="en-US" altLang="ja-JP" sz="1400" dirty="0" smtClean="0"/>
-              <a:t>2</a:t>
-            </a:r>
-          </a:p>
-        </p:txBody>
-      </p:sp>
       <p:cxnSp>
         <p:nvCxnSpPr>
-          <p:cNvPr id="88" name="直線矢印コネクタ 13"/>
+          <p:cNvPr id="58" name="直線矢印コネクタ 13"/>
           <p:cNvCxnSpPr/>
           <p:nvPr/>
         </p:nvCxnSpPr>
         <p:spPr>
-          <a:xfrm flipH="1">
-            <a:off x="2469161" y="816822"/>
-            <a:ext cx="546259" cy="1"/>
+          <a:xfrm flipV="1">
+            <a:off x="5313173" y="2283290"/>
+            <a:ext cx="1157596" cy="1"/>
           </a:xfrm>
           <a:prstGeom prst="straightConnector1">
             <a:avLst/>
@@ -26206,13 +25860,13 @@
       </p:cxnSp>
       <p:sp>
         <p:nvSpPr>
-          <p:cNvPr id="95" name="テキスト ボックス 94"/>
+          <p:cNvPr id="67" name="テキスト ボックス 66"/>
           <p:cNvSpPr txBox="1"/>
           <p:nvPr/>
         </p:nvSpPr>
         <p:spPr>
           <a:xfrm>
-            <a:off x="2633177" y="827382"/>
+            <a:off x="2647661" y="167277"/>
             <a:ext cx="476250" cy="307777"/>
           </a:xfrm>
           <a:prstGeom prst="rect">
@@ -26228,7 +25882,164 @@
           <a:p>
             <a:r>
               <a:rPr lang="en-US" altLang="ja-JP" sz="1400" dirty="0"/>
-              <a:t>9</a:t>
+              <a:t>1</a:t>
+            </a:r>
+            <a:endParaRPr kumimoji="1" lang="en-US" altLang="ja-JP" sz="1400" dirty="0" smtClean="0"/>
+          </a:p>
+        </p:txBody>
+      </p:sp>
+      <p:sp>
+        <p:nvSpPr>
+          <p:cNvPr id="69" name="テキスト ボックス 68"/>
+          <p:cNvSpPr txBox="1"/>
+          <p:nvPr/>
+        </p:nvSpPr>
+        <p:spPr>
+          <a:xfrm>
+            <a:off x="4797915" y="1491876"/>
+            <a:ext cx="476250" cy="307777"/>
+          </a:xfrm>
+          <a:prstGeom prst="rect">
+            <a:avLst/>
+          </a:prstGeom>
+          <a:noFill/>
+        </p:spPr>
+        <p:txBody>
+          <a:bodyPr wrap="square" rtlCol="0">
+            <a:spAutoFit/>
+          </a:bodyPr>
+          <a:lstStyle/>
+          <a:p>
+            <a:r>
+              <a:rPr kumimoji="1" lang="en-US" altLang="ja-JP" sz="1400" dirty="0" smtClean="0"/>
+              <a:t>2</a:t>
+            </a:r>
+          </a:p>
+        </p:txBody>
+      </p:sp>
+      <p:sp>
+        <p:nvSpPr>
+          <p:cNvPr id="70" name="テキスト ボックス 69"/>
+          <p:cNvSpPr txBox="1"/>
+          <p:nvPr/>
+        </p:nvSpPr>
+        <p:spPr>
+          <a:xfrm>
+            <a:off x="5650305" y="1941995"/>
+            <a:ext cx="476250" cy="307777"/>
+          </a:xfrm>
+          <a:prstGeom prst="rect">
+            <a:avLst/>
+          </a:prstGeom>
+          <a:noFill/>
+        </p:spPr>
+        <p:txBody>
+          <a:bodyPr wrap="square" rtlCol="0">
+            <a:spAutoFit/>
+          </a:bodyPr>
+          <a:lstStyle/>
+          <a:p>
+            <a:r>
+              <a:rPr kumimoji="1" lang="en-US" altLang="ja-JP" sz="1400" dirty="0" smtClean="0"/>
+              <a:t>3</a:t>
+            </a:r>
+          </a:p>
+        </p:txBody>
+      </p:sp>
+      <p:sp>
+        <p:nvSpPr>
+          <p:cNvPr id="71" name="テキスト ボックス 70"/>
+          <p:cNvSpPr txBox="1"/>
+          <p:nvPr/>
+        </p:nvSpPr>
+        <p:spPr>
+          <a:xfrm>
+            <a:off x="7509486" y="2867336"/>
+            <a:ext cx="562542" cy="307777"/>
+          </a:xfrm>
+          <a:prstGeom prst="rect">
+            <a:avLst/>
+          </a:prstGeom>
+          <a:noFill/>
+        </p:spPr>
+        <p:txBody>
+          <a:bodyPr wrap="square" rtlCol="0">
+            <a:spAutoFit/>
+          </a:bodyPr>
+          <a:lstStyle/>
+          <a:p>
+            <a:r>
+              <a:rPr kumimoji="1" lang="en-US" altLang="ja-JP" sz="1400" dirty="0" smtClean="0"/>
+              <a:t>4</a:t>
+            </a:r>
+          </a:p>
+        </p:txBody>
+      </p:sp>
+      <p:cxnSp>
+        <p:nvCxnSpPr>
+          <p:cNvPr id="88" name="直線矢印コネクタ 13"/>
+          <p:cNvCxnSpPr/>
+          <p:nvPr/>
+        </p:nvCxnSpPr>
+        <p:spPr>
+          <a:xfrm flipH="1">
+            <a:off x="2469161" y="816822"/>
+            <a:ext cx="546259" cy="1"/>
+          </a:xfrm>
+          <a:prstGeom prst="straightConnector1">
+            <a:avLst/>
+          </a:prstGeom>
+          <a:ln>
+            <a:solidFill>
+              <a:schemeClr val="tx1">
+                <a:lumMod val="50000"/>
+                <a:lumOff val="50000"/>
+              </a:schemeClr>
+            </a:solidFill>
+            <a:headEnd type="none"/>
+            <a:tailEnd type="arrow"/>
+          </a:ln>
+        </p:spPr>
+        <p:style>
+          <a:lnRef idx="2">
+            <a:schemeClr val="accent1"/>
+          </a:lnRef>
+          <a:fillRef idx="0">
+            <a:schemeClr val="accent1"/>
+          </a:fillRef>
+          <a:effectRef idx="1">
+            <a:schemeClr val="accent1"/>
+          </a:effectRef>
+          <a:fontRef idx="minor">
+            <a:schemeClr val="tx1"/>
+          </a:fontRef>
+        </p:style>
+      </p:cxnSp>
+      <p:sp>
+        <p:nvSpPr>
+          <p:cNvPr id="95" name="テキスト ボックス 94"/>
+          <p:cNvSpPr txBox="1"/>
+          <p:nvPr/>
+        </p:nvSpPr>
+        <p:spPr>
+          <a:xfrm>
+            <a:off x="2633177" y="827382"/>
+            <a:ext cx="476250" cy="307777"/>
+          </a:xfrm>
+          <a:prstGeom prst="rect">
+            <a:avLst/>
+          </a:prstGeom>
+          <a:noFill/>
+        </p:spPr>
+        <p:txBody>
+          <a:bodyPr wrap="square" rtlCol="0">
+            <a:spAutoFit/>
+          </a:bodyPr>
+          <a:lstStyle/>
+          <a:p>
+            <a:r>
+              <a:rPr lang="en-US" altLang="ja-JP" sz="1400" dirty="0" smtClean="0"/>
+              <a:t>8</a:t>
             </a:r>
             <a:endParaRPr kumimoji="1" lang="en-US" altLang="ja-JP" sz="1400" dirty="0" smtClean="0"/>
           </a:p>
@@ -26242,8 +26053,8 @@
         </p:nvCxnSpPr>
         <p:spPr>
           <a:xfrm flipV="1">
-            <a:off x="7397235" y="2677588"/>
-            <a:ext cx="0" cy="2102981"/>
+            <a:off x="6868763" y="2867336"/>
+            <a:ext cx="0" cy="957891"/>
           </a:xfrm>
           <a:prstGeom prst="straightConnector1">
             <a:avLst/>
@@ -26282,7 +26093,7 @@
         </p:nvSpPr>
         <p:spPr>
           <a:xfrm>
-            <a:off x="3301251" y="4397888"/>
+            <a:off x="3301251" y="3442545"/>
             <a:ext cx="5430410" cy="2178303"/>
           </a:xfrm>
           <a:prstGeom prst="rect">
@@ -26358,8 +26169,8 @@
         </p:nvCxnSpPr>
         <p:spPr>
           <a:xfrm>
-            <a:off x="7948303" y="2677588"/>
-            <a:ext cx="0" cy="2102981"/>
+            <a:off x="7470631" y="2867336"/>
+            <a:ext cx="0" cy="957890"/>
           </a:xfrm>
           <a:prstGeom prst="straightConnector1">
             <a:avLst/>
@@ -26372,6 +26183,88 @@
               </a:schemeClr>
             </a:solidFill>
             <a:headEnd type="none"/>
+            <a:tailEnd type="arrow"/>
+          </a:ln>
+        </p:spPr>
+        <p:style>
+          <a:lnRef idx="2">
+            <a:schemeClr val="accent1"/>
+          </a:lnRef>
+          <a:fillRef idx="0">
+            <a:schemeClr val="accent1"/>
+          </a:fillRef>
+          <a:effectRef idx="1">
+            <a:schemeClr val="accent1"/>
+          </a:effectRef>
+          <a:fontRef idx="minor">
+            <a:schemeClr val="tx1"/>
+          </a:fontRef>
+        </p:style>
+      </p:cxnSp>
+      <p:cxnSp>
+        <p:nvCxnSpPr>
+          <p:cNvPr id="64" name="直線矢印コネクタ 13"/>
+          <p:cNvCxnSpPr/>
+          <p:nvPr/>
+        </p:nvCxnSpPr>
+        <p:spPr>
+          <a:xfrm flipH="1">
+            <a:off x="5288560" y="2652835"/>
+            <a:ext cx="1152071" cy="0"/>
+          </a:xfrm>
+          <a:prstGeom prst="straightConnector1">
+            <a:avLst/>
+          </a:prstGeom>
+          <a:ln>
+            <a:solidFill>
+              <a:schemeClr val="tx2">
+                <a:lumMod val="60000"/>
+                <a:lumOff val="40000"/>
+              </a:schemeClr>
+            </a:solidFill>
+            <a:prstDash val="dash"/>
+            <a:tailEnd type="arrow"/>
+          </a:ln>
+        </p:spPr>
+        <p:style>
+          <a:lnRef idx="2">
+            <a:schemeClr val="accent1"/>
+          </a:lnRef>
+          <a:fillRef idx="0">
+            <a:schemeClr val="accent1"/>
+          </a:fillRef>
+          <a:effectRef idx="1">
+            <a:schemeClr val="accent1"/>
+          </a:effectRef>
+          <a:fontRef idx="minor">
+            <a:schemeClr val="tx1"/>
+          </a:fontRef>
+        </p:style>
+      </p:cxnSp>
+      <p:cxnSp>
+        <p:nvCxnSpPr>
+          <p:cNvPr id="49" name="直線矢印コネクタ 13"/>
+          <p:cNvCxnSpPr>
+            <a:endCxn id="55" idx="2"/>
+          </p:cNvCxnSpPr>
+          <p:nvPr/>
+        </p:nvCxnSpPr>
+        <p:spPr>
+          <a:xfrm flipV="1">
+            <a:off x="4268999" y="1126660"/>
+            <a:ext cx="0" cy="837326"/>
+          </a:xfrm>
+          <a:prstGeom prst="straightConnector1">
+            <a:avLst/>
+          </a:prstGeom>
+          <a:ln>
+            <a:solidFill>
+              <a:schemeClr val="tx2">
+                <a:lumMod val="60000"/>
+                <a:lumOff val="40000"/>
+              </a:schemeClr>
+            </a:solidFill>
+            <a:prstDash val="dash"/>
             <a:tailEnd type="arrow"/>
           </a:ln>
         </p:spPr>
@@ -26449,12 +26342,12 @@
         </p:nvSpPr>
         <p:spPr>
           <a:xfrm>
-            <a:off x="578016" y="1461497"/>
+            <a:off x="618960" y="1434201"/>
             <a:ext cx="2922494" cy="2299550"/>
           </a:xfrm>
           <a:prstGeom prst="borderCallout2">
             <a:avLst>
-              <a:gd name="adj1" fmla="val -1405"/>
+              <a:gd name="adj1" fmla="val -4966"/>
               <a:gd name="adj2" fmla="val 88546"/>
               <a:gd name="adj3" fmla="val -22734"/>
               <a:gd name="adj4" fmla="val 107718"/>
@@ -26493,7 +26386,7 @@
           <a:lstStyle/>
           <a:p>
             <a:r>
-              <a:rPr lang="en-US" altLang="ja-JP" sz="1400" b="1" dirty="0">
+              <a:rPr lang="en-US" altLang="ja-JP" sz="1400" b="1" dirty="0" smtClean="0">
                 <a:solidFill>
                   <a:schemeClr val="tx1">
                     <a:lumMod val="65000"/>
@@ -26501,16 +26394,8 @@
                   </a:schemeClr>
                 </a:solidFill>
               </a:rPr>
-              <a:t>8</a:t>
-            </a:r>
-            <a:endParaRPr lang="en-US" altLang="ja-JP" sz="1400" b="1" dirty="0" smtClean="0">
-              <a:solidFill>
-                <a:schemeClr val="tx1">
-                  <a:lumMod val="65000"/>
-                  <a:lumOff val="35000"/>
-                </a:schemeClr>
-              </a:solidFill>
-            </a:endParaRPr>
+              <a:t>7</a:t>
+            </a:r>
           </a:p>
           <a:p>
             <a:r>
@@ -26689,6 +26574,213 @@
           </a:p>
         </p:txBody>
       </p:sp>
+      <p:sp>
+        <p:nvSpPr>
+          <p:cNvPr id="41" name="フローチャート : 他ページ結合子 40"/>
+          <p:cNvSpPr/>
+          <p:nvPr/>
+        </p:nvSpPr>
+        <p:spPr>
+          <a:xfrm>
+            <a:off x="4899459" y="2542446"/>
+            <a:ext cx="374706" cy="270285"/>
+          </a:xfrm>
+          <a:prstGeom prst="flowChartOffpageConnector">
+            <a:avLst/>
+          </a:prstGeom>
+          <a:gradFill>
+            <a:gsLst>
+              <a:gs pos="54000">
+                <a:srgbClr val="FFC000"/>
+              </a:gs>
+              <a:gs pos="0">
+                <a:srgbClr val="FFFF00"/>
+              </a:gs>
+              <a:gs pos="100000">
+                <a:srgbClr val="FFC000"/>
+              </a:gs>
+            </a:gsLst>
+          </a:gradFill>
+        </p:spPr>
+        <p:style>
+          <a:lnRef idx="1">
+            <a:schemeClr val="accent1"/>
+          </a:lnRef>
+          <a:fillRef idx="3">
+            <a:schemeClr val="accent1"/>
+          </a:fillRef>
+          <a:effectRef idx="2">
+            <a:schemeClr val="accent1"/>
+          </a:effectRef>
+          <a:fontRef idx="minor">
+            <a:schemeClr val="lt1"/>
+          </a:fontRef>
+        </p:style>
+        <p:txBody>
+          <a:bodyPr rtlCol="0" anchor="ctr"/>
+          <a:lstStyle/>
+          <a:p>
+            <a:pPr algn="ctr"/>
+            <a:endParaRPr kumimoji="1" lang="ja-JP" altLang="en-US" dirty="0"/>
+          </a:p>
+        </p:txBody>
+      </p:sp>
+      <p:sp>
+        <p:nvSpPr>
+          <p:cNvPr id="50" name="四角形吹き出し 49"/>
+          <p:cNvSpPr/>
+          <p:nvPr/>
+        </p:nvSpPr>
+        <p:spPr>
+          <a:xfrm>
+            <a:off x="4320663" y="2939277"/>
+            <a:ext cx="2065971" cy="683472"/>
+          </a:xfrm>
+          <a:prstGeom prst="wedgeRectCallout">
+            <a:avLst>
+              <a:gd name="adj1" fmla="val -11969"/>
+              <a:gd name="adj2" fmla="val -75230"/>
+            </a:avLst>
+          </a:prstGeom>
+          <a:ln w="19050">
+            <a:solidFill>
+              <a:schemeClr val="tx1">
+                <a:lumMod val="50000"/>
+                <a:lumOff val="50000"/>
+              </a:schemeClr>
+            </a:solidFill>
+          </a:ln>
+        </p:spPr>
+        <p:style>
+          <a:lnRef idx="2">
+            <a:schemeClr val="accent1"/>
+          </a:lnRef>
+          <a:fillRef idx="1">
+            <a:schemeClr val="lt1"/>
+          </a:fillRef>
+          <a:effectRef idx="0">
+            <a:schemeClr val="accent1"/>
+          </a:effectRef>
+          <a:fontRef idx="minor">
+            <a:schemeClr val="dk1"/>
+          </a:fontRef>
+        </p:style>
+        <p:txBody>
+          <a:bodyPr rtlCol="0" anchor="t"/>
+          <a:lstStyle/>
+          <a:p>
+            <a:r>
+              <a:rPr lang="en-US" altLang="ja-JP" sz="1400" dirty="0" smtClean="0"/>
+              <a:t>6</a:t>
+            </a:r>
+          </a:p>
+          <a:p>
+            <a:r>
+              <a:rPr lang="en-US" altLang="ja-JP" sz="1400" dirty="0" smtClean="0"/>
+              <a:t>Wrap </a:t>
+            </a:r>
+            <a:r>
+              <a:rPr lang="en-US" altLang="ja-JP" sz="1400" dirty="0"/>
+              <a:t>to </a:t>
+            </a:r>
+            <a:r>
+              <a:rPr lang="en-US" altLang="ja-JP" sz="1400" dirty="0" err="1" smtClean="0"/>
+              <a:t>NestedServletException</a:t>
+            </a:r>
+            <a:endParaRPr lang="en-US" altLang="ja-JP" sz="1400" dirty="0"/>
+          </a:p>
+        </p:txBody>
+      </p:sp>
+      <p:sp>
+        <p:nvSpPr>
+          <p:cNvPr id="57" name="テキスト ボックス 56"/>
+          <p:cNvSpPr txBox="1"/>
+          <p:nvPr/>
+        </p:nvSpPr>
+        <p:spPr>
+          <a:xfrm>
+            <a:off x="6522446" y="2961495"/>
+            <a:ext cx="476250" cy="307777"/>
+          </a:xfrm>
+          <a:prstGeom prst="rect">
+            <a:avLst/>
+          </a:prstGeom>
+          <a:noFill/>
+        </p:spPr>
+        <p:txBody>
+          <a:bodyPr wrap="square" rtlCol="0">
+            <a:spAutoFit/>
+          </a:bodyPr>
+          <a:lstStyle/>
+          <a:p>
+            <a:r>
+              <a:rPr lang="en-US" altLang="ja-JP" sz="1400" dirty="0" smtClean="0"/>
+              <a:t>5’</a:t>
+            </a:r>
+            <a:endParaRPr kumimoji="1" lang="en-US" altLang="ja-JP" sz="1400" dirty="0" smtClean="0"/>
+          </a:p>
+        </p:txBody>
+      </p:sp>
+      <p:sp>
+        <p:nvSpPr>
+          <p:cNvPr id="59" name="テキスト ボックス 58"/>
+          <p:cNvSpPr txBox="1"/>
+          <p:nvPr/>
+        </p:nvSpPr>
+        <p:spPr>
+          <a:xfrm>
+            <a:off x="5643657" y="2352697"/>
+            <a:ext cx="476250" cy="307777"/>
+          </a:xfrm>
+          <a:prstGeom prst="rect">
+            <a:avLst/>
+          </a:prstGeom>
+          <a:noFill/>
+        </p:spPr>
+        <p:txBody>
+          <a:bodyPr wrap="square" rtlCol="0">
+            <a:spAutoFit/>
+          </a:bodyPr>
+          <a:lstStyle/>
+          <a:p>
+            <a:r>
+              <a:rPr lang="en-US" altLang="ja-JP" sz="1400" dirty="0" smtClean="0"/>
+              <a:t>5’</a:t>
+            </a:r>
+            <a:endParaRPr kumimoji="1" lang="en-US" altLang="ja-JP" sz="1400" dirty="0" smtClean="0"/>
+          </a:p>
+        </p:txBody>
+      </p:sp>
+      <p:sp>
+        <p:nvSpPr>
+          <p:cNvPr id="60" name="テキスト ボックス 59"/>
+          <p:cNvSpPr txBox="1"/>
+          <p:nvPr/>
+        </p:nvSpPr>
+        <p:spPr>
+          <a:xfrm>
+            <a:off x="3930463" y="1434201"/>
+            <a:ext cx="476250" cy="307777"/>
+          </a:xfrm>
+          <a:prstGeom prst="rect">
+            <a:avLst/>
+          </a:prstGeom>
+          <a:noFill/>
+        </p:spPr>
+        <p:txBody>
+          <a:bodyPr wrap="square" rtlCol="0">
+            <a:spAutoFit/>
+          </a:bodyPr>
+          <a:lstStyle/>
+          <a:p>
+            <a:r>
+              <a:rPr lang="en-US" altLang="ja-JP" sz="1400" dirty="0" smtClean="0"/>
+              <a:t>6’</a:t>
+            </a:r>
+            <a:endParaRPr kumimoji="1" lang="en-US" altLang="ja-JP" sz="1400" dirty="0" smtClean="0"/>
+          </a:p>
+        </p:txBody>
+      </p:sp>
       <p:grpSp>
         <p:nvGrpSpPr>
           <p:cNvPr id="54" name="グループ化 53"/>
@@ -26697,7 +26789,7 @@
         </p:nvGrpSpPr>
         <p:grpSpPr>
           <a:xfrm>
-            <a:off x="6002809" y="4689094"/>
+            <a:off x="5675261" y="3733751"/>
             <a:ext cx="1112438" cy="555462"/>
             <a:chOff x="5675261" y="3733751"/>
             <a:chExt cx="1112438" cy="555462"/>
@@ -26806,7 +26898,7 @@
         </p:nvSpPr>
         <p:spPr>
           <a:xfrm>
-            <a:off x="4407236" y="4903750"/>
+            <a:off x="4105088" y="3948407"/>
             <a:ext cx="1475069" cy="589108"/>
           </a:xfrm>
           <a:prstGeom prst="wedgeRectCallout">
@@ -26861,846 +26953,6 @@
           </a:p>
         </p:txBody>
       </p:sp>
-      <p:sp>
-        <p:nvSpPr>
-          <p:cNvPr id="94" name="角丸四角形 93"/>
-          <p:cNvSpPr/>
-          <p:nvPr/>
-        </p:nvSpPr>
-        <p:spPr>
-          <a:xfrm>
-            <a:off x="3582781" y="1990601"/>
-            <a:ext cx="1955003" cy="774556"/>
-          </a:xfrm>
-          <a:prstGeom prst="roundRect">
-            <a:avLst/>
-          </a:prstGeom>
-        </p:spPr>
-        <p:style>
-          <a:lnRef idx="1">
-            <a:schemeClr val="accent1"/>
-          </a:lnRef>
-          <a:fillRef idx="3">
-            <a:schemeClr val="accent1"/>
-          </a:fillRef>
-          <a:effectRef idx="2">
-            <a:schemeClr val="accent1"/>
-          </a:effectRef>
-          <a:fontRef idx="minor">
-            <a:schemeClr val="lt1"/>
-          </a:fontRef>
-        </p:style>
-        <p:txBody>
-          <a:bodyPr rtlCol="0" anchor="ctr"/>
-          <a:lstStyle/>
-          <a:p>
-            <a:pPr algn="ctr"/>
-            <a:r>
-              <a:rPr lang="en-US" altLang="ja-JP" dirty="0" smtClean="0"/>
-              <a:t>&lt;framework&gt;</a:t>
-            </a:r>
-          </a:p>
-          <a:p>
-            <a:pPr algn="ctr"/>
-            <a:r>
-              <a:rPr lang="en-US" altLang="ja-JP" dirty="0" smtClean="0"/>
-              <a:t>Dispatcher</a:t>
-            </a:r>
-          </a:p>
-          <a:p>
-            <a:pPr algn="ctr"/>
-            <a:r>
-              <a:rPr lang="en-US" altLang="ja-JP" dirty="0" smtClean="0"/>
-              <a:t>Servlet</a:t>
-            </a:r>
-            <a:endParaRPr kumimoji="1" lang="ja-JP" altLang="en-US" dirty="0"/>
-          </a:p>
-        </p:txBody>
-      </p:sp>
-      <p:sp>
-        <p:nvSpPr>
-          <p:cNvPr id="96" name="角丸四角形 95"/>
-          <p:cNvSpPr/>
-          <p:nvPr/>
-        </p:nvSpPr>
-        <p:spPr>
-          <a:xfrm>
-            <a:off x="6939476" y="2115665"/>
-            <a:ext cx="1440000" cy="561923"/>
-          </a:xfrm>
-          <a:prstGeom prst="roundRect">
-            <a:avLst/>
-          </a:prstGeom>
-        </p:spPr>
-        <p:style>
-          <a:lnRef idx="1">
-            <a:schemeClr val="accent1"/>
-          </a:lnRef>
-          <a:fillRef idx="3">
-            <a:schemeClr val="accent1"/>
-          </a:fillRef>
-          <a:effectRef idx="2">
-            <a:schemeClr val="accent1"/>
-          </a:effectRef>
-          <a:fontRef idx="minor">
-            <a:schemeClr val="lt1"/>
-          </a:fontRef>
-        </p:style>
-        <p:txBody>
-          <a:bodyPr rtlCol="0" anchor="ctr"/>
-          <a:lstStyle/>
-          <a:p>
-            <a:pPr algn="ctr"/>
-            <a:r>
-              <a:rPr kumimoji="1" lang="en-US" altLang="ja-JP" sz="1600" dirty="0" smtClean="0"/>
-              <a:t>Controller</a:t>
-            </a:r>
-            <a:endParaRPr kumimoji="1" lang="ja-JP" altLang="en-US" sz="1600" dirty="0"/>
-          </a:p>
-        </p:txBody>
-      </p:sp>
-      <p:cxnSp>
-        <p:nvCxnSpPr>
-          <p:cNvPr id="98" name="直線矢印コネクタ 13"/>
-          <p:cNvCxnSpPr/>
-          <p:nvPr/>
-        </p:nvCxnSpPr>
-        <p:spPr>
-          <a:xfrm>
-            <a:off x="5555714" y="2249376"/>
-            <a:ext cx="1383762" cy="0"/>
-          </a:xfrm>
-          <a:prstGeom prst="straightConnector1">
-            <a:avLst/>
-          </a:prstGeom>
-          <a:ln>
-            <a:solidFill>
-              <a:schemeClr val="tx1">
-                <a:lumMod val="50000"/>
-                <a:lumOff val="50000"/>
-              </a:schemeClr>
-            </a:solidFill>
-            <a:headEnd type="none"/>
-            <a:tailEnd type="arrow"/>
-          </a:ln>
-        </p:spPr>
-        <p:style>
-          <a:lnRef idx="2">
-            <a:schemeClr val="accent1"/>
-          </a:lnRef>
-          <a:fillRef idx="0">
-            <a:schemeClr val="accent1"/>
-          </a:fillRef>
-          <a:effectRef idx="1">
-            <a:schemeClr val="accent1"/>
-          </a:effectRef>
-          <a:fontRef idx="minor">
-            <a:schemeClr val="tx1"/>
-          </a:fontRef>
-        </p:style>
-      </p:cxnSp>
-      <p:sp>
-        <p:nvSpPr>
-          <p:cNvPr id="99" name="テキスト ボックス 98"/>
-          <p:cNvSpPr txBox="1"/>
-          <p:nvPr/>
-        </p:nvSpPr>
-        <p:spPr>
-          <a:xfrm>
-            <a:off x="6048609" y="1980095"/>
-            <a:ext cx="476250" cy="307777"/>
-          </a:xfrm>
-          <a:prstGeom prst="rect">
-            <a:avLst/>
-          </a:prstGeom>
-          <a:noFill/>
-        </p:spPr>
-        <p:txBody>
-          <a:bodyPr wrap="square" rtlCol="0">
-            <a:spAutoFit/>
-          </a:bodyPr>
-          <a:lstStyle/>
-          <a:p>
-            <a:r>
-              <a:rPr kumimoji="1" lang="en-US" altLang="ja-JP" sz="1400" dirty="0" smtClean="0"/>
-              <a:t>3</a:t>
-            </a:r>
-          </a:p>
-        </p:txBody>
-      </p:sp>
-      <p:sp>
-        <p:nvSpPr>
-          <p:cNvPr id="100" name="テキスト ボックス 99"/>
-          <p:cNvSpPr txBox="1"/>
-          <p:nvPr/>
-        </p:nvSpPr>
-        <p:spPr>
-          <a:xfrm>
-            <a:off x="4604971" y="2776127"/>
-            <a:ext cx="476250" cy="307777"/>
-          </a:xfrm>
-          <a:prstGeom prst="rect">
-            <a:avLst/>
-          </a:prstGeom>
-          <a:noFill/>
-        </p:spPr>
-        <p:txBody>
-          <a:bodyPr wrap="square" rtlCol="0">
-            <a:spAutoFit/>
-          </a:bodyPr>
-          <a:lstStyle/>
-          <a:p>
-            <a:r>
-              <a:rPr kumimoji="1" lang="en-US" altLang="ja-JP" sz="1400" dirty="0" smtClean="0"/>
-              <a:t>6’</a:t>
-            </a:r>
-          </a:p>
-        </p:txBody>
-      </p:sp>
-      <p:sp>
-        <p:nvSpPr>
-          <p:cNvPr id="102" name="テキスト ボックス 101"/>
-          <p:cNvSpPr txBox="1"/>
-          <p:nvPr/>
-        </p:nvSpPr>
-        <p:spPr>
-          <a:xfrm>
-            <a:off x="7935603" y="3821318"/>
-            <a:ext cx="476250" cy="307777"/>
-          </a:xfrm>
-          <a:prstGeom prst="rect">
-            <a:avLst/>
-          </a:prstGeom>
-          <a:noFill/>
-        </p:spPr>
-        <p:txBody>
-          <a:bodyPr wrap="square" rtlCol="0">
-            <a:spAutoFit/>
-          </a:bodyPr>
-          <a:lstStyle/>
-          <a:p>
-            <a:r>
-              <a:rPr kumimoji="1" lang="en-US" altLang="ja-JP" sz="1400" dirty="0" smtClean="0"/>
-              <a:t>4</a:t>
-            </a:r>
-          </a:p>
-        </p:txBody>
-      </p:sp>
-      <p:sp>
-        <p:nvSpPr>
-          <p:cNvPr id="103" name="角丸四角形 102"/>
-          <p:cNvSpPr/>
-          <p:nvPr/>
-        </p:nvSpPr>
-        <p:spPr>
-          <a:xfrm>
-            <a:off x="3618641" y="3230175"/>
-            <a:ext cx="1955003" cy="803578"/>
-          </a:xfrm>
-          <a:prstGeom prst="roundRect">
-            <a:avLst/>
-          </a:prstGeom>
-        </p:spPr>
-        <p:style>
-          <a:lnRef idx="1">
-            <a:schemeClr val="accent1"/>
-          </a:lnRef>
-          <a:fillRef idx="3">
-            <a:schemeClr val="accent1"/>
-          </a:fillRef>
-          <a:effectRef idx="2">
-            <a:schemeClr val="accent1"/>
-          </a:effectRef>
-          <a:fontRef idx="minor">
-            <a:schemeClr val="lt1"/>
-          </a:fontRef>
-        </p:style>
-        <p:txBody>
-          <a:bodyPr rtlCol="0" anchor="ctr"/>
-          <a:lstStyle/>
-          <a:p>
-            <a:pPr algn="ctr"/>
-            <a:r>
-              <a:rPr lang="en-US" altLang="ja-JP" sz="1400" b="1" dirty="0" smtClean="0"/>
-              <a:t>&lt;framework&gt;</a:t>
-            </a:r>
-          </a:p>
-          <a:p>
-            <a:pPr algn="ctr"/>
-            <a:r>
-              <a:rPr lang="en-US" altLang="ja-JP" sz="1400" b="1" dirty="0" smtClean="0"/>
-              <a:t>SystemException</a:t>
-            </a:r>
-          </a:p>
-          <a:p>
-            <a:pPr algn="ctr"/>
-            <a:r>
-              <a:rPr lang="en-US" altLang="ja-JP" sz="1400" b="1" dirty="0" smtClean="0"/>
-              <a:t>Resolver</a:t>
-            </a:r>
-            <a:endParaRPr kumimoji="1" lang="ja-JP" altLang="en-US" sz="1400" b="1" dirty="0"/>
-          </a:p>
-        </p:txBody>
-      </p:sp>
-      <p:sp>
-        <p:nvSpPr>
-          <p:cNvPr id="104" name="フローチャート : 他ページ結合子 58"/>
-          <p:cNvSpPr/>
-          <p:nvPr/>
-        </p:nvSpPr>
-        <p:spPr>
-          <a:xfrm rot="10800000">
-            <a:off x="4745542" y="3025712"/>
-            <a:ext cx="384398" cy="307655"/>
-          </a:xfrm>
-          <a:prstGeom prst="flowChartOffpageConnector">
-            <a:avLst/>
-          </a:prstGeom>
-          <a:gradFill>
-            <a:gsLst>
-              <a:gs pos="54000">
-                <a:srgbClr val="FFC000"/>
-              </a:gs>
-              <a:gs pos="0">
-                <a:srgbClr val="FFFF00"/>
-              </a:gs>
-              <a:gs pos="100000">
-                <a:srgbClr val="FFC000"/>
-              </a:gs>
-            </a:gsLst>
-          </a:gradFill>
-        </p:spPr>
-        <p:style>
-          <a:lnRef idx="1">
-            <a:schemeClr val="accent1"/>
-          </a:lnRef>
-          <a:fillRef idx="3">
-            <a:schemeClr val="accent1"/>
-          </a:fillRef>
-          <a:effectRef idx="2">
-            <a:schemeClr val="accent1"/>
-          </a:effectRef>
-          <a:fontRef idx="minor">
-            <a:schemeClr val="lt1"/>
-          </a:fontRef>
-        </p:style>
-        <p:txBody>
-          <a:bodyPr rtlCol="0" anchor="ctr"/>
-          <a:lstStyle/>
-          <a:p>
-            <a:pPr algn="ctr"/>
-            <a:endParaRPr kumimoji="1" lang="ja-JP" altLang="en-US" dirty="0"/>
-          </a:p>
-        </p:txBody>
-      </p:sp>
-      <p:cxnSp>
-        <p:nvCxnSpPr>
-          <p:cNvPr id="105" name="直線矢印コネクタ 13"/>
-          <p:cNvCxnSpPr>
-            <a:endCxn id="63" idx="3"/>
-          </p:cNvCxnSpPr>
-          <p:nvPr/>
-        </p:nvCxnSpPr>
-        <p:spPr>
-          <a:xfrm flipH="1">
-            <a:off x="5509480" y="2530676"/>
-            <a:ext cx="1433184" cy="15094"/>
-          </a:xfrm>
-          <a:prstGeom prst="straightConnector1">
-            <a:avLst/>
-          </a:prstGeom>
-          <a:ln>
-            <a:solidFill>
-              <a:schemeClr val="tx2">
-                <a:lumMod val="60000"/>
-                <a:lumOff val="40000"/>
-              </a:schemeClr>
-            </a:solidFill>
-            <a:prstDash val="dash"/>
-            <a:tailEnd type="arrow"/>
-          </a:ln>
-        </p:spPr>
-        <p:style>
-          <a:lnRef idx="2">
-            <a:schemeClr val="accent1"/>
-          </a:lnRef>
-          <a:fillRef idx="0">
-            <a:schemeClr val="accent1"/>
-          </a:fillRef>
-          <a:effectRef idx="1">
-            <a:schemeClr val="accent1"/>
-          </a:effectRef>
-          <a:fontRef idx="minor">
-            <a:schemeClr val="tx1"/>
-          </a:fontRef>
-        </p:style>
-      </p:cxnSp>
-      <p:sp>
-        <p:nvSpPr>
-          <p:cNvPr id="108" name="テキスト ボックス 107"/>
-          <p:cNvSpPr txBox="1"/>
-          <p:nvPr/>
-        </p:nvSpPr>
-        <p:spPr>
-          <a:xfrm>
-            <a:off x="7103831" y="3821317"/>
-            <a:ext cx="476250" cy="307777"/>
-          </a:xfrm>
-          <a:prstGeom prst="rect">
-            <a:avLst/>
-          </a:prstGeom>
-          <a:noFill/>
-        </p:spPr>
-        <p:txBody>
-          <a:bodyPr wrap="square" rtlCol="0">
-            <a:spAutoFit/>
-          </a:bodyPr>
-          <a:lstStyle/>
-          <a:p>
-            <a:r>
-              <a:rPr lang="en-US" altLang="ja-JP" sz="1400" dirty="0" smtClean="0"/>
-              <a:t>5’</a:t>
-            </a:r>
-            <a:endParaRPr kumimoji="1" lang="en-US" altLang="ja-JP" sz="1400" dirty="0" smtClean="0"/>
-          </a:p>
-        </p:txBody>
-      </p:sp>
-      <p:sp>
-        <p:nvSpPr>
-          <p:cNvPr id="109" name="テキスト ボックス 108"/>
-          <p:cNvSpPr txBox="1"/>
-          <p:nvPr/>
-        </p:nvSpPr>
-        <p:spPr>
-          <a:xfrm>
-            <a:off x="6048609" y="2523700"/>
-            <a:ext cx="476250" cy="307777"/>
-          </a:xfrm>
-          <a:prstGeom prst="rect">
-            <a:avLst/>
-          </a:prstGeom>
-          <a:noFill/>
-        </p:spPr>
-        <p:txBody>
-          <a:bodyPr wrap="square" rtlCol="0">
-            <a:spAutoFit/>
-          </a:bodyPr>
-          <a:lstStyle/>
-          <a:p>
-            <a:r>
-              <a:rPr lang="en-US" altLang="ja-JP" sz="1400" dirty="0" smtClean="0"/>
-              <a:t>5’</a:t>
-            </a:r>
-            <a:endParaRPr kumimoji="1" lang="en-US" altLang="ja-JP" sz="1400" dirty="0" smtClean="0"/>
-          </a:p>
-        </p:txBody>
-      </p:sp>
-      <p:sp>
-        <p:nvSpPr>
-          <p:cNvPr id="73" name="線吹き出し 2 (枠付き) 72"/>
-          <p:cNvSpPr/>
-          <p:nvPr/>
-        </p:nvSpPr>
-        <p:spPr>
-          <a:xfrm>
-            <a:off x="569214" y="4024688"/>
-            <a:ext cx="2922494" cy="1639760"/>
-          </a:xfrm>
-          <a:prstGeom prst="borderCallout2">
-            <a:avLst>
-              <a:gd name="adj1" fmla="val -4669"/>
-              <a:gd name="adj2" fmla="val 102349"/>
-              <a:gd name="adj3" fmla="val -51877"/>
-              <a:gd name="adj4" fmla="val 107251"/>
-              <a:gd name="adj5" fmla="val -53554"/>
-              <a:gd name="adj6" fmla="val 143255"/>
-            </a:avLst>
-          </a:prstGeom>
-          <a:solidFill>
-            <a:schemeClr val="bg1"/>
-          </a:solidFill>
-          <a:ln w="25400">
-            <a:solidFill>
-              <a:schemeClr val="tx1">
-                <a:lumMod val="75000"/>
-                <a:lumOff val="25000"/>
-              </a:schemeClr>
-            </a:solidFill>
-          </a:ln>
-        </p:spPr>
-        <p:style>
-          <a:lnRef idx="1">
-            <a:schemeClr val="accent1"/>
-          </a:lnRef>
-          <a:fillRef idx="3">
-            <a:schemeClr val="accent1"/>
-          </a:fillRef>
-          <a:effectRef idx="2">
-            <a:schemeClr val="accent1"/>
-          </a:effectRef>
-          <a:fontRef idx="minor">
-            <a:schemeClr val="lt1"/>
-          </a:fontRef>
-        </p:style>
-        <p:txBody>
-          <a:bodyPr rtlCol="0" anchor="ctr"/>
-          <a:lstStyle/>
-          <a:p>
-            <a:r>
-              <a:rPr lang="en-US" altLang="ja-JP" sz="1400" b="1" dirty="0" smtClean="0">
-                <a:solidFill>
-                  <a:schemeClr val="tx1">
-                    <a:lumMod val="65000"/>
-                    <a:lumOff val="35000"/>
-                  </a:schemeClr>
-                </a:solidFill>
-              </a:rPr>
-              <a:t>7</a:t>
-            </a:r>
-          </a:p>
-          <a:p>
-            <a:r>
-              <a:rPr lang="en-US" altLang="ja-JP" sz="1400" b="1" dirty="0" smtClean="0">
-                <a:solidFill>
-                  <a:schemeClr val="tx1"/>
-                </a:solidFill>
-              </a:rPr>
-              <a:t>Define </a:t>
-            </a:r>
-            <a:r>
-              <a:rPr lang="en-US" altLang="ja-JP" sz="1400" b="1" dirty="0">
-                <a:solidFill>
-                  <a:schemeClr val="tx1"/>
-                </a:solidFill>
-              </a:rPr>
-              <a:t>handling rule.</a:t>
-            </a:r>
-          </a:p>
-          <a:p>
-            <a:endParaRPr lang="en-US" altLang="ja-JP" sz="1000" b="1" dirty="0">
-              <a:solidFill>
-                <a:schemeClr val="tx1"/>
-              </a:solidFill>
-            </a:endParaRPr>
-          </a:p>
-          <a:p>
-            <a:r>
-              <a:rPr lang="en-US" altLang="ja-JP" sz="1200" dirty="0">
-                <a:solidFill>
-                  <a:schemeClr val="tx1"/>
-                </a:solidFill>
-              </a:rPr>
-              <a:t>&lt;property name="</a:t>
-            </a:r>
-            <a:r>
-              <a:rPr lang="en-US" altLang="ja-JP" sz="1200" b="1" dirty="0" err="1">
-                <a:solidFill>
-                  <a:schemeClr val="tx1"/>
-                </a:solidFill>
-              </a:rPr>
-              <a:t>excludedExceptions</a:t>
-            </a:r>
-            <a:r>
-              <a:rPr lang="en-US" altLang="ja-JP" sz="1200" dirty="0">
-                <a:solidFill>
-                  <a:schemeClr val="tx1"/>
-                </a:solidFill>
-              </a:rPr>
-              <a:t>" value="</a:t>
-            </a:r>
-            <a:r>
-              <a:rPr lang="en-US" altLang="ja-JP" sz="1200" b="1" dirty="0" err="1">
-                <a:solidFill>
-                  <a:schemeClr val="tx1"/>
-                </a:solidFill>
-              </a:rPr>
-              <a:t>org.springframework.web.util.NestedServletException</a:t>
-            </a:r>
-            <a:r>
-              <a:rPr lang="en-US" altLang="ja-JP" sz="1200" dirty="0">
-                <a:solidFill>
-                  <a:schemeClr val="tx1"/>
-                </a:solidFill>
-              </a:rPr>
-              <a:t>" /&gt;</a:t>
-            </a:r>
-          </a:p>
-        </p:txBody>
-      </p:sp>
-      <p:sp>
-        <p:nvSpPr>
-          <p:cNvPr id="74" name="フローチャート : 書類 74"/>
-          <p:cNvSpPr/>
-          <p:nvPr/>
-        </p:nvSpPr>
-        <p:spPr>
-          <a:xfrm>
-            <a:off x="2740383" y="3899838"/>
-            <a:ext cx="819975" cy="665248"/>
-          </a:xfrm>
-          <a:prstGeom prst="flowChartDocument">
-            <a:avLst/>
-          </a:prstGeom>
-        </p:spPr>
-        <p:style>
-          <a:lnRef idx="1">
-            <a:schemeClr val="accent3"/>
-          </a:lnRef>
-          <a:fillRef idx="2">
-            <a:schemeClr val="accent3"/>
-          </a:fillRef>
-          <a:effectRef idx="1">
-            <a:schemeClr val="accent3"/>
-          </a:effectRef>
-          <a:fontRef idx="minor">
-            <a:schemeClr val="dk1"/>
-          </a:fontRef>
-        </p:style>
-        <p:txBody>
-          <a:bodyPr rtlCol="0" anchor="t" anchorCtr="0"/>
-          <a:lstStyle/>
-          <a:p>
-            <a:pPr algn="ctr"/>
-            <a:r>
-              <a:rPr lang="en-US" altLang="ja-JP" sz="1200" dirty="0"/>
-              <a:t>spring-mvc.xml</a:t>
-            </a:r>
-          </a:p>
-        </p:txBody>
-      </p:sp>
-      <p:sp>
-        <p:nvSpPr>
-          <p:cNvPr id="118" name="テキスト ボックス 117"/>
-          <p:cNvSpPr txBox="1"/>
-          <p:nvPr/>
-        </p:nvSpPr>
-        <p:spPr>
-          <a:xfrm>
-            <a:off x="3931072" y="1501077"/>
-            <a:ext cx="476250" cy="307777"/>
-          </a:xfrm>
-          <a:prstGeom prst="rect">
-            <a:avLst/>
-          </a:prstGeom>
-          <a:noFill/>
-        </p:spPr>
-        <p:txBody>
-          <a:bodyPr wrap="square" rtlCol="0">
-            <a:spAutoFit/>
-          </a:bodyPr>
-          <a:lstStyle/>
-          <a:p>
-            <a:r>
-              <a:rPr kumimoji="1" lang="en-US" altLang="ja-JP" sz="1400" dirty="0" smtClean="0"/>
-              <a:t>6’</a:t>
-            </a:r>
-          </a:p>
-        </p:txBody>
-      </p:sp>
-      <p:cxnSp>
-        <p:nvCxnSpPr>
-          <p:cNvPr id="60" name="直線矢印コネクタ 13"/>
-          <p:cNvCxnSpPr>
-            <a:endCxn id="55" idx="2"/>
-          </p:cNvCxnSpPr>
-          <p:nvPr/>
-        </p:nvCxnSpPr>
-        <p:spPr>
-          <a:xfrm flipV="1">
-            <a:off x="4268999" y="1126660"/>
-            <a:ext cx="0" cy="869777"/>
-          </a:xfrm>
-          <a:prstGeom prst="straightConnector1">
-            <a:avLst/>
-          </a:prstGeom>
-          <a:ln>
-            <a:solidFill>
-              <a:schemeClr val="tx2">
-                <a:lumMod val="60000"/>
-                <a:lumOff val="40000"/>
-              </a:schemeClr>
-            </a:solidFill>
-            <a:prstDash val="dash"/>
-            <a:tailEnd type="arrow"/>
-          </a:ln>
-        </p:spPr>
-        <p:style>
-          <a:lnRef idx="2">
-            <a:schemeClr val="accent1"/>
-          </a:lnRef>
-          <a:fillRef idx="0">
-            <a:schemeClr val="accent1"/>
-          </a:fillRef>
-          <a:effectRef idx="1">
-            <a:schemeClr val="accent1"/>
-          </a:effectRef>
-          <a:fontRef idx="minor">
-            <a:schemeClr val="tx1"/>
-          </a:fontRef>
-        </p:style>
-      </p:cxnSp>
-      <p:sp>
-        <p:nvSpPr>
-          <p:cNvPr id="63" name="フローチャート : 他ページ結合子 54"/>
-          <p:cNvSpPr/>
-          <p:nvPr/>
-        </p:nvSpPr>
-        <p:spPr>
-          <a:xfrm>
-            <a:off x="5119190" y="2378297"/>
-            <a:ext cx="390290" cy="334946"/>
-          </a:xfrm>
-          <a:prstGeom prst="flowChartOffpageConnector">
-            <a:avLst/>
-          </a:prstGeom>
-          <a:gradFill>
-            <a:gsLst>
-              <a:gs pos="54000">
-                <a:srgbClr val="FFC000"/>
-              </a:gs>
-              <a:gs pos="0">
-                <a:srgbClr val="FFFF00"/>
-              </a:gs>
-              <a:gs pos="100000">
-                <a:srgbClr val="FFC000"/>
-              </a:gs>
-            </a:gsLst>
-          </a:gradFill>
-        </p:spPr>
-        <p:style>
-          <a:lnRef idx="1">
-            <a:schemeClr val="accent1"/>
-          </a:lnRef>
-          <a:fillRef idx="3">
-            <a:schemeClr val="accent1"/>
-          </a:fillRef>
-          <a:effectRef idx="2">
-            <a:schemeClr val="accent1"/>
-          </a:effectRef>
-          <a:fontRef idx="minor">
-            <a:schemeClr val="lt1"/>
-          </a:fontRef>
-        </p:style>
-        <p:txBody>
-          <a:bodyPr rtlCol="0" anchor="ctr"/>
-          <a:lstStyle/>
-          <a:p>
-            <a:pPr algn="ctr"/>
-            <a:endParaRPr kumimoji="1" lang="ja-JP" altLang="en-US" dirty="0"/>
-          </a:p>
-        </p:txBody>
-      </p:sp>
-      <p:sp>
-        <p:nvSpPr>
-          <p:cNvPr id="50" name="四角形吹き出し 49"/>
-          <p:cNvSpPr/>
-          <p:nvPr/>
-        </p:nvSpPr>
-        <p:spPr>
-          <a:xfrm>
-            <a:off x="5327000" y="2968342"/>
-            <a:ext cx="1936998" cy="787088"/>
-          </a:xfrm>
-          <a:prstGeom prst="wedgeRectCallout">
-            <a:avLst>
-              <a:gd name="adj1" fmla="val -43310"/>
-              <a:gd name="adj2" fmla="val -96338"/>
-            </a:avLst>
-          </a:prstGeom>
-          <a:ln w="19050">
-            <a:solidFill>
-              <a:schemeClr val="tx1">
-                <a:lumMod val="50000"/>
-                <a:lumOff val="50000"/>
-              </a:schemeClr>
-            </a:solidFill>
-          </a:ln>
-        </p:spPr>
-        <p:style>
-          <a:lnRef idx="2">
-            <a:schemeClr val="accent1"/>
-          </a:lnRef>
-          <a:fillRef idx="1">
-            <a:schemeClr val="lt1"/>
-          </a:fillRef>
-          <a:effectRef idx="0">
-            <a:schemeClr val="accent1"/>
-          </a:effectRef>
-          <a:fontRef idx="minor">
-            <a:schemeClr val="dk1"/>
-          </a:fontRef>
-        </p:style>
-        <p:txBody>
-          <a:bodyPr rtlCol="0" anchor="t"/>
-          <a:lstStyle/>
-          <a:p>
-            <a:r>
-              <a:rPr lang="en-US" altLang="ja-JP" sz="1400" dirty="0" smtClean="0"/>
-              <a:t>6</a:t>
-            </a:r>
-          </a:p>
-          <a:p>
-            <a:r>
-              <a:rPr lang="en-US" altLang="ja-JP" sz="1400" dirty="0" smtClean="0"/>
-              <a:t>Wrap </a:t>
-            </a:r>
-            <a:r>
-              <a:rPr lang="en-US" altLang="ja-JP" sz="1400" dirty="0"/>
-              <a:t>to </a:t>
-            </a:r>
-            <a:r>
-              <a:rPr lang="en-US" altLang="ja-JP" sz="1400" dirty="0" err="1" smtClean="0"/>
-              <a:t>NestedServletException</a:t>
-            </a:r>
-            <a:endParaRPr lang="en-US" altLang="ja-JP" sz="1400" dirty="0"/>
-          </a:p>
-        </p:txBody>
-      </p:sp>
-      <p:cxnSp>
-        <p:nvCxnSpPr>
-          <p:cNvPr id="83" name="直線矢印コネクタ 13"/>
-          <p:cNvCxnSpPr>
-            <a:stCxn id="63" idx="2"/>
-            <a:endCxn id="104" idx="2"/>
-          </p:cNvCxnSpPr>
-          <p:nvPr/>
-        </p:nvCxnSpPr>
-        <p:spPr>
-          <a:xfrm rot="5400000">
-            <a:off x="4969804" y="2681180"/>
-            <a:ext cx="312469" cy="376594"/>
-          </a:xfrm>
-          <a:prstGeom prst="bentConnector3">
-            <a:avLst>
-              <a:gd name="adj1" fmla="val 40855"/>
-            </a:avLst>
-          </a:prstGeom>
-          <a:ln>
-            <a:solidFill>
-              <a:schemeClr val="tx2">
-                <a:lumMod val="60000"/>
-                <a:lumOff val="40000"/>
-              </a:schemeClr>
-            </a:solidFill>
-            <a:prstDash val="dash"/>
-            <a:tailEnd type="arrow"/>
-          </a:ln>
-        </p:spPr>
-        <p:style>
-          <a:lnRef idx="2">
-            <a:schemeClr val="accent1"/>
-          </a:lnRef>
-          <a:fillRef idx="0">
-            <a:schemeClr val="accent1"/>
-          </a:fillRef>
-          <a:effectRef idx="1">
-            <a:schemeClr val="accent1"/>
-          </a:effectRef>
-          <a:fontRef idx="minor">
-            <a:schemeClr val="tx1"/>
-          </a:fontRef>
-        </p:style>
-      </p:cxnSp>
     </p:spTree>
     <p:extLst>
       <p:ext uri="{BB962C8B-B14F-4D97-AF65-F5344CB8AC3E}">

</xml_diff>

<commit_message>
proofreading for 5.3.0 source #2645
</commit_message>
<xml_diff>
--- a/source/ArchitectureInDetail/WebApplicationDetail/images_ExceptionHandling/materialExceptionHandling.pptx
+++ b/source/ArchitectureInDetail/WebApplicationDetail/images_ExceptionHandling/materialExceptionHandling.pptx
@@ -153,6 +153,20 @@
         </p14:section>
       </p14:sectionLst>
     </p:ext>
+    <p:ext uri="{EFAFB233-063F-42B5-8137-9DF3F51BA10A}">
+      <p15:sldGuideLst xmlns:p15="http://schemas.microsoft.com/office/powerpoint/2012/main">
+        <p15:guide id="1" orient="horz" pos="2160">
+          <p15:clr>
+            <a:srgbClr val="A4A3A4"/>
+          </p15:clr>
+        </p15:guide>
+        <p15:guide id="2" pos="2880">
+          <p15:clr>
+            <a:srgbClr val="A4A3A4"/>
+          </p15:clr>
+        </p15:guide>
+      </p15:sldGuideLst>
+    </p:ext>
   </p:extLst>
 </p:presentation>
 </file>
@@ -240,7 +254,7 @@
             <a:fld id="{3BB47352-BF5A-4CD2-B029-996118CD8E01}" type="datetimeFigureOut">
               <a:rPr kumimoji="1" lang="ja-JP" altLang="en-US" smtClean="0"/>
               <a:pPr/>
-              <a:t>2014/6/27</a:t>
+              <a:t>2017/3/2</a:t>
             </a:fld>
             <a:endParaRPr kumimoji="1" lang="ja-JP" altLang="en-US" dirty="0"/>
           </a:p>
@@ -1488,7 +1502,7 @@
             <a:fld id="{7B9B12EC-6AA0-374B-A2D3-850081A07A26}" type="datetimeFigureOut">
               <a:rPr kumimoji="1" lang="ja-JP" altLang="en-US" smtClean="0"/>
               <a:pPr/>
-              <a:t>2014/6/27</a:t>
+              <a:t>2017/3/2</a:t>
             </a:fld>
             <a:endParaRPr kumimoji="1" lang="ja-JP" altLang="en-US" dirty="0"/>
           </a:p>
@@ -1692,7 +1706,7 @@
             <a:fld id="{7B9B12EC-6AA0-374B-A2D3-850081A07A26}" type="datetimeFigureOut">
               <a:rPr kumimoji="1" lang="ja-JP" altLang="en-US" smtClean="0"/>
               <a:pPr/>
-              <a:t>2014/6/27</a:t>
+              <a:t>2017/3/2</a:t>
             </a:fld>
             <a:endParaRPr kumimoji="1" lang="ja-JP" altLang="en-US" dirty="0"/>
           </a:p>
@@ -1906,7 +1920,7 @@
             <a:fld id="{7B9B12EC-6AA0-374B-A2D3-850081A07A26}" type="datetimeFigureOut">
               <a:rPr kumimoji="1" lang="ja-JP" altLang="en-US" smtClean="0"/>
               <a:pPr/>
-              <a:t>2014/6/27</a:t>
+              <a:t>2017/3/2</a:t>
             </a:fld>
             <a:endParaRPr kumimoji="1" lang="ja-JP" altLang="en-US" dirty="0"/>
           </a:p>
@@ -2110,7 +2124,7 @@
             <a:fld id="{7B9B12EC-6AA0-374B-A2D3-850081A07A26}" type="datetimeFigureOut">
               <a:rPr kumimoji="1" lang="ja-JP" altLang="en-US" smtClean="0"/>
               <a:pPr/>
-              <a:t>2014/6/27</a:t>
+              <a:t>2017/3/2</a:t>
             </a:fld>
             <a:endParaRPr kumimoji="1" lang="ja-JP" altLang="en-US" dirty="0"/>
           </a:p>
@@ -2358,7 +2372,7 @@
             <a:fld id="{7B9B12EC-6AA0-374B-A2D3-850081A07A26}" type="datetimeFigureOut">
               <a:rPr kumimoji="1" lang="ja-JP" altLang="en-US" smtClean="0"/>
               <a:pPr/>
-              <a:t>2014/6/27</a:t>
+              <a:t>2017/3/2</a:t>
             </a:fld>
             <a:endParaRPr kumimoji="1" lang="ja-JP" altLang="en-US" dirty="0"/>
           </a:p>
@@ -2712,7 +2726,7 @@
             <a:fld id="{7B9B12EC-6AA0-374B-A2D3-850081A07A26}" type="datetimeFigureOut">
               <a:rPr kumimoji="1" lang="ja-JP" altLang="en-US" smtClean="0"/>
               <a:pPr/>
-              <a:t>2014/6/27</a:t>
+              <a:t>2017/3/2</a:t>
             </a:fld>
             <a:endParaRPr kumimoji="1" lang="ja-JP" altLang="en-US" dirty="0"/>
           </a:p>
@@ -3200,7 +3214,7 @@
             <a:fld id="{7B9B12EC-6AA0-374B-A2D3-850081A07A26}" type="datetimeFigureOut">
               <a:rPr kumimoji="1" lang="ja-JP" altLang="en-US" smtClean="0"/>
               <a:pPr/>
-              <a:t>2014/6/27</a:t>
+              <a:t>2017/3/2</a:t>
             </a:fld>
             <a:endParaRPr kumimoji="1" lang="ja-JP" altLang="en-US" dirty="0"/>
           </a:p>
@@ -3320,7 +3334,7 @@
             <a:fld id="{7B9B12EC-6AA0-374B-A2D3-850081A07A26}" type="datetimeFigureOut">
               <a:rPr kumimoji="1" lang="ja-JP" altLang="en-US" smtClean="0"/>
               <a:pPr/>
-              <a:t>2014/6/27</a:t>
+              <a:t>2017/3/2</a:t>
             </a:fld>
             <a:endParaRPr kumimoji="1" lang="ja-JP" altLang="en-US" dirty="0"/>
           </a:p>
@@ -3417,7 +3431,7 @@
             <a:fld id="{7B9B12EC-6AA0-374B-A2D3-850081A07A26}" type="datetimeFigureOut">
               <a:rPr kumimoji="1" lang="ja-JP" altLang="en-US" smtClean="0"/>
               <a:pPr/>
-              <a:t>2014/6/27</a:t>
+              <a:t>2017/3/2</a:t>
             </a:fld>
             <a:endParaRPr kumimoji="1" lang="ja-JP" altLang="en-US" dirty="0"/>
           </a:p>
@@ -3728,7 +3742,7 @@
             <a:fld id="{7B9B12EC-6AA0-374B-A2D3-850081A07A26}" type="datetimeFigureOut">
               <a:rPr kumimoji="1" lang="ja-JP" altLang="en-US" smtClean="0"/>
               <a:pPr/>
-              <a:t>2014/6/27</a:t>
+              <a:t>2017/3/2</a:t>
             </a:fld>
             <a:endParaRPr kumimoji="1" lang="ja-JP" altLang="en-US" dirty="0"/>
           </a:p>
@@ -3983,7 +3997,7 @@
             <a:fld id="{7B9B12EC-6AA0-374B-A2D3-850081A07A26}" type="datetimeFigureOut">
               <a:rPr kumimoji="1" lang="ja-JP" altLang="en-US" smtClean="0"/>
               <a:pPr/>
-              <a:t>2014/6/27</a:t>
+              <a:t>2017/3/2</a:t>
             </a:fld>
             <a:endParaRPr kumimoji="1" lang="ja-JP" altLang="en-US" dirty="0"/>
           </a:p>
@@ -4230,7 +4244,7 @@
             <a:fld id="{7B9B12EC-6AA0-374B-A2D3-850081A07A26}" type="datetimeFigureOut">
               <a:rPr kumimoji="1" lang="ja-JP" altLang="en-US" smtClean="0"/>
               <a:pPr/>
-              <a:t>2014/6/27</a:t>
+              <a:t>2017/3/2</a:t>
             </a:fld>
             <a:endParaRPr kumimoji="1" lang="ja-JP" altLang="en-US" dirty="0"/>
           </a:p>
@@ -8501,20 +8515,20 @@
           <a:lstStyle/>
           <a:p>
             <a:r>
-              <a:rPr lang="en-US" altLang="ja-JP" sz="1200" dirty="0">
-                <a:solidFill>
-                  <a:schemeClr val="tx1"/>
-                </a:solidFill>
-              </a:rPr>
-              <a:t>d</a:t>
-            </a:r>
-            <a:r>
               <a:rPr lang="en-US" altLang="ja-JP" sz="1200" dirty="0" smtClean="0">
                 <a:solidFill>
                   <a:schemeClr val="tx1"/>
                 </a:solidFill>
               </a:rPr>
-              <a:t>efile bean &amp; AOP</a:t>
+              <a:t>define </a:t>
+            </a:r>
+            <a:r>
+              <a:rPr lang="en-US" altLang="ja-JP" sz="1200" dirty="0" smtClean="0">
+                <a:solidFill>
+                  <a:schemeClr val="tx1"/>
+                </a:solidFill>
+              </a:rPr>
+              <a:t>bean &amp; AOP</a:t>
             </a:r>
             <a:endParaRPr lang="ja-JP" altLang="en-US" sz="1200" dirty="0">
               <a:solidFill>
@@ -11300,20 +11314,20 @@
           <a:lstStyle/>
           <a:p>
             <a:r>
-              <a:rPr lang="en-US" altLang="ja-JP" sz="1200" dirty="0">
-                <a:solidFill>
-                  <a:schemeClr val="tx1"/>
-                </a:solidFill>
-              </a:rPr>
-              <a:t>d</a:t>
-            </a:r>
-            <a:r>
               <a:rPr lang="en-US" altLang="ja-JP" sz="1200" dirty="0" smtClean="0">
                 <a:solidFill>
                   <a:schemeClr val="tx1"/>
                 </a:solidFill>
               </a:rPr>
-              <a:t>efile bean &amp; AOP</a:t>
+              <a:t>define </a:t>
+            </a:r>
+            <a:r>
+              <a:rPr lang="en-US" altLang="ja-JP" sz="1200" dirty="0" smtClean="0">
+                <a:solidFill>
+                  <a:schemeClr val="tx1"/>
+                </a:solidFill>
+              </a:rPr>
+              <a:t>bean &amp; AOP</a:t>
             </a:r>
             <a:endParaRPr lang="ja-JP" altLang="en-US" sz="1200" dirty="0">
               <a:solidFill>
@@ -13744,12 +13758,12 @@
           <a:lstStyle/>
           <a:p>
             <a:r>
-              <a:rPr lang="en-US" altLang="ja-JP" sz="1200" dirty="0">
+              <a:rPr lang="en-US" altLang="ja-JP" sz="1200" smtClean="0">
                 <a:solidFill>
                   <a:schemeClr val="tx1"/>
                 </a:solidFill>
               </a:rPr>
-              <a:t>d</a:t>
+              <a:t>define </a:t>
             </a:r>
             <a:r>
               <a:rPr lang="en-US" altLang="ja-JP" sz="1200" dirty="0" smtClean="0">
@@ -13757,7 +13771,7 @@
                   <a:schemeClr val="tx1"/>
                 </a:solidFill>
               </a:rPr>
-              <a:t>efile bean </a:t>
+              <a:t>bean </a:t>
             </a:r>
           </a:p>
           <a:p>
@@ -30716,20 +30730,20 @@
           <a:lstStyle/>
           <a:p>
             <a:r>
-              <a:rPr lang="en-US" altLang="ja-JP" sz="1200" dirty="0">
-                <a:solidFill>
-                  <a:schemeClr val="tx1"/>
-                </a:solidFill>
-              </a:rPr>
-              <a:t>d</a:t>
-            </a:r>
-            <a:r>
               <a:rPr lang="en-US" altLang="ja-JP" sz="1200" dirty="0" smtClean="0">
                 <a:solidFill>
                   <a:schemeClr val="tx1"/>
                 </a:solidFill>
               </a:rPr>
-              <a:t>efile bean &amp; AOP</a:t>
+              <a:t>define </a:t>
+            </a:r>
+            <a:r>
+              <a:rPr lang="en-US" altLang="ja-JP" sz="1200" dirty="0" smtClean="0">
+                <a:solidFill>
+                  <a:schemeClr val="tx1"/>
+                </a:solidFill>
+              </a:rPr>
+              <a:t>bean &amp; AOP</a:t>
             </a:r>
             <a:endParaRPr lang="ja-JP" altLang="en-US" sz="1200" dirty="0">
               <a:solidFill>

</xml_diff>